<commit_message>
add Standard Normal Probabilities table
</commit_message>
<xml_diff>
--- a/Lecture 5- Exercise--Normal Curve, Linear Transformations, and Standard Scores/Lecture 5- Exercise--Normal Curve, Linear Transformations, and Standard Scores.pptx
+++ b/Lecture 5- Exercise--Normal Curve, Linear Transformations, and Standard Scores/Lecture 5- Exercise--Normal Curve, Linear Transformations, and Standard Scores.pptx
@@ -124,7 +124,7 @@
   </p:defaultTextStyle>
   <p:extLst>
     <p:ext uri="{EFAFB233-063F-42B5-8137-9DF3F51BA10A}">
-      <p15:sldGuideLst xmlns:p15="http://schemas.microsoft.com/office/powerpoint/2012/main">
+      <p15:sldGuideLst xmlns:p15="http://schemas.microsoft.com/office/powerpoint/2012/main" xmlns="">
         <p15:guide id="1" orient="horz" pos="2160">
           <p15:clr>
             <a:srgbClr val="A4A3A4"/>
@@ -223,7 +223,7 @@
           <a:p>
             <a:fld id="{5E6DBAD6-C377-44EB-8279-71D20823D16A}" type="datetimeFigureOut">
               <a:rPr lang="en-US" smtClean="0"/>
-              <a:t>1/2/18</a:t>
+              <a:t>1/30/18</a:t>
             </a:fld>
             <a:endParaRPr lang="en-US"/>
           </a:p>
@@ -535,14 +535,14 @@
           <a:noFill/>
           <a:ln/>
           <a:extLst>
-            <a:ext uri="{909E8E84-426E-40DD-AFC4-6F175D3DCCD1}">
+            <a:ext uri="{909E8E84-426E-40dd-AFC4-6F175D3DCCD1}">
               <a14:hiddenFill xmlns:a14="http://schemas.microsoft.com/office/drawing/2010/main">
                 <a:solidFill>
                   <a:srgbClr val="FFFFFF"/>
                 </a:solidFill>
               </a14:hiddenFill>
             </a:ext>
-            <a:ext uri="{91240B29-F687-4F45-9708-019B960494DF}">
+            <a:ext uri="{91240B29-F687-4f45-9708-019B960494DF}">
               <a14:hiddenLine xmlns:a14="http://schemas.microsoft.com/office/drawing/2010/main" w="9525">
                 <a:solidFill>
                   <a:srgbClr val="000000"/>
@@ -616,14 +616,14 @@
           <a:noFill/>
           <a:ln/>
           <a:extLst>
-            <a:ext uri="{909E8E84-426E-40DD-AFC4-6F175D3DCCD1}">
+            <a:ext uri="{909E8E84-426E-40dd-AFC4-6F175D3DCCD1}">
               <a14:hiddenFill xmlns:a14="http://schemas.microsoft.com/office/drawing/2010/main">
                 <a:solidFill>
                   <a:srgbClr val="FFFFFF"/>
                 </a:solidFill>
               </a14:hiddenFill>
             </a:ext>
-            <a:ext uri="{91240B29-F687-4F45-9708-019B960494DF}">
+            <a:ext uri="{91240B29-F687-4f45-9708-019B960494DF}">
               <a14:hiddenLine xmlns:a14="http://schemas.microsoft.com/office/drawing/2010/main" w="9525">
                 <a:solidFill>
                   <a:srgbClr val="000000"/>
@@ -697,14 +697,14 @@
           <a:noFill/>
           <a:ln/>
           <a:extLst>
-            <a:ext uri="{909E8E84-426E-40DD-AFC4-6F175D3DCCD1}">
+            <a:ext uri="{909E8E84-426E-40dd-AFC4-6F175D3DCCD1}">
               <a14:hiddenFill xmlns:a14="http://schemas.microsoft.com/office/drawing/2010/main">
                 <a:solidFill>
                   <a:srgbClr val="FFFFFF"/>
                 </a:solidFill>
               </a14:hiddenFill>
             </a:ext>
-            <a:ext uri="{91240B29-F687-4F45-9708-019B960494DF}">
+            <a:ext uri="{91240B29-F687-4f45-9708-019B960494DF}">
               <a14:hiddenLine xmlns:a14="http://schemas.microsoft.com/office/drawing/2010/main" w="9525">
                 <a:solidFill>
                   <a:srgbClr val="000000"/>
@@ -778,14 +778,14 @@
           <a:noFill/>
           <a:ln/>
           <a:extLst>
-            <a:ext uri="{909E8E84-426E-40DD-AFC4-6F175D3DCCD1}">
+            <a:ext uri="{909E8E84-426E-40dd-AFC4-6F175D3DCCD1}">
               <a14:hiddenFill xmlns:a14="http://schemas.microsoft.com/office/drawing/2010/main">
                 <a:solidFill>
                   <a:srgbClr val="FFFFFF"/>
                 </a:solidFill>
               </a14:hiddenFill>
             </a:ext>
-            <a:ext uri="{91240B29-F687-4F45-9708-019B960494DF}">
+            <a:ext uri="{91240B29-F687-4f45-9708-019B960494DF}">
               <a14:hiddenLine xmlns:a14="http://schemas.microsoft.com/office/drawing/2010/main" w="9525">
                 <a:solidFill>
                   <a:srgbClr val="000000"/>
@@ -859,14 +859,14 @@
           <a:noFill/>
           <a:ln/>
           <a:extLst>
-            <a:ext uri="{909E8E84-426E-40DD-AFC4-6F175D3DCCD1}">
+            <a:ext uri="{909E8E84-426E-40dd-AFC4-6F175D3DCCD1}">
               <a14:hiddenFill xmlns:a14="http://schemas.microsoft.com/office/drawing/2010/main">
                 <a:solidFill>
                   <a:srgbClr val="FFFFFF"/>
                 </a:solidFill>
               </a14:hiddenFill>
             </a:ext>
-            <a:ext uri="{91240B29-F687-4F45-9708-019B960494DF}">
+            <a:ext uri="{91240B29-F687-4f45-9708-019B960494DF}">
               <a14:hiddenLine xmlns:a14="http://schemas.microsoft.com/office/drawing/2010/main" w="9525">
                 <a:solidFill>
                   <a:srgbClr val="000000"/>
@@ -1144,7 +1144,7 @@
               <a:t> </a:t>
             </a:r>
             <a:r>
-              <a:rPr lang="zh-Hans" altLang="en-US" sz="1200" kern="1200" dirty="0">
+              <a:rPr lang="zh-CHS" altLang="en-US" sz="1200" kern="1200" dirty="0">
                 <a:solidFill>
                   <a:schemeClr val="tx1"/>
                 </a:solidFill>
@@ -1156,7 +1156,7 @@
               <a:t> 思考如何用</a:t>
             </a:r>
             <a:r>
-              <a:rPr lang="en-US" altLang="zh-Hans" sz="1200" kern="1200" dirty="0">
+              <a:rPr lang="en-US" altLang="zh-CHS" sz="1200" kern="1200" dirty="0">
                 <a:solidFill>
                   <a:schemeClr val="tx1"/>
                 </a:solidFill>
@@ -1168,7 +1168,7 @@
               <a:t>excel</a:t>
             </a:r>
             <a:r>
-              <a:rPr lang="zh-Hans" altLang="en-US" sz="1200" kern="1200" dirty="0">
+              <a:rPr lang="zh-CHS" altLang="en-US" sz="1200" kern="1200" dirty="0">
                 <a:solidFill>
                   <a:schemeClr val="tx1"/>
                 </a:solidFill>
@@ -1180,7 +1180,7 @@
               <a:t>和</a:t>
             </a:r>
             <a:r>
-              <a:rPr lang="en-US" altLang="zh-Hans" sz="1200" kern="1200" dirty="0">
+              <a:rPr lang="en-US" altLang="zh-CHS" sz="1200" kern="1200" dirty="0">
                 <a:solidFill>
                   <a:schemeClr val="tx1"/>
                 </a:solidFill>
@@ -1192,7 +1192,7 @@
               <a:t>R</a:t>
             </a:r>
             <a:r>
-              <a:rPr lang="zh-Hans" altLang="en-US" sz="1200" kern="1200" dirty="0">
+              <a:rPr lang="zh-CHS" altLang="en-US" sz="1200" kern="1200" dirty="0">
                 <a:solidFill>
                   <a:schemeClr val="tx1"/>
                 </a:solidFill>
@@ -1422,7 +1422,7 @@
           <a:p>
             <a:fld id="{0A1CEE28-B835-C747-BD7C-4AADCFF61603}" type="datetime1">
               <a:rPr lang="en-US" smtClean="0"/>
-              <a:t>1/2/18</a:t>
+              <a:t>1/30/18</a:t>
             </a:fld>
             <a:endParaRPr lang="en-US"/>
           </a:p>
@@ -1590,7 +1590,7 @@
           <a:p>
             <a:fld id="{9AA364E1-2676-A540-A39A-7AD0332F7008}" type="datetime1">
               <a:rPr lang="en-US" smtClean="0"/>
-              <a:t>1/2/18</a:t>
+              <a:t>1/30/18</a:t>
             </a:fld>
             <a:endParaRPr lang="en-US"/>
           </a:p>
@@ -1768,7 +1768,7 @@
           <a:p>
             <a:fld id="{8AC53240-26D6-2946-A47D-8EF956A84F37}" type="datetime1">
               <a:rPr lang="en-US" smtClean="0"/>
-              <a:t>1/2/18</a:t>
+              <a:t>1/30/18</a:t>
             </a:fld>
             <a:endParaRPr lang="en-US"/>
           </a:p>
@@ -1936,7 +1936,7 @@
           <a:p>
             <a:fld id="{303A4775-00BD-7E42-B95F-AA9F83C92E40}" type="datetime1">
               <a:rPr lang="en-US" smtClean="0"/>
-              <a:t>1/2/18</a:t>
+              <a:t>1/30/18</a:t>
             </a:fld>
             <a:endParaRPr lang="en-US"/>
           </a:p>
@@ -2181,7 +2181,7 @@
           <a:p>
             <a:fld id="{54A84395-585F-2147-98BB-3245B35FF7EF}" type="datetime1">
               <a:rPr lang="en-US" smtClean="0"/>
-              <a:t>1/2/18</a:t>
+              <a:t>1/30/18</a:t>
             </a:fld>
             <a:endParaRPr lang="en-US"/>
           </a:p>
@@ -2466,7 +2466,7 @@
           <a:p>
             <a:fld id="{F0295849-A4A8-6F46-8FE7-8F6A4CD0C1F3}" type="datetime1">
               <a:rPr lang="en-US" smtClean="0"/>
-              <a:t>1/2/18</a:t>
+              <a:t>1/30/18</a:t>
             </a:fld>
             <a:endParaRPr lang="en-US"/>
           </a:p>
@@ -2885,7 +2885,7 @@
           <a:p>
             <a:fld id="{A831AE25-D77F-EE4E-8FD0-BA4118D33A99}" type="datetime1">
               <a:rPr lang="en-US" smtClean="0"/>
-              <a:t>1/2/18</a:t>
+              <a:t>1/30/18</a:t>
             </a:fld>
             <a:endParaRPr lang="en-US"/>
           </a:p>
@@ -3002,7 +3002,7 @@
           <a:p>
             <a:fld id="{4A1CD0A7-957B-C74C-89E9-1FFDA1BC53A0}" type="datetime1">
               <a:rPr lang="en-US" smtClean="0"/>
-              <a:t>1/2/18</a:t>
+              <a:t>1/30/18</a:t>
             </a:fld>
             <a:endParaRPr lang="en-US"/>
           </a:p>
@@ -3097,7 +3097,7 @@
           <a:p>
             <a:fld id="{AE8CC244-2A34-1547-8B5E-CB12807A4FE5}" type="datetime1">
               <a:rPr lang="en-US" smtClean="0"/>
-              <a:t>1/2/18</a:t>
+              <a:t>1/30/18</a:t>
             </a:fld>
             <a:endParaRPr lang="en-US"/>
           </a:p>
@@ -3372,7 +3372,7 @@
           <a:p>
             <a:fld id="{F60B5CC3-219E-3145-95DB-C6195C7FAE13}" type="datetime1">
               <a:rPr lang="en-US" smtClean="0"/>
-              <a:t>1/2/18</a:t>
+              <a:t>1/30/18</a:t>
             </a:fld>
             <a:endParaRPr lang="en-US"/>
           </a:p>
@@ -3624,7 +3624,7 @@
           <a:p>
             <a:fld id="{954DD138-2DF7-B64D-A52E-B1FCD2B14B0A}" type="datetime1">
               <a:rPr lang="en-US" smtClean="0"/>
-              <a:t>1/2/18</a:t>
+              <a:t>1/30/18</a:t>
             </a:fld>
             <a:endParaRPr lang="en-US"/>
           </a:p>
@@ -3835,7 +3835,7 @@
           <a:p>
             <a:fld id="{E03BC567-C105-724D-97C2-EA77DFA453BA}" type="datetime1">
               <a:rPr lang="en-US" smtClean="0"/>
-              <a:t>1/2/18</a:t>
+              <a:t>1/30/18</a:t>
             </a:fld>
             <a:endParaRPr lang="en-US"/>
           </a:p>
@@ -4260,7 +4260,7 @@
           <a:lstStyle/>
           <a:p>
             <a:r>
-              <a:rPr lang="en-US" altLang="zh-Hans" sz="2800" dirty="0">
+              <a:rPr lang="en-US" altLang="zh-CHS" sz="2800" dirty="0">
                 <a:solidFill>
                   <a:srgbClr val="898989"/>
                 </a:solidFill>
@@ -4269,7 +4269,7 @@
               <a:t>Jibo</a:t>
             </a:r>
             <a:r>
-              <a:rPr lang="zh-Hans" altLang="en-US" sz="2800" dirty="0">
+              <a:rPr lang="zh-CHS" altLang="en-US" sz="2800" dirty="0">
                 <a:solidFill>
                   <a:srgbClr val="898989"/>
                 </a:solidFill>
@@ -4278,7 +4278,7 @@
               <a:t> </a:t>
             </a:r>
             <a:r>
-              <a:rPr lang="en-US" altLang="zh-Hans" sz="2800" dirty="0">
+              <a:rPr lang="en-US" altLang="zh-CHS" sz="2800" dirty="0">
                 <a:solidFill>
                   <a:srgbClr val="898989"/>
                 </a:solidFill>
@@ -4287,7 +4287,7 @@
               <a:t>He,</a:t>
             </a:r>
             <a:r>
-              <a:rPr lang="zh-Hans" altLang="en-US" sz="2800" dirty="0">
+              <a:rPr lang="zh-CHS" altLang="en-US" sz="2800" dirty="0">
                 <a:solidFill>
                   <a:srgbClr val="898989"/>
                 </a:solidFill>
@@ -4296,7 +4296,7 @@
               <a:t> </a:t>
             </a:r>
             <a:r>
-              <a:rPr lang="en-US" altLang="zh-Hans" sz="2800" dirty="0">
+              <a:rPr lang="en-US" altLang="zh-CHS" sz="2800" dirty="0">
                 <a:solidFill>
                   <a:srgbClr val="898989"/>
                 </a:solidFill>
@@ -4307,7 +4307,7 @@
           </a:p>
           <a:p>
             <a:r>
-              <a:rPr lang="en-US" altLang="zh-Hans" sz="2800" dirty="0">
+              <a:rPr lang="en-US" altLang="zh-CHS" sz="2800" dirty="0">
                 <a:solidFill>
                   <a:srgbClr val="898989"/>
                 </a:solidFill>
@@ -4316,7 +4316,7 @@
               <a:t>Associate</a:t>
             </a:r>
             <a:r>
-              <a:rPr lang="zh-Hans" altLang="en-US" sz="2800" dirty="0">
+              <a:rPr lang="zh-CHS" altLang="en-US" sz="2800" dirty="0">
                 <a:solidFill>
                   <a:srgbClr val="898989"/>
                 </a:solidFill>
@@ -4325,7 +4325,7 @@
               <a:t> </a:t>
             </a:r>
             <a:r>
-              <a:rPr lang="en-US" altLang="zh-Hans" sz="2800" dirty="0">
+              <a:rPr lang="en-US" altLang="zh-CHS" sz="2800" dirty="0">
                 <a:solidFill>
                   <a:srgbClr val="898989"/>
                 </a:solidFill>
@@ -4336,7 +4336,7 @@
           </a:p>
           <a:p>
             <a:r>
-              <a:rPr lang="en-US" altLang="zh-Hans" sz="2800" dirty="0">
+              <a:rPr lang="en-US" altLang="zh-CHS" sz="2800" dirty="0">
                 <a:solidFill>
                   <a:srgbClr val="898989"/>
                 </a:solidFill>
@@ -4345,7 +4345,7 @@
               <a:t>Wichita</a:t>
             </a:r>
             <a:r>
-              <a:rPr lang="zh-Hans" altLang="en-US" sz="2800" dirty="0">
+              <a:rPr lang="zh-CHS" altLang="en-US" sz="2800" dirty="0">
                 <a:solidFill>
                   <a:srgbClr val="898989"/>
                 </a:solidFill>
@@ -4354,7 +4354,7 @@
               <a:t> </a:t>
             </a:r>
             <a:r>
-              <a:rPr lang="en-US" altLang="zh-Hans" sz="2800" dirty="0">
+              <a:rPr lang="en-US" altLang="zh-CHS" sz="2800" dirty="0">
                 <a:solidFill>
                   <a:srgbClr val="898989"/>
                 </a:solidFill>
@@ -4363,7 +4363,7 @@
               <a:t>State</a:t>
             </a:r>
             <a:r>
-              <a:rPr lang="zh-Hans" altLang="en-US" sz="2800" dirty="0">
+              <a:rPr lang="zh-CHS" altLang="en-US" sz="2800" dirty="0">
                 <a:solidFill>
                   <a:srgbClr val="898989"/>
                 </a:solidFill>
@@ -4372,7 +4372,7 @@
               <a:t> </a:t>
             </a:r>
             <a:r>
-              <a:rPr lang="en-US" altLang="zh-Hans" sz="2800" dirty="0">
+              <a:rPr lang="en-US" altLang="zh-CHS" sz="2800" dirty="0">
                 <a:solidFill>
                   <a:srgbClr val="898989"/>
                 </a:solidFill>
@@ -4383,7 +4383,7 @@
           </a:p>
           <a:p>
             <a:r>
-              <a:rPr lang="en-US" altLang="zh-Hans" sz="2800" dirty="0" err="1">
+              <a:rPr lang="en-US" altLang="zh-CHS" sz="2800" dirty="0" err="1">
                 <a:solidFill>
                   <a:srgbClr val="898989"/>
                 </a:solidFill>
@@ -4405,7 +4405,7 @@
           <p:cNvPr id="4" name="Date Placeholder 3">
             <a:extLst>
               <a:ext uri="{FF2B5EF4-FFF2-40B4-BE49-F238E27FC236}">
-                <a16:creationId xmlns:a16="http://schemas.microsoft.com/office/drawing/2014/main" id="{D5C94A4F-9C3C-9741-8736-4067A81A0327}"/>
+                <a16:creationId xmlns:a16="http://schemas.microsoft.com/office/drawing/2014/main" xmlns="" id="{D5C94A4F-9C3C-9741-8736-4067A81A0327}"/>
               </a:ext>
             </a:extLst>
           </p:cNvPr>
@@ -4423,7 +4423,7 @@
           <a:p>
             <a:fld id="{44D65F3D-2237-954E-8B4B-FAD74B24BB80}" type="datetime1">
               <a:rPr lang="en-US" smtClean="0"/>
-              <a:t>1/2/18</a:t>
+              <a:t>1/30/18</a:t>
             </a:fld>
             <a:endParaRPr lang="en-US"/>
           </a:p>
@@ -4434,7 +4434,7 @@
           <p:cNvPr id="5" name="Slide Number Placeholder 4">
             <a:extLst>
               <a:ext uri="{FF2B5EF4-FFF2-40B4-BE49-F238E27FC236}">
-                <a16:creationId xmlns:a16="http://schemas.microsoft.com/office/drawing/2014/main" id="{765F88C7-48B7-7648-9ABD-58B95E9B3E43}"/>
+                <a16:creationId xmlns:a16="http://schemas.microsoft.com/office/drawing/2014/main" xmlns="" id="{765F88C7-48B7-7648-9ABD-58B95E9B3E43}"/>
               </a:ext>
             </a:extLst>
           </p:cNvPr>
@@ -4718,14 +4718,14 @@
             <a:noFill/>
           </a:ln>
           <a:extLst>
-            <a:ext uri="{909E8E84-426E-40DD-AFC4-6F175D3DCCD1}">
+            <a:ext uri="{909E8E84-426E-40dd-AFC4-6F175D3DCCD1}">
               <a14:hiddenFill xmlns:a14="http://schemas.microsoft.com/office/drawing/2010/main">
                 <a:solidFill>
                   <a:srgbClr val="FFFFFF"/>
                 </a:solidFill>
               </a14:hiddenFill>
             </a:ext>
-            <a:ext uri="{91240B29-F687-4F45-9708-019B960494DF}">
+            <a:ext uri="{91240B29-F687-4f45-9708-019B960494DF}">
               <a14:hiddenLine xmlns:a14="http://schemas.microsoft.com/office/drawing/2010/main" w="9525" algn="ctr">
                 <a:solidFill>
                   <a:srgbClr val="000000"/>
@@ -4885,7 +4885,7 @@
           <p:cNvPr id="2" name="Date Placeholder 1">
             <a:extLst>
               <a:ext uri="{FF2B5EF4-FFF2-40B4-BE49-F238E27FC236}">
-                <a16:creationId xmlns:a16="http://schemas.microsoft.com/office/drawing/2014/main" id="{9EFF8011-62F2-BD4C-918F-00843029B989}"/>
+                <a16:creationId xmlns:a16="http://schemas.microsoft.com/office/drawing/2014/main" xmlns="" id="{9EFF8011-62F2-BD4C-918F-00843029B989}"/>
               </a:ext>
             </a:extLst>
           </p:cNvPr>
@@ -4903,7 +4903,7 @@
           <a:p>
             <a:fld id="{C8421802-949D-6643-9F6B-3BA99E62073A}" type="datetime1">
               <a:rPr lang="en-US" smtClean="0"/>
-              <a:t>1/2/18</a:t>
+              <a:t>1/30/18</a:t>
             </a:fld>
             <a:endParaRPr lang="en-US"/>
           </a:p>
@@ -4914,7 +4914,7 @@
           <p:cNvPr id="3" name="Slide Number Placeholder 2">
             <a:extLst>
               <a:ext uri="{FF2B5EF4-FFF2-40B4-BE49-F238E27FC236}">
-                <a16:creationId xmlns:a16="http://schemas.microsoft.com/office/drawing/2014/main" id="{784D1B0D-874A-5045-9021-39A8464684AE}"/>
+                <a16:creationId xmlns:a16="http://schemas.microsoft.com/office/drawing/2014/main" xmlns="" id="{784D1B0D-874A-5045-9021-39A8464684AE}"/>
               </a:ext>
             </a:extLst>
           </p:cNvPr>
@@ -4948,7 +4948,7 @@
   <p:clrMapOvr>
     <a:masterClrMapping/>
   </p:clrMapOvr>
-  <p:transition/>
+  <p:transition xmlns:p14="http://schemas.microsoft.com/office/powerpoint/2010/main"/>
 </p:sld>
 </file>
 
@@ -5187,14 +5187,14 @@
             <a:noFill/>
           </a:ln>
           <a:extLst>
-            <a:ext uri="{909E8E84-426E-40DD-AFC4-6F175D3DCCD1}">
+            <a:ext uri="{909E8E84-426E-40dd-AFC4-6F175D3DCCD1}">
               <a14:hiddenFill xmlns:a14="http://schemas.microsoft.com/office/drawing/2010/main">
                 <a:solidFill>
                   <a:srgbClr val="FFFFFF"/>
                 </a:solidFill>
               </a14:hiddenFill>
             </a:ext>
-            <a:ext uri="{91240B29-F687-4F45-9708-019B960494DF}">
+            <a:ext uri="{91240B29-F687-4f45-9708-019B960494DF}">
               <a14:hiddenLine xmlns:a14="http://schemas.microsoft.com/office/drawing/2010/main" w="9525" algn="ctr">
                 <a:solidFill>
                   <a:srgbClr val="000000"/>
@@ -5361,7 +5361,7 @@
           <p:cNvPr id="2" name="Date Placeholder 1">
             <a:extLst>
               <a:ext uri="{FF2B5EF4-FFF2-40B4-BE49-F238E27FC236}">
-                <a16:creationId xmlns:a16="http://schemas.microsoft.com/office/drawing/2014/main" id="{54288F1C-99B3-D74A-8FC9-11DAC94B0E40}"/>
+                <a16:creationId xmlns:a16="http://schemas.microsoft.com/office/drawing/2014/main" xmlns="" id="{54288F1C-99B3-D74A-8FC9-11DAC94B0E40}"/>
               </a:ext>
             </a:extLst>
           </p:cNvPr>
@@ -5379,7 +5379,7 @@
           <a:p>
             <a:fld id="{252B016F-A9FE-0A44-A5B7-E3FA863F7614}" type="datetime1">
               <a:rPr lang="en-US" smtClean="0"/>
-              <a:t>1/2/18</a:t>
+              <a:t>1/30/18</a:t>
             </a:fld>
             <a:endParaRPr lang="en-US"/>
           </a:p>
@@ -5390,7 +5390,7 @@
           <p:cNvPr id="3" name="Slide Number Placeholder 2">
             <a:extLst>
               <a:ext uri="{FF2B5EF4-FFF2-40B4-BE49-F238E27FC236}">
-                <a16:creationId xmlns:a16="http://schemas.microsoft.com/office/drawing/2014/main" id="{97D74045-D061-EA44-9848-1A179A3164AF}"/>
+                <a16:creationId xmlns:a16="http://schemas.microsoft.com/office/drawing/2014/main" xmlns="" id="{97D74045-D061-EA44-9848-1A179A3164AF}"/>
               </a:ext>
             </a:extLst>
           </p:cNvPr>
@@ -5424,7 +5424,7 @@
   <p:clrMapOvr>
     <a:masterClrMapping/>
   </p:clrMapOvr>
-  <p:transition/>
+  <p:transition xmlns:p14="http://schemas.microsoft.com/office/powerpoint/2010/main"/>
 </p:sld>
 </file>
 
@@ -5522,7 +5522,7 @@
           <p:cNvPr id="4" name="Date Placeholder 3">
             <a:extLst>
               <a:ext uri="{FF2B5EF4-FFF2-40B4-BE49-F238E27FC236}">
-                <a16:creationId xmlns:a16="http://schemas.microsoft.com/office/drawing/2014/main" id="{4B3BBDF4-57C0-A545-8755-FE8DDB5D5DB6}"/>
+                <a16:creationId xmlns:a16="http://schemas.microsoft.com/office/drawing/2014/main" xmlns="" id="{4B3BBDF4-57C0-A545-8755-FE8DDB5D5DB6}"/>
               </a:ext>
             </a:extLst>
           </p:cNvPr>
@@ -5540,7 +5540,7 @@
           <a:p>
             <a:fld id="{5F0299C7-8ACB-D944-889B-87D0B91FA5DA}" type="datetime1">
               <a:rPr lang="en-US" smtClean="0"/>
-              <a:t>1/2/18</a:t>
+              <a:t>1/30/18</a:t>
             </a:fld>
             <a:endParaRPr lang="en-US"/>
           </a:p>
@@ -5551,7 +5551,7 @@
           <p:cNvPr id="5" name="Slide Number Placeholder 4">
             <a:extLst>
               <a:ext uri="{FF2B5EF4-FFF2-40B4-BE49-F238E27FC236}">
-                <a16:creationId xmlns:a16="http://schemas.microsoft.com/office/drawing/2014/main" id="{0AB9BA00-9F05-EB40-AEBF-F40BA8DE65B2}"/>
+                <a16:creationId xmlns:a16="http://schemas.microsoft.com/office/drawing/2014/main" xmlns="" id="{0AB9BA00-9F05-EB40-AEBF-F40BA8DE65B2}"/>
               </a:ext>
             </a:extLst>
           </p:cNvPr>
@@ -5779,14 +5779,14 @@
           </a:ln>
           <a:effectLst/>
           <a:extLst>
-            <a:ext uri="{909E8E84-426E-40DD-AFC4-6F175D3DCCD1}">
+            <a:ext uri="{909E8E84-426E-40dd-AFC4-6F175D3DCCD1}">
               <a14:hiddenFill xmlns:a14="http://schemas.microsoft.com/office/drawing/2010/main">
                 <a:solidFill>
                   <a:schemeClr val="accent1"/>
                 </a:solidFill>
               </a14:hiddenFill>
             </a:ext>
-            <a:ext uri="{91240B29-F687-4F45-9708-019B960494DF}">
+            <a:ext uri="{91240B29-F687-4f45-9708-019B960494DF}">
               <a14:hiddenLine xmlns:a14="http://schemas.microsoft.com/office/drawing/2010/main" w="9525">
                 <a:solidFill>
                   <a:schemeClr val="tx1"/>
@@ -5796,7 +5796,7 @@
                 <a:tailEnd/>
               </a14:hiddenLine>
             </a:ext>
-            <a:ext uri="{AF507438-7753-43E0-B8FC-AC1667EBCBE1}">
+            <a:ext uri="{AF507438-7753-43e0-B8FC-AC1667EBCBE1}">
               <a14:hiddenEffects xmlns:a14="http://schemas.microsoft.com/office/drawing/2010/main">
                 <a:effectLst>
                   <a:outerShdw dist="35921" dir="2700000" algn="ctr" rotWithShape="0">
@@ -5842,7 +5842,7 @@
           <a:graphicData uri="http://schemas.openxmlformats.org/presentationml/2006/ole">
             <mc:AlternateContent xmlns:mc="http://schemas.openxmlformats.org/markup-compatibility/2006">
               <mc:Choice xmlns:v="urn:schemas-microsoft-com:vml" Requires="v">
-                <p:oleObj spid="_x0000_s1089" name="Equation" r:id="rId3" imgW="901700" imgH="152400" progId="Equation.DSMT4">
+                <p:oleObj spid="_x0000_s1091" name="Equation" r:id="rId3" imgW="901700" imgH="152400" progId="Equation.DSMT4">
                   <p:embed/>
                 </p:oleObj>
               </mc:Choice>
@@ -5892,7 +5892,7 @@
           <p:cNvPr id="6" name="Date Placeholder 5">
             <a:extLst>
               <a:ext uri="{FF2B5EF4-FFF2-40B4-BE49-F238E27FC236}">
-                <a16:creationId xmlns:a16="http://schemas.microsoft.com/office/drawing/2014/main" id="{FA0D1FF5-BC34-424D-8200-C38CA20D8008}"/>
+                <a16:creationId xmlns:a16="http://schemas.microsoft.com/office/drawing/2014/main" xmlns="" id="{FA0D1FF5-BC34-424D-8200-C38CA20D8008}"/>
               </a:ext>
             </a:extLst>
           </p:cNvPr>
@@ -5910,7 +5910,7 @@
           <a:p>
             <a:fld id="{5E6B1E10-DE3C-BF47-97FA-474C905AFCDF}" type="datetime1">
               <a:rPr lang="en-US" smtClean="0"/>
-              <a:t>1/2/18</a:t>
+              <a:t>1/30/18</a:t>
             </a:fld>
             <a:endParaRPr lang="en-US"/>
           </a:p>
@@ -5921,7 +5921,7 @@
           <p:cNvPr id="7" name="Slide Number Placeholder 6">
             <a:extLst>
               <a:ext uri="{FF2B5EF4-FFF2-40B4-BE49-F238E27FC236}">
-                <a16:creationId xmlns:a16="http://schemas.microsoft.com/office/drawing/2014/main" id="{952C70E5-1E0E-AF48-9AAA-8D2C0F601B8A}"/>
+                <a16:creationId xmlns:a16="http://schemas.microsoft.com/office/drawing/2014/main" xmlns="" id="{952C70E5-1E0E-AF48-9AAA-8D2C0F601B8A}"/>
               </a:ext>
             </a:extLst>
           </p:cNvPr>
@@ -6054,7 +6054,7 @@
           <p:cNvPr id="4" name="Date Placeholder 3">
             <a:extLst>
               <a:ext uri="{FF2B5EF4-FFF2-40B4-BE49-F238E27FC236}">
-                <a16:creationId xmlns:a16="http://schemas.microsoft.com/office/drawing/2014/main" id="{F1C15A6B-4E35-1B48-8E5C-891D2288029F}"/>
+                <a16:creationId xmlns:a16="http://schemas.microsoft.com/office/drawing/2014/main" xmlns="" id="{F1C15A6B-4E35-1B48-8E5C-891D2288029F}"/>
               </a:ext>
             </a:extLst>
           </p:cNvPr>
@@ -6072,7 +6072,7 @@
           <a:p>
             <a:fld id="{96448248-6B88-CC48-B576-281F6871ECC1}" type="datetime1">
               <a:rPr lang="en-US" smtClean="0"/>
-              <a:t>1/2/18</a:t>
+              <a:t>1/30/18</a:t>
             </a:fld>
             <a:endParaRPr lang="en-US"/>
           </a:p>
@@ -6083,7 +6083,7 @@
           <p:cNvPr id="5" name="Slide Number Placeholder 4">
             <a:extLst>
               <a:ext uri="{FF2B5EF4-FFF2-40B4-BE49-F238E27FC236}">
-                <a16:creationId xmlns:a16="http://schemas.microsoft.com/office/drawing/2014/main" id="{309BBF56-2876-9A4F-9AF7-D2546A503AAB}"/>
+                <a16:creationId xmlns:a16="http://schemas.microsoft.com/office/drawing/2014/main" xmlns="" id="{309BBF56-2876-9A4F-9AF7-D2546A503AAB}"/>
               </a:ext>
             </a:extLst>
           </p:cNvPr>
@@ -6267,7 +6267,7 @@
           <p:cNvPr id="4" name="Date Placeholder 3">
             <a:extLst>
               <a:ext uri="{FF2B5EF4-FFF2-40B4-BE49-F238E27FC236}">
-                <a16:creationId xmlns:a16="http://schemas.microsoft.com/office/drawing/2014/main" id="{A15421B9-3684-2044-9A63-FC93A4E37104}"/>
+                <a16:creationId xmlns:a16="http://schemas.microsoft.com/office/drawing/2014/main" xmlns="" id="{A15421B9-3684-2044-9A63-FC93A4E37104}"/>
               </a:ext>
             </a:extLst>
           </p:cNvPr>
@@ -6285,7 +6285,7 @@
           <a:p>
             <a:fld id="{11E7B0A6-9062-A24A-98B3-524821819E75}" type="datetime1">
               <a:rPr lang="en-US" smtClean="0"/>
-              <a:t>1/2/18</a:t>
+              <a:t>1/30/18</a:t>
             </a:fld>
             <a:endParaRPr lang="en-US"/>
           </a:p>
@@ -6296,7 +6296,7 @@
           <p:cNvPr id="5" name="Slide Number Placeholder 4">
             <a:extLst>
               <a:ext uri="{FF2B5EF4-FFF2-40B4-BE49-F238E27FC236}">
-                <a16:creationId xmlns:a16="http://schemas.microsoft.com/office/drawing/2014/main" id="{2698494A-EC7D-A94F-A04E-B698577F0ED4}"/>
+                <a16:creationId xmlns:a16="http://schemas.microsoft.com/office/drawing/2014/main" xmlns="" id="{2698494A-EC7D-A94F-A04E-B698577F0ED4}"/>
               </a:ext>
             </a:extLst>
           </p:cNvPr>
@@ -6452,7 +6452,7 @@
           <p:cNvPr id="4" name="Date Placeholder 3">
             <a:extLst>
               <a:ext uri="{FF2B5EF4-FFF2-40B4-BE49-F238E27FC236}">
-                <a16:creationId xmlns:a16="http://schemas.microsoft.com/office/drawing/2014/main" id="{415C536B-AAB4-B644-901A-6150BD7D1232}"/>
+                <a16:creationId xmlns:a16="http://schemas.microsoft.com/office/drawing/2014/main" xmlns="" id="{415C536B-AAB4-B644-901A-6150BD7D1232}"/>
               </a:ext>
             </a:extLst>
           </p:cNvPr>
@@ -6470,7 +6470,7 @@
           <a:p>
             <a:fld id="{593CBB45-453B-2D40-BB2B-6D4486CF7D67}" type="datetime1">
               <a:rPr lang="en-US" smtClean="0"/>
-              <a:t>1/2/18</a:t>
+              <a:t>1/30/18</a:t>
             </a:fld>
             <a:endParaRPr lang="en-US"/>
           </a:p>
@@ -6481,7 +6481,7 @@
           <p:cNvPr id="5" name="Slide Number Placeholder 4">
             <a:extLst>
               <a:ext uri="{FF2B5EF4-FFF2-40B4-BE49-F238E27FC236}">
-                <a16:creationId xmlns:a16="http://schemas.microsoft.com/office/drawing/2014/main" id="{CC76F51B-6681-3642-B1C4-FA8A849AB71B}"/>
+                <a16:creationId xmlns:a16="http://schemas.microsoft.com/office/drawing/2014/main" xmlns="" id="{CC76F51B-6681-3642-B1C4-FA8A849AB71B}"/>
               </a:ext>
             </a:extLst>
           </p:cNvPr>
@@ -6639,7 +6639,7 @@
           <a:graphicData uri="http://schemas.openxmlformats.org/presentationml/2006/ole">
             <mc:AlternateContent xmlns:mc="http://schemas.openxmlformats.org/markup-compatibility/2006">
               <mc:Choice xmlns:v="urn:schemas-microsoft-com:vml" Requires="v">
-                <p:oleObj spid="_x0000_s2328" name="Equation" r:id="rId3" imgW="698400" imgH="177480" progId="Equation.DSMT4">
+                <p:oleObj spid="_x0000_s2334" name="Equation" r:id="rId3" imgW="698400" imgH="177480" progId="Equation.DSMT4">
                   <p:embed/>
                 </p:oleObj>
               </mc:Choice>
@@ -6703,7 +6703,7 @@
           <a:graphicData uri="http://schemas.openxmlformats.org/presentationml/2006/ole">
             <mc:AlternateContent xmlns:mc="http://schemas.openxmlformats.org/markup-compatibility/2006">
               <mc:Choice xmlns:v="urn:schemas-microsoft-com:vml" Requires="v">
-                <p:oleObj spid="_x0000_s2329" name="Equation" r:id="rId5" imgW="748975" imgH="203112" progId="Equation.3">
+                <p:oleObj spid="_x0000_s2335" name="Equation" r:id="rId5" imgW="748975" imgH="203112" progId="Equation.3">
                   <p:embed/>
                 </p:oleObj>
               </mc:Choice>
@@ -6773,7 +6773,7 @@
           <a:graphicData uri="http://schemas.openxmlformats.org/presentationml/2006/ole">
             <mc:AlternateContent xmlns:mc="http://schemas.openxmlformats.org/markup-compatibility/2006">
               <mc:Choice xmlns:v="urn:schemas-microsoft-com:vml" Requires="v">
-                <p:oleObj spid="_x0000_s2330" name="Equation" r:id="rId7" imgW="609336" imgH="215806" progId="Equation.3">
+                <p:oleObj spid="_x0000_s2336" name="Equation" r:id="rId7" imgW="609336" imgH="215806" progId="Equation.3">
                   <p:embed/>
                 </p:oleObj>
               </mc:Choice>
@@ -6843,7 +6843,7 @@
           <a:graphicData uri="http://schemas.openxmlformats.org/presentationml/2006/ole">
             <mc:AlternateContent xmlns:mc="http://schemas.openxmlformats.org/markup-compatibility/2006">
               <mc:Choice xmlns:v="urn:schemas-microsoft-com:vml" Requires="v">
-                <p:oleObj spid="_x0000_s2331" name="Equation" r:id="rId9" imgW="1269720" imgH="444240" progId="Equation.DSMT4">
+                <p:oleObj spid="_x0000_s2337" name="Equation" r:id="rId9" imgW="1269720" imgH="444240" progId="Equation.DSMT4">
                   <p:embed/>
                 </p:oleObj>
               </mc:Choice>
@@ -6907,7 +6907,7 @@
           <a:graphicData uri="http://schemas.openxmlformats.org/presentationml/2006/ole">
             <mc:AlternateContent xmlns:mc="http://schemas.openxmlformats.org/markup-compatibility/2006">
               <mc:Choice xmlns:v="urn:schemas-microsoft-com:vml" Requires="v">
-                <p:oleObj spid="_x0000_s2332" name="Equation" r:id="rId11" imgW="965160" imgH="241200" progId="Equation.DSMT4">
+                <p:oleObj spid="_x0000_s2338" name="Equation" r:id="rId11" imgW="965160" imgH="241200" progId="Equation.DSMT4">
                   <p:embed/>
                 </p:oleObj>
               </mc:Choice>
@@ -6954,7 +6954,7 @@
           <p:cNvPr id="5" name="Date Placeholder 4">
             <a:extLst>
               <a:ext uri="{FF2B5EF4-FFF2-40B4-BE49-F238E27FC236}">
-                <a16:creationId xmlns:a16="http://schemas.microsoft.com/office/drawing/2014/main" id="{65EAA0A6-A7C2-DD4A-A9D9-18F3FFEEB866}"/>
+                <a16:creationId xmlns:a16="http://schemas.microsoft.com/office/drawing/2014/main" xmlns="" id="{65EAA0A6-A7C2-DD4A-A9D9-18F3FFEEB866}"/>
               </a:ext>
             </a:extLst>
           </p:cNvPr>
@@ -6972,7 +6972,7 @@
           <a:p>
             <a:fld id="{C48AD8B0-570F-FD4A-8482-C6D35A227EED}" type="datetime1">
               <a:rPr lang="en-US" smtClean="0"/>
-              <a:t>1/2/18</a:t>
+              <a:t>1/30/18</a:t>
             </a:fld>
             <a:endParaRPr lang="en-US"/>
           </a:p>
@@ -6983,7 +6983,7 @@
           <p:cNvPr id="6" name="Slide Number Placeholder 5">
             <a:extLst>
               <a:ext uri="{FF2B5EF4-FFF2-40B4-BE49-F238E27FC236}">
-                <a16:creationId xmlns:a16="http://schemas.microsoft.com/office/drawing/2014/main" id="{D1C10CD3-5FF6-894E-8511-FA36CDC1B3B3}"/>
+                <a16:creationId xmlns:a16="http://schemas.microsoft.com/office/drawing/2014/main" xmlns="" id="{D1C10CD3-5FF6-894E-8511-FA36CDC1B3B3}"/>
               </a:ext>
             </a:extLst>
           </p:cNvPr>
@@ -7020,7 +7020,7 @@
   <p:timing>
     <p:tnLst>
       <p:par>
-        <p:cTn id="1" dur="indefinite" restart="never" nodeType="tmRoot">
+        <p:cTn xmlns:p14="http://schemas.microsoft.com/office/powerpoint/2010/main" id="1" dur="indefinite" restart="never" nodeType="tmRoot">
           <p:childTnLst>
             <p:seq concurrent="1" nextAc="seek">
               <p:cTn id="2" dur="indefinite" nodeType="mainSeq">
@@ -7272,14 +7272,14 @@
             <a:noFill/>
           </a:ln>
           <a:extLst>
-            <a:ext uri="{909E8E84-426E-40DD-AFC4-6F175D3DCCD1}">
+            <a:ext uri="{909E8E84-426E-40dd-AFC4-6F175D3DCCD1}">
               <a14:hiddenFill xmlns:a14="http://schemas.microsoft.com/office/drawing/2010/main">
                 <a:solidFill>
                   <a:srgbClr val="FFFFFF"/>
                 </a:solidFill>
               </a14:hiddenFill>
             </a:ext>
-            <a:ext uri="{91240B29-F687-4F45-9708-019B960494DF}">
+            <a:ext uri="{91240B29-F687-4f45-9708-019B960494DF}">
               <a14:hiddenLine xmlns:a14="http://schemas.microsoft.com/office/drawing/2010/main" w="9525" algn="ctr">
                 <a:solidFill>
                   <a:srgbClr val="000000"/>
@@ -7455,14 +7455,14 @@
             <a:noFill/>
           </a:ln>
           <a:extLst>
-            <a:ext uri="{909E8E84-426E-40DD-AFC4-6F175D3DCCD1}">
+            <a:ext uri="{909E8E84-426E-40dd-AFC4-6F175D3DCCD1}">
               <a14:hiddenFill xmlns:a14="http://schemas.microsoft.com/office/drawing/2010/main">
                 <a:solidFill>
                   <a:srgbClr val="FFFFFF"/>
                 </a:solidFill>
               </a14:hiddenFill>
             </a:ext>
-            <a:ext uri="{91240B29-F687-4F45-9708-019B960494DF}">
+            <a:ext uri="{91240B29-F687-4f45-9708-019B960494DF}">
               <a14:hiddenLine xmlns:a14="http://schemas.microsoft.com/office/drawing/2010/main" w="9525" algn="ctr">
                 <a:solidFill>
                   <a:srgbClr val="000000"/>
@@ -7505,14 +7505,14 @@
             <a:noFill/>
           </a:ln>
           <a:extLst>
-            <a:ext uri="{909E8E84-426E-40DD-AFC4-6F175D3DCCD1}">
+            <a:ext uri="{909E8E84-426E-40dd-AFC4-6F175D3DCCD1}">
               <a14:hiddenFill xmlns:a14="http://schemas.microsoft.com/office/drawing/2010/main">
                 <a:solidFill>
                   <a:srgbClr val="FFFFFF"/>
                 </a:solidFill>
               </a14:hiddenFill>
             </a:ext>
-            <a:ext uri="{91240B29-F687-4F45-9708-019B960494DF}">
+            <a:ext uri="{91240B29-F687-4f45-9708-019B960494DF}">
               <a14:hiddenLine xmlns:a14="http://schemas.microsoft.com/office/drawing/2010/main" w="9525" algn="ctr">
                 <a:solidFill>
                   <a:srgbClr val="000000"/>
@@ -7555,14 +7555,14 @@
             <a:noFill/>
           </a:ln>
           <a:extLst>
-            <a:ext uri="{909E8E84-426E-40DD-AFC4-6F175D3DCCD1}">
+            <a:ext uri="{909E8E84-426E-40dd-AFC4-6F175D3DCCD1}">
               <a14:hiddenFill xmlns:a14="http://schemas.microsoft.com/office/drawing/2010/main">
                 <a:solidFill>
                   <a:srgbClr val="FFFFFF"/>
                 </a:solidFill>
               </a14:hiddenFill>
             </a:ext>
-            <a:ext uri="{91240B29-F687-4F45-9708-019B960494DF}">
+            <a:ext uri="{91240B29-F687-4f45-9708-019B960494DF}">
               <a14:hiddenLine xmlns:a14="http://schemas.microsoft.com/office/drawing/2010/main" w="9525" algn="ctr">
                 <a:solidFill>
                   <a:srgbClr val="000000"/>
@@ -7728,14 +7728,14 @@
             <a:noFill/>
           </a:ln>
           <a:extLst>
-            <a:ext uri="{909E8E84-426E-40DD-AFC4-6F175D3DCCD1}">
+            <a:ext uri="{909E8E84-426E-40dd-AFC4-6F175D3DCCD1}">
               <a14:hiddenFill xmlns:a14="http://schemas.microsoft.com/office/drawing/2010/main">
                 <a:solidFill>
                   <a:srgbClr val="FFFFFF"/>
                 </a:solidFill>
               </a14:hiddenFill>
             </a:ext>
-            <a:ext uri="{91240B29-F687-4F45-9708-019B960494DF}">
+            <a:ext uri="{91240B29-F687-4f45-9708-019B960494DF}">
               <a14:hiddenLine xmlns:a14="http://schemas.microsoft.com/office/drawing/2010/main" w="9525" algn="ctr">
                 <a:solidFill>
                   <a:srgbClr val="000000"/>
@@ -7778,14 +7778,14 @@
             <a:noFill/>
           </a:ln>
           <a:extLst>
-            <a:ext uri="{909E8E84-426E-40DD-AFC4-6F175D3DCCD1}">
+            <a:ext uri="{909E8E84-426E-40dd-AFC4-6F175D3DCCD1}">
               <a14:hiddenFill xmlns:a14="http://schemas.microsoft.com/office/drawing/2010/main">
                 <a:solidFill>
                   <a:srgbClr val="FFFFFF"/>
                 </a:solidFill>
               </a14:hiddenFill>
             </a:ext>
-            <a:ext uri="{91240B29-F687-4F45-9708-019B960494DF}">
+            <a:ext uri="{91240B29-F687-4f45-9708-019B960494DF}">
               <a14:hiddenLine xmlns:a14="http://schemas.microsoft.com/office/drawing/2010/main" w="9525" algn="ctr">
                 <a:solidFill>
                   <a:srgbClr val="000000"/>
@@ -7828,14 +7828,14 @@
             <a:noFill/>
           </a:ln>
           <a:extLst>
-            <a:ext uri="{909E8E84-426E-40DD-AFC4-6F175D3DCCD1}">
+            <a:ext uri="{909E8E84-426E-40dd-AFC4-6F175D3DCCD1}">
               <a14:hiddenFill xmlns:a14="http://schemas.microsoft.com/office/drawing/2010/main">
                 <a:solidFill>
                   <a:srgbClr val="FFFFFF"/>
                 </a:solidFill>
               </a14:hiddenFill>
             </a:ext>
-            <a:ext uri="{91240B29-F687-4F45-9708-019B960494DF}">
+            <a:ext uri="{91240B29-F687-4f45-9708-019B960494DF}">
               <a14:hiddenLine xmlns:a14="http://schemas.microsoft.com/office/drawing/2010/main" w="9525" algn="ctr">
                 <a:solidFill>
                   <a:srgbClr val="000000"/>
@@ -7879,7 +7879,7 @@
           <a:graphicData uri="http://schemas.openxmlformats.org/presentationml/2006/ole">
             <mc:AlternateContent xmlns:mc="http://schemas.openxmlformats.org/markup-compatibility/2006">
               <mc:Choice xmlns:v="urn:schemas-microsoft-com:vml" Requires="v">
-                <p:oleObj spid="_x0000_s3114" name="Bitmap Image" r:id="rId4" imgW="6047619" imgH="3371429" progId="Paint.Picture">
+                <p:oleObj spid="_x0000_s3116" name="Bitmap Image" r:id="rId4" imgW="6047619" imgH="3371429" progId="Paint.Picture">
                   <p:embed/>
                 </p:oleObj>
               </mc:Choice>
@@ -7921,14 +7921,14 @@
                       </a:ln>
                       <a:effectLst/>
                       <a:extLst>
-                        <a:ext uri="{909E8E84-426E-40DD-AFC4-6F175D3DCCD1}">
+                        <a:ext uri="{909E8E84-426E-40dd-AFC4-6F175D3DCCD1}">
                           <a14:hiddenFill xmlns:a14="http://schemas.microsoft.com/office/drawing/2010/main">
                             <a:solidFill>
                               <a:schemeClr val="accent1"/>
                             </a:solidFill>
                           </a14:hiddenFill>
                         </a:ext>
-                        <a:ext uri="{91240B29-F687-4F45-9708-019B960494DF}">
+                        <a:ext uri="{91240B29-F687-4f45-9708-019B960494DF}">
                           <a14:hiddenLine xmlns:a14="http://schemas.microsoft.com/office/drawing/2010/main" w="9525" algn="ctr">
                             <a:solidFill>
                               <a:schemeClr val="tx1"/>
@@ -7938,7 +7938,7 @@
                             <a:tailEnd/>
                           </a14:hiddenLine>
                         </a:ext>
-                        <a:ext uri="{AF507438-7753-43E0-B8FC-AC1667EBCBE1}">
+                        <a:ext uri="{AF507438-7753-43e0-B8FC-AC1667EBCBE1}">
                           <a14:hiddenEffects xmlns:a14="http://schemas.microsoft.com/office/drawing/2010/main">
                             <a:effectLst>
                               <a:outerShdw dist="35921" dir="2700000" algn="ctr" rotWithShape="0">
@@ -7961,7 +7961,7 @@
           <p:cNvPr id="2" name="Date Placeholder 1">
             <a:extLst>
               <a:ext uri="{FF2B5EF4-FFF2-40B4-BE49-F238E27FC236}">
-                <a16:creationId xmlns:a16="http://schemas.microsoft.com/office/drawing/2014/main" id="{FAB87860-7ABE-9746-B438-A91FC904C2E1}"/>
+                <a16:creationId xmlns:a16="http://schemas.microsoft.com/office/drawing/2014/main" xmlns="" id="{FAB87860-7ABE-9746-B438-A91FC904C2E1}"/>
               </a:ext>
             </a:extLst>
           </p:cNvPr>
@@ -7979,7 +7979,7 @@
           <a:p>
             <a:fld id="{D4B0FB1D-94B3-0044-A9F3-B610CF115FA9}" type="datetime1">
               <a:rPr lang="en-US" smtClean="0"/>
-              <a:t>1/2/18</a:t>
+              <a:t>1/30/18</a:t>
             </a:fld>
             <a:endParaRPr lang="en-US"/>
           </a:p>
@@ -7990,7 +7990,7 @@
           <p:cNvPr id="3" name="Slide Number Placeholder 2">
             <a:extLst>
               <a:ext uri="{FF2B5EF4-FFF2-40B4-BE49-F238E27FC236}">
-                <a16:creationId xmlns:a16="http://schemas.microsoft.com/office/drawing/2014/main" id="{29EC6F43-DECA-9147-BECE-1347761ECF9F}"/>
+                <a16:creationId xmlns:a16="http://schemas.microsoft.com/office/drawing/2014/main" xmlns="" id="{29EC6F43-DECA-9147-BECE-1347761ECF9F}"/>
               </a:ext>
             </a:extLst>
           </p:cNvPr>
@@ -8024,11 +8024,11 @@
   <p:clrMapOvr>
     <a:masterClrMapping/>
   </p:clrMapOvr>
-  <p:transition/>
+  <p:transition xmlns:p14="http://schemas.microsoft.com/office/powerpoint/2010/main"/>
   <p:timing>
     <p:tnLst>
       <p:par>
-        <p:cTn id="1" dur="indefinite" restart="never" nodeType="tmRoot">
+        <p:cTn xmlns:p14="http://schemas.microsoft.com/office/powerpoint/2010/main" id="1" dur="indefinite" restart="never" nodeType="tmRoot">
           <p:childTnLst>
             <p:seq concurrent="1" nextAc="seek">
               <p:cTn id="2" dur="indefinite" nodeType="mainSeq">
@@ -8392,7 +8392,7 @@
           <p:cNvPr id="4" name="Date Placeholder 3">
             <a:extLst>
               <a:ext uri="{FF2B5EF4-FFF2-40B4-BE49-F238E27FC236}">
-                <a16:creationId xmlns:a16="http://schemas.microsoft.com/office/drawing/2014/main" id="{290B3EAD-A8D0-3449-8EB2-677FFB2D669B}"/>
+                <a16:creationId xmlns:a16="http://schemas.microsoft.com/office/drawing/2014/main" xmlns="" id="{290B3EAD-A8D0-3449-8EB2-677FFB2D669B}"/>
               </a:ext>
             </a:extLst>
           </p:cNvPr>
@@ -8410,7 +8410,7 @@
           <a:p>
             <a:fld id="{9C0289AC-AD1B-134C-941B-EDB1622EEFAA}" type="datetime1">
               <a:rPr lang="en-US" smtClean="0"/>
-              <a:t>1/2/18</a:t>
+              <a:t>1/30/18</a:t>
             </a:fld>
             <a:endParaRPr lang="en-US"/>
           </a:p>
@@ -8421,7 +8421,7 @@
           <p:cNvPr id="5" name="Slide Number Placeholder 4">
             <a:extLst>
               <a:ext uri="{FF2B5EF4-FFF2-40B4-BE49-F238E27FC236}">
-                <a16:creationId xmlns:a16="http://schemas.microsoft.com/office/drawing/2014/main" id="{B5C461DA-092D-5C45-B289-D3546BBBB1F1}"/>
+                <a16:creationId xmlns:a16="http://schemas.microsoft.com/office/drawing/2014/main" xmlns="" id="{B5C461DA-092D-5C45-B289-D3546BBBB1F1}"/>
               </a:ext>
             </a:extLst>
           </p:cNvPr>
@@ -8638,14 +8638,14 @@
             <a:noFill/>
           </a:ln>
           <a:extLst>
-            <a:ext uri="{909E8E84-426E-40DD-AFC4-6F175D3DCCD1}">
+            <a:ext uri="{909E8E84-426E-40dd-AFC4-6F175D3DCCD1}">
               <a14:hiddenFill xmlns:a14="http://schemas.microsoft.com/office/drawing/2010/main">
                 <a:solidFill>
                   <a:srgbClr val="FFFFFF"/>
                 </a:solidFill>
               </a14:hiddenFill>
             </a:ext>
-            <a:ext uri="{91240B29-F687-4F45-9708-019B960494DF}">
+            <a:ext uri="{91240B29-F687-4f45-9708-019B960494DF}">
               <a14:hiddenLine xmlns:a14="http://schemas.microsoft.com/office/drawing/2010/main" w="9525" algn="ctr">
                 <a:solidFill>
                   <a:srgbClr val="000000"/>
@@ -8821,14 +8821,14 @@
             <a:noFill/>
           </a:ln>
           <a:extLst>
-            <a:ext uri="{909E8E84-426E-40DD-AFC4-6F175D3DCCD1}">
+            <a:ext uri="{909E8E84-426E-40dd-AFC4-6F175D3DCCD1}">
               <a14:hiddenFill xmlns:a14="http://schemas.microsoft.com/office/drawing/2010/main">
                 <a:solidFill>
                   <a:srgbClr val="FFFFFF"/>
                 </a:solidFill>
               </a14:hiddenFill>
             </a:ext>
-            <a:ext uri="{91240B29-F687-4F45-9708-019B960494DF}">
+            <a:ext uri="{91240B29-F687-4f45-9708-019B960494DF}">
               <a14:hiddenLine xmlns:a14="http://schemas.microsoft.com/office/drawing/2010/main" w="9525" algn="ctr">
                 <a:solidFill>
                   <a:srgbClr val="000000"/>
@@ -8871,14 +8871,14 @@
             <a:noFill/>
           </a:ln>
           <a:extLst>
-            <a:ext uri="{909E8E84-426E-40DD-AFC4-6F175D3DCCD1}">
+            <a:ext uri="{909E8E84-426E-40dd-AFC4-6F175D3DCCD1}">
               <a14:hiddenFill xmlns:a14="http://schemas.microsoft.com/office/drawing/2010/main">
                 <a:solidFill>
                   <a:srgbClr val="FFFFFF"/>
                 </a:solidFill>
               </a14:hiddenFill>
             </a:ext>
-            <a:ext uri="{91240B29-F687-4F45-9708-019B960494DF}">
+            <a:ext uri="{91240B29-F687-4f45-9708-019B960494DF}">
               <a14:hiddenLine xmlns:a14="http://schemas.microsoft.com/office/drawing/2010/main" w="9525" algn="ctr">
                 <a:solidFill>
                   <a:srgbClr val="000000"/>
@@ -8921,14 +8921,14 @@
             <a:noFill/>
           </a:ln>
           <a:extLst>
-            <a:ext uri="{909E8E84-426E-40DD-AFC4-6F175D3DCCD1}">
+            <a:ext uri="{909E8E84-426E-40dd-AFC4-6F175D3DCCD1}">
               <a14:hiddenFill xmlns:a14="http://schemas.microsoft.com/office/drawing/2010/main">
                 <a:solidFill>
                   <a:srgbClr val="FFFFFF"/>
                 </a:solidFill>
               </a14:hiddenFill>
             </a:ext>
-            <a:ext uri="{91240B29-F687-4F45-9708-019B960494DF}">
+            <a:ext uri="{91240B29-F687-4f45-9708-019B960494DF}">
               <a14:hiddenLine xmlns:a14="http://schemas.microsoft.com/office/drawing/2010/main" w="9525" algn="ctr">
                 <a:solidFill>
                   <a:srgbClr val="000000"/>
@@ -9094,14 +9094,14 @@
             <a:noFill/>
           </a:ln>
           <a:extLst>
-            <a:ext uri="{909E8E84-426E-40DD-AFC4-6F175D3DCCD1}">
+            <a:ext uri="{909E8E84-426E-40dd-AFC4-6F175D3DCCD1}">
               <a14:hiddenFill xmlns:a14="http://schemas.microsoft.com/office/drawing/2010/main">
                 <a:solidFill>
                   <a:srgbClr val="FFFFFF"/>
                 </a:solidFill>
               </a14:hiddenFill>
             </a:ext>
-            <a:ext uri="{91240B29-F687-4F45-9708-019B960494DF}">
+            <a:ext uri="{91240B29-F687-4f45-9708-019B960494DF}">
               <a14:hiddenLine xmlns:a14="http://schemas.microsoft.com/office/drawing/2010/main" w="9525" algn="ctr">
                 <a:solidFill>
                   <a:srgbClr val="000000"/>
@@ -9144,14 +9144,14 @@
             <a:noFill/>
           </a:ln>
           <a:extLst>
-            <a:ext uri="{909E8E84-426E-40DD-AFC4-6F175D3DCCD1}">
+            <a:ext uri="{909E8E84-426E-40dd-AFC4-6F175D3DCCD1}">
               <a14:hiddenFill xmlns:a14="http://schemas.microsoft.com/office/drawing/2010/main">
                 <a:solidFill>
                   <a:srgbClr val="FFFFFF"/>
                 </a:solidFill>
               </a14:hiddenFill>
             </a:ext>
-            <a:ext uri="{91240B29-F687-4F45-9708-019B960494DF}">
+            <a:ext uri="{91240B29-F687-4f45-9708-019B960494DF}">
               <a14:hiddenLine xmlns:a14="http://schemas.microsoft.com/office/drawing/2010/main" w="9525" algn="ctr">
                 <a:solidFill>
                   <a:srgbClr val="000000"/>
@@ -9194,14 +9194,14 @@
             <a:noFill/>
           </a:ln>
           <a:extLst>
-            <a:ext uri="{909E8E84-426E-40DD-AFC4-6F175D3DCCD1}">
+            <a:ext uri="{909E8E84-426E-40dd-AFC4-6F175D3DCCD1}">
               <a14:hiddenFill xmlns:a14="http://schemas.microsoft.com/office/drawing/2010/main">
                 <a:solidFill>
                   <a:srgbClr val="FFFFFF"/>
                 </a:solidFill>
               </a14:hiddenFill>
             </a:ext>
-            <a:ext uri="{91240B29-F687-4F45-9708-019B960494DF}">
+            <a:ext uri="{91240B29-F687-4f45-9708-019B960494DF}">
               <a14:hiddenLine xmlns:a14="http://schemas.microsoft.com/office/drawing/2010/main" w="9525" algn="ctr">
                 <a:solidFill>
                   <a:srgbClr val="000000"/>
@@ -9239,7 +9239,7 @@
           <a:graphicData uri="http://schemas.openxmlformats.org/presentationml/2006/ole">
             <mc:AlternateContent xmlns:mc="http://schemas.openxmlformats.org/markup-compatibility/2006">
               <mc:Choice xmlns:v="urn:schemas-microsoft-com:vml" Requires="v">
-                <p:oleObj spid="_x0000_s4134" name="Bitmap Image" r:id="rId4" imgW="3067478" imgH="1380952" progId="Paint.Picture">
+                <p:oleObj spid="_x0000_s4136" name="Bitmap Image" r:id="rId4" imgW="3067478" imgH="1380952" progId="Paint.Picture">
                   <p:embed/>
                 </p:oleObj>
               </mc:Choice>
@@ -9281,14 +9281,14 @@
                       </a:ln>
                       <a:effectLst/>
                       <a:extLst>
-                        <a:ext uri="{909E8E84-426E-40DD-AFC4-6F175D3DCCD1}">
+                        <a:ext uri="{909E8E84-426E-40dd-AFC4-6F175D3DCCD1}">
                           <a14:hiddenFill xmlns:a14="http://schemas.microsoft.com/office/drawing/2010/main">
                             <a:solidFill>
                               <a:schemeClr val="accent1"/>
                             </a:solidFill>
                           </a14:hiddenFill>
                         </a:ext>
-                        <a:ext uri="{91240B29-F687-4F45-9708-019B960494DF}">
+                        <a:ext uri="{91240B29-F687-4f45-9708-019B960494DF}">
                           <a14:hiddenLine xmlns:a14="http://schemas.microsoft.com/office/drawing/2010/main" w="9525" algn="ctr">
                             <a:solidFill>
                               <a:schemeClr val="tx1"/>
@@ -9298,7 +9298,7 @@
                             <a:tailEnd/>
                           </a14:hiddenLine>
                         </a:ext>
-                        <a:ext uri="{AF507438-7753-43E0-B8FC-AC1667EBCBE1}">
+                        <a:ext uri="{AF507438-7753-43e0-B8FC-AC1667EBCBE1}">
                           <a14:hiddenEffects xmlns:a14="http://schemas.microsoft.com/office/drawing/2010/main">
                             <a:effectLst>
                               <a:outerShdw dist="35921" dir="2700000" algn="ctr" rotWithShape="0">
@@ -9321,7 +9321,7 @@
           <p:cNvPr id="2" name="Date Placeholder 1">
             <a:extLst>
               <a:ext uri="{FF2B5EF4-FFF2-40B4-BE49-F238E27FC236}">
-                <a16:creationId xmlns:a16="http://schemas.microsoft.com/office/drawing/2014/main" id="{D617C41B-A1B0-4441-AE4B-7BC64810B754}"/>
+                <a16:creationId xmlns:a16="http://schemas.microsoft.com/office/drawing/2014/main" xmlns="" id="{D617C41B-A1B0-4441-AE4B-7BC64810B754}"/>
               </a:ext>
             </a:extLst>
           </p:cNvPr>
@@ -9339,7 +9339,7 @@
           <a:p>
             <a:fld id="{D9F49DE4-A6D5-CC4D-B884-67476C5DF64B}" type="datetime1">
               <a:rPr lang="en-US" smtClean="0"/>
-              <a:t>1/2/18</a:t>
+              <a:t>1/30/18</a:t>
             </a:fld>
             <a:endParaRPr lang="en-US"/>
           </a:p>
@@ -9350,7 +9350,7 @@
           <p:cNvPr id="3" name="Slide Number Placeholder 2">
             <a:extLst>
               <a:ext uri="{FF2B5EF4-FFF2-40B4-BE49-F238E27FC236}">
-                <a16:creationId xmlns:a16="http://schemas.microsoft.com/office/drawing/2014/main" id="{DE26AF36-7972-844A-BD1B-3CFF051529B0}"/>
+                <a16:creationId xmlns:a16="http://schemas.microsoft.com/office/drawing/2014/main" xmlns="" id="{DE26AF36-7972-844A-BD1B-3CFF051529B0}"/>
               </a:ext>
             </a:extLst>
           </p:cNvPr>
@@ -9384,11 +9384,11 @@
   <p:clrMapOvr>
     <a:masterClrMapping/>
   </p:clrMapOvr>
-  <p:transition/>
+  <p:transition xmlns:p14="http://schemas.microsoft.com/office/powerpoint/2010/main"/>
   <p:timing>
     <p:tnLst>
       <p:par>
-        <p:cTn id="1" dur="indefinite" restart="never" nodeType="tmRoot">
+        <p:cTn xmlns:p14="http://schemas.microsoft.com/office/powerpoint/2010/main" id="1" dur="indefinite" restart="never" nodeType="tmRoot">
           <p:childTnLst>
             <p:seq concurrent="1" nextAc="seek">
               <p:cTn id="2" dur="indefinite" nodeType="mainSeq">
@@ -9895,14 +9895,14 @@
             <a:noFill/>
           </a:ln>
           <a:extLst>
-            <a:ext uri="{909E8E84-426E-40DD-AFC4-6F175D3DCCD1}">
+            <a:ext uri="{909E8E84-426E-40dd-AFC4-6F175D3DCCD1}">
               <a14:hiddenFill xmlns:a14="http://schemas.microsoft.com/office/drawing/2010/main">
                 <a:solidFill>
                   <a:srgbClr val="FFFFFF"/>
                 </a:solidFill>
               </a14:hiddenFill>
             </a:ext>
-            <a:ext uri="{91240B29-F687-4F45-9708-019B960494DF}">
+            <a:ext uri="{91240B29-F687-4f45-9708-019B960494DF}">
               <a14:hiddenLine xmlns:a14="http://schemas.microsoft.com/office/drawing/2010/main" w="9525" algn="ctr">
                 <a:solidFill>
                   <a:srgbClr val="000000"/>
@@ -10078,14 +10078,14 @@
             <a:noFill/>
           </a:ln>
           <a:extLst>
-            <a:ext uri="{909E8E84-426E-40DD-AFC4-6F175D3DCCD1}">
+            <a:ext uri="{909E8E84-426E-40dd-AFC4-6F175D3DCCD1}">
               <a14:hiddenFill xmlns:a14="http://schemas.microsoft.com/office/drawing/2010/main">
                 <a:solidFill>
                   <a:srgbClr val="FFFFFF"/>
                 </a:solidFill>
               </a14:hiddenFill>
             </a:ext>
-            <a:ext uri="{91240B29-F687-4F45-9708-019B960494DF}">
+            <a:ext uri="{91240B29-F687-4f45-9708-019B960494DF}">
               <a14:hiddenLine xmlns:a14="http://schemas.microsoft.com/office/drawing/2010/main" w="9525" algn="ctr">
                 <a:solidFill>
                   <a:srgbClr val="000000"/>
@@ -10128,14 +10128,14 @@
             <a:noFill/>
           </a:ln>
           <a:extLst>
-            <a:ext uri="{909E8E84-426E-40DD-AFC4-6F175D3DCCD1}">
+            <a:ext uri="{909E8E84-426E-40dd-AFC4-6F175D3DCCD1}">
               <a14:hiddenFill xmlns:a14="http://schemas.microsoft.com/office/drawing/2010/main">
                 <a:solidFill>
                   <a:srgbClr val="FFFFFF"/>
                 </a:solidFill>
               </a14:hiddenFill>
             </a:ext>
-            <a:ext uri="{91240B29-F687-4F45-9708-019B960494DF}">
+            <a:ext uri="{91240B29-F687-4f45-9708-019B960494DF}">
               <a14:hiddenLine xmlns:a14="http://schemas.microsoft.com/office/drawing/2010/main" w="9525" algn="ctr">
                 <a:solidFill>
                   <a:srgbClr val="000000"/>
@@ -10178,14 +10178,14 @@
             <a:noFill/>
           </a:ln>
           <a:extLst>
-            <a:ext uri="{909E8E84-426E-40DD-AFC4-6F175D3DCCD1}">
+            <a:ext uri="{909E8E84-426E-40dd-AFC4-6F175D3DCCD1}">
               <a14:hiddenFill xmlns:a14="http://schemas.microsoft.com/office/drawing/2010/main">
                 <a:solidFill>
                   <a:srgbClr val="FFFFFF"/>
                 </a:solidFill>
               </a14:hiddenFill>
             </a:ext>
-            <a:ext uri="{91240B29-F687-4F45-9708-019B960494DF}">
+            <a:ext uri="{91240B29-F687-4f45-9708-019B960494DF}">
               <a14:hiddenLine xmlns:a14="http://schemas.microsoft.com/office/drawing/2010/main" w="9525" algn="ctr">
                 <a:solidFill>
                   <a:srgbClr val="000000"/>
@@ -10351,14 +10351,14 @@
             <a:noFill/>
           </a:ln>
           <a:extLst>
-            <a:ext uri="{909E8E84-426E-40DD-AFC4-6F175D3DCCD1}">
+            <a:ext uri="{909E8E84-426E-40dd-AFC4-6F175D3DCCD1}">
               <a14:hiddenFill xmlns:a14="http://schemas.microsoft.com/office/drawing/2010/main">
                 <a:solidFill>
                   <a:srgbClr val="FFFFFF"/>
                 </a:solidFill>
               </a14:hiddenFill>
             </a:ext>
-            <a:ext uri="{91240B29-F687-4F45-9708-019B960494DF}">
+            <a:ext uri="{91240B29-F687-4f45-9708-019B960494DF}">
               <a14:hiddenLine xmlns:a14="http://schemas.microsoft.com/office/drawing/2010/main" w="9525" algn="ctr">
                 <a:solidFill>
                   <a:srgbClr val="000000"/>
@@ -10401,14 +10401,14 @@
             <a:noFill/>
           </a:ln>
           <a:extLst>
-            <a:ext uri="{909E8E84-426E-40DD-AFC4-6F175D3DCCD1}">
+            <a:ext uri="{909E8E84-426E-40dd-AFC4-6F175D3DCCD1}">
               <a14:hiddenFill xmlns:a14="http://schemas.microsoft.com/office/drawing/2010/main">
                 <a:solidFill>
                   <a:srgbClr val="FFFFFF"/>
                 </a:solidFill>
               </a14:hiddenFill>
             </a:ext>
-            <a:ext uri="{91240B29-F687-4F45-9708-019B960494DF}">
+            <a:ext uri="{91240B29-F687-4f45-9708-019B960494DF}">
               <a14:hiddenLine xmlns:a14="http://schemas.microsoft.com/office/drawing/2010/main" w="9525" algn="ctr">
                 <a:solidFill>
                   <a:srgbClr val="000000"/>
@@ -10451,14 +10451,14 @@
             <a:noFill/>
           </a:ln>
           <a:extLst>
-            <a:ext uri="{909E8E84-426E-40DD-AFC4-6F175D3DCCD1}">
+            <a:ext uri="{909E8E84-426E-40dd-AFC4-6F175D3DCCD1}">
               <a14:hiddenFill xmlns:a14="http://schemas.microsoft.com/office/drawing/2010/main">
                 <a:solidFill>
                   <a:srgbClr val="FFFFFF"/>
                 </a:solidFill>
               </a14:hiddenFill>
             </a:ext>
-            <a:ext uri="{91240B29-F687-4F45-9708-019B960494DF}">
+            <a:ext uri="{91240B29-F687-4f45-9708-019B960494DF}">
               <a14:hiddenLine xmlns:a14="http://schemas.microsoft.com/office/drawing/2010/main" w="9525" algn="ctr">
                 <a:solidFill>
                   <a:srgbClr val="000000"/>
@@ -10501,14 +10501,14 @@
             <a:noFill/>
           </a:ln>
           <a:extLst>
-            <a:ext uri="{909E8E84-426E-40DD-AFC4-6F175D3DCCD1}">
+            <a:ext uri="{909E8E84-426E-40dd-AFC4-6F175D3DCCD1}">
               <a14:hiddenFill xmlns:a14="http://schemas.microsoft.com/office/drawing/2010/main">
                 <a:solidFill>
                   <a:srgbClr val="FFFFFF"/>
                 </a:solidFill>
               </a14:hiddenFill>
             </a:ext>
-            <a:ext uri="{91240B29-F687-4F45-9708-019B960494DF}">
+            <a:ext uri="{91240B29-F687-4f45-9708-019B960494DF}">
               <a14:hiddenLine xmlns:a14="http://schemas.microsoft.com/office/drawing/2010/main" w="9525" algn="ctr">
                 <a:solidFill>
                   <a:srgbClr val="000000"/>
@@ -10535,7 +10535,7 @@
           <p:cNvPr id="2" name="Date Placeholder 1">
             <a:extLst>
               <a:ext uri="{FF2B5EF4-FFF2-40B4-BE49-F238E27FC236}">
-                <a16:creationId xmlns:a16="http://schemas.microsoft.com/office/drawing/2014/main" id="{9CC2BE31-2718-634D-8C9D-9E40E2DCD0D4}"/>
+                <a16:creationId xmlns:a16="http://schemas.microsoft.com/office/drawing/2014/main" xmlns="" id="{9CC2BE31-2718-634D-8C9D-9E40E2DCD0D4}"/>
               </a:ext>
             </a:extLst>
           </p:cNvPr>
@@ -10553,7 +10553,7 @@
           <a:p>
             <a:fld id="{CD7AB003-90BC-2644-9C3A-2BD01B543757}" type="datetime1">
               <a:rPr lang="en-US" smtClean="0"/>
-              <a:t>1/2/18</a:t>
+              <a:t>1/30/18</a:t>
             </a:fld>
             <a:endParaRPr lang="en-US"/>
           </a:p>
@@ -10564,7 +10564,7 @@
           <p:cNvPr id="3" name="Slide Number Placeholder 2">
             <a:extLst>
               <a:ext uri="{FF2B5EF4-FFF2-40B4-BE49-F238E27FC236}">
-                <a16:creationId xmlns:a16="http://schemas.microsoft.com/office/drawing/2014/main" id="{41CA4B3F-433E-4A4E-909B-4048F0CD775A}"/>
+                <a16:creationId xmlns:a16="http://schemas.microsoft.com/office/drawing/2014/main" xmlns="" id="{41CA4B3F-433E-4A4E-909B-4048F0CD775A}"/>
               </a:ext>
             </a:extLst>
           </p:cNvPr>
@@ -10598,7 +10598,7 @@
   <p:clrMapOvr>
     <a:masterClrMapping/>
   </p:clrMapOvr>
-  <p:transition/>
+  <p:transition xmlns:p14="http://schemas.microsoft.com/office/powerpoint/2010/main"/>
 </p:sld>
 </file>
 
@@ -10739,14 +10739,14 @@
             <a:noFill/>
           </a:ln>
           <a:extLst>
-            <a:ext uri="{909E8E84-426E-40DD-AFC4-6F175D3DCCD1}">
+            <a:ext uri="{909E8E84-426E-40dd-AFC4-6F175D3DCCD1}">
               <a14:hiddenFill xmlns:a14="http://schemas.microsoft.com/office/drawing/2010/main">
                 <a:solidFill>
                   <a:srgbClr val="FFFFFF"/>
                 </a:solidFill>
               </a14:hiddenFill>
             </a:ext>
-            <a:ext uri="{91240B29-F687-4F45-9708-019B960494DF}">
+            <a:ext uri="{91240B29-F687-4f45-9708-019B960494DF}">
               <a14:hiddenLine xmlns:a14="http://schemas.microsoft.com/office/drawing/2010/main" w="9525" algn="ctr">
                 <a:solidFill>
                   <a:srgbClr val="000000"/>
@@ -10933,14 +10933,14 @@
             <a:noFill/>
           </a:ln>
           <a:extLst>
-            <a:ext uri="{909E8E84-426E-40DD-AFC4-6F175D3DCCD1}">
+            <a:ext uri="{909E8E84-426E-40dd-AFC4-6F175D3DCCD1}">
               <a14:hiddenFill xmlns:a14="http://schemas.microsoft.com/office/drawing/2010/main">
                 <a:solidFill>
                   <a:srgbClr val="FFFFFF"/>
                 </a:solidFill>
               </a14:hiddenFill>
             </a:ext>
-            <a:ext uri="{91240B29-F687-4F45-9708-019B960494DF}">
+            <a:ext uri="{91240B29-F687-4f45-9708-019B960494DF}">
               <a14:hiddenLine xmlns:a14="http://schemas.microsoft.com/office/drawing/2010/main" w="9525" algn="ctr">
                 <a:solidFill>
                   <a:srgbClr val="000000"/>
@@ -10983,14 +10983,14 @@
             <a:noFill/>
           </a:ln>
           <a:extLst>
-            <a:ext uri="{909E8E84-426E-40DD-AFC4-6F175D3DCCD1}">
+            <a:ext uri="{909E8E84-426E-40dd-AFC4-6F175D3DCCD1}">
               <a14:hiddenFill xmlns:a14="http://schemas.microsoft.com/office/drawing/2010/main">
                 <a:solidFill>
                   <a:srgbClr val="FFFFFF"/>
                 </a:solidFill>
               </a14:hiddenFill>
             </a:ext>
-            <a:ext uri="{91240B29-F687-4F45-9708-019B960494DF}">
+            <a:ext uri="{91240B29-F687-4f45-9708-019B960494DF}">
               <a14:hiddenLine xmlns:a14="http://schemas.microsoft.com/office/drawing/2010/main" w="9525" algn="ctr">
                 <a:solidFill>
                   <a:srgbClr val="000000"/>
@@ -11033,14 +11033,14 @@
             <a:noFill/>
           </a:ln>
           <a:extLst>
-            <a:ext uri="{909E8E84-426E-40DD-AFC4-6F175D3DCCD1}">
+            <a:ext uri="{909E8E84-426E-40dd-AFC4-6F175D3DCCD1}">
               <a14:hiddenFill xmlns:a14="http://schemas.microsoft.com/office/drawing/2010/main">
                 <a:solidFill>
                   <a:srgbClr val="FFFFFF"/>
                 </a:solidFill>
               </a14:hiddenFill>
             </a:ext>
-            <a:ext uri="{91240B29-F687-4F45-9708-019B960494DF}">
+            <a:ext uri="{91240B29-F687-4f45-9708-019B960494DF}">
               <a14:hiddenLine xmlns:a14="http://schemas.microsoft.com/office/drawing/2010/main" w="9525" algn="ctr">
                 <a:solidFill>
                   <a:srgbClr val="000000"/>
@@ -11206,14 +11206,14 @@
             <a:noFill/>
           </a:ln>
           <a:extLst>
-            <a:ext uri="{909E8E84-426E-40DD-AFC4-6F175D3DCCD1}">
+            <a:ext uri="{909E8E84-426E-40dd-AFC4-6F175D3DCCD1}">
               <a14:hiddenFill xmlns:a14="http://schemas.microsoft.com/office/drawing/2010/main">
                 <a:solidFill>
                   <a:srgbClr val="FFFFFF"/>
                 </a:solidFill>
               </a14:hiddenFill>
             </a:ext>
-            <a:ext uri="{91240B29-F687-4F45-9708-019B960494DF}">
+            <a:ext uri="{91240B29-F687-4f45-9708-019B960494DF}">
               <a14:hiddenLine xmlns:a14="http://schemas.microsoft.com/office/drawing/2010/main" w="9525" algn="ctr">
                 <a:solidFill>
                   <a:srgbClr val="000000"/>
@@ -11256,14 +11256,14 @@
             <a:noFill/>
           </a:ln>
           <a:extLst>
-            <a:ext uri="{909E8E84-426E-40DD-AFC4-6F175D3DCCD1}">
+            <a:ext uri="{909E8E84-426E-40dd-AFC4-6F175D3DCCD1}">
               <a14:hiddenFill xmlns:a14="http://schemas.microsoft.com/office/drawing/2010/main">
                 <a:solidFill>
                   <a:srgbClr val="FFFFFF"/>
                 </a:solidFill>
               </a14:hiddenFill>
             </a:ext>
-            <a:ext uri="{91240B29-F687-4F45-9708-019B960494DF}">
+            <a:ext uri="{91240B29-F687-4f45-9708-019B960494DF}">
               <a14:hiddenLine xmlns:a14="http://schemas.microsoft.com/office/drawing/2010/main" w="9525" algn="ctr">
                 <a:solidFill>
                   <a:srgbClr val="000000"/>
@@ -11306,14 +11306,14 @@
             <a:noFill/>
           </a:ln>
           <a:extLst>
-            <a:ext uri="{909E8E84-426E-40DD-AFC4-6F175D3DCCD1}">
+            <a:ext uri="{909E8E84-426E-40dd-AFC4-6F175D3DCCD1}">
               <a14:hiddenFill xmlns:a14="http://schemas.microsoft.com/office/drawing/2010/main">
                 <a:solidFill>
                   <a:srgbClr val="FFFFFF"/>
                 </a:solidFill>
               </a14:hiddenFill>
             </a:ext>
-            <a:ext uri="{91240B29-F687-4F45-9708-019B960494DF}">
+            <a:ext uri="{91240B29-F687-4f45-9708-019B960494DF}">
               <a14:hiddenLine xmlns:a14="http://schemas.microsoft.com/office/drawing/2010/main" w="9525" algn="ctr">
                 <a:solidFill>
                   <a:srgbClr val="000000"/>
@@ -11356,14 +11356,14 @@
             <a:noFill/>
           </a:ln>
           <a:extLst>
-            <a:ext uri="{909E8E84-426E-40DD-AFC4-6F175D3DCCD1}">
+            <a:ext uri="{909E8E84-426E-40dd-AFC4-6F175D3DCCD1}">
               <a14:hiddenFill xmlns:a14="http://schemas.microsoft.com/office/drawing/2010/main">
                 <a:solidFill>
                   <a:srgbClr val="FFFFFF"/>
                 </a:solidFill>
               </a14:hiddenFill>
             </a:ext>
-            <a:ext uri="{91240B29-F687-4F45-9708-019B960494DF}">
+            <a:ext uri="{91240B29-F687-4f45-9708-019B960494DF}">
               <a14:hiddenLine xmlns:a14="http://schemas.microsoft.com/office/drawing/2010/main" w="9525" algn="ctr">
                 <a:solidFill>
                   <a:srgbClr val="000000"/>
@@ -11390,7 +11390,7 @@
           <p:cNvPr id="2" name="Date Placeholder 1">
             <a:extLst>
               <a:ext uri="{FF2B5EF4-FFF2-40B4-BE49-F238E27FC236}">
-                <a16:creationId xmlns:a16="http://schemas.microsoft.com/office/drawing/2014/main" id="{4C9C1810-5C59-534D-8F42-6AFB834677BE}"/>
+                <a16:creationId xmlns:a16="http://schemas.microsoft.com/office/drawing/2014/main" xmlns="" id="{4C9C1810-5C59-534D-8F42-6AFB834677BE}"/>
               </a:ext>
             </a:extLst>
           </p:cNvPr>
@@ -11408,7 +11408,7 @@
           <a:p>
             <a:fld id="{CA23C6E4-9FFE-C143-890B-48E26F15074A}" type="datetime1">
               <a:rPr lang="en-US" smtClean="0"/>
-              <a:t>1/2/18</a:t>
+              <a:t>1/30/18</a:t>
             </a:fld>
             <a:endParaRPr lang="en-US"/>
           </a:p>
@@ -11419,7 +11419,7 @@
           <p:cNvPr id="3" name="Slide Number Placeholder 2">
             <a:extLst>
               <a:ext uri="{FF2B5EF4-FFF2-40B4-BE49-F238E27FC236}">
-                <a16:creationId xmlns:a16="http://schemas.microsoft.com/office/drawing/2014/main" id="{1DC9E033-4396-7546-99AF-7E9565D1063F}"/>
+                <a16:creationId xmlns:a16="http://schemas.microsoft.com/office/drawing/2014/main" xmlns="" id="{1DC9E033-4396-7546-99AF-7E9565D1063F}"/>
               </a:ext>
             </a:extLst>
           </p:cNvPr>
@@ -11453,11 +11453,11 @@
   <p:clrMapOvr>
     <a:masterClrMapping/>
   </p:clrMapOvr>
-  <p:transition/>
+  <p:transition xmlns:p14="http://schemas.microsoft.com/office/powerpoint/2010/main"/>
   <p:timing>
     <p:tnLst>
       <p:par>
-        <p:cTn id="1" dur="indefinite" restart="never" nodeType="tmRoot">
+        <p:cTn xmlns:p14="http://schemas.microsoft.com/office/powerpoint/2010/main" id="1" dur="indefinite" restart="never" nodeType="tmRoot">
           <p:childTnLst>
             <p:seq concurrent="1" nextAc="seek">
               <p:cTn id="2" dur="indefinite" nodeType="mainSeq">
@@ -11762,14 +11762,14 @@
             <a:noFill/>
           </a:ln>
           <a:extLst>
-            <a:ext uri="{909E8E84-426E-40DD-AFC4-6F175D3DCCD1}">
+            <a:ext uri="{909E8E84-426E-40dd-AFC4-6F175D3DCCD1}">
               <a14:hiddenFill xmlns:a14="http://schemas.microsoft.com/office/drawing/2010/main">
                 <a:solidFill>
                   <a:srgbClr val="FFFFFF"/>
                 </a:solidFill>
               </a14:hiddenFill>
             </a:ext>
-            <a:ext uri="{91240B29-F687-4F45-9708-019B960494DF}">
+            <a:ext uri="{91240B29-F687-4f45-9708-019B960494DF}">
               <a14:hiddenLine xmlns:a14="http://schemas.microsoft.com/office/drawing/2010/main" w="9525" algn="ctr">
                 <a:solidFill>
                   <a:srgbClr val="000000"/>
@@ -11956,14 +11956,14 @@
             <a:noFill/>
           </a:ln>
           <a:extLst>
-            <a:ext uri="{909E8E84-426E-40DD-AFC4-6F175D3DCCD1}">
+            <a:ext uri="{909E8E84-426E-40dd-AFC4-6F175D3DCCD1}">
               <a14:hiddenFill xmlns:a14="http://schemas.microsoft.com/office/drawing/2010/main">
                 <a:solidFill>
                   <a:srgbClr val="FFFFFF"/>
                 </a:solidFill>
               </a14:hiddenFill>
             </a:ext>
-            <a:ext uri="{91240B29-F687-4F45-9708-019B960494DF}">
+            <a:ext uri="{91240B29-F687-4f45-9708-019B960494DF}">
               <a14:hiddenLine xmlns:a14="http://schemas.microsoft.com/office/drawing/2010/main" w="9525" algn="ctr">
                 <a:solidFill>
                   <a:srgbClr val="000000"/>
@@ -12006,14 +12006,14 @@
             <a:noFill/>
           </a:ln>
           <a:extLst>
-            <a:ext uri="{909E8E84-426E-40DD-AFC4-6F175D3DCCD1}">
+            <a:ext uri="{909E8E84-426E-40dd-AFC4-6F175D3DCCD1}">
               <a14:hiddenFill xmlns:a14="http://schemas.microsoft.com/office/drawing/2010/main">
                 <a:solidFill>
                   <a:srgbClr val="FFFFFF"/>
                 </a:solidFill>
               </a14:hiddenFill>
             </a:ext>
-            <a:ext uri="{91240B29-F687-4F45-9708-019B960494DF}">
+            <a:ext uri="{91240B29-F687-4f45-9708-019B960494DF}">
               <a14:hiddenLine xmlns:a14="http://schemas.microsoft.com/office/drawing/2010/main" w="9525" algn="ctr">
                 <a:solidFill>
                   <a:srgbClr val="000000"/>
@@ -12056,14 +12056,14 @@
             <a:noFill/>
           </a:ln>
           <a:extLst>
-            <a:ext uri="{909E8E84-426E-40DD-AFC4-6F175D3DCCD1}">
+            <a:ext uri="{909E8E84-426E-40dd-AFC4-6F175D3DCCD1}">
               <a14:hiddenFill xmlns:a14="http://schemas.microsoft.com/office/drawing/2010/main">
                 <a:solidFill>
                   <a:srgbClr val="FFFFFF"/>
                 </a:solidFill>
               </a14:hiddenFill>
             </a:ext>
-            <a:ext uri="{91240B29-F687-4F45-9708-019B960494DF}">
+            <a:ext uri="{91240B29-F687-4f45-9708-019B960494DF}">
               <a14:hiddenLine xmlns:a14="http://schemas.microsoft.com/office/drawing/2010/main" w="9525" algn="ctr">
                 <a:solidFill>
                   <a:srgbClr val="000000"/>
@@ -12229,14 +12229,14 @@
             <a:noFill/>
           </a:ln>
           <a:extLst>
-            <a:ext uri="{909E8E84-426E-40DD-AFC4-6F175D3DCCD1}">
+            <a:ext uri="{909E8E84-426E-40dd-AFC4-6F175D3DCCD1}">
               <a14:hiddenFill xmlns:a14="http://schemas.microsoft.com/office/drawing/2010/main">
                 <a:solidFill>
                   <a:srgbClr val="FFFFFF"/>
                 </a:solidFill>
               </a14:hiddenFill>
             </a:ext>
-            <a:ext uri="{91240B29-F687-4F45-9708-019B960494DF}">
+            <a:ext uri="{91240B29-F687-4f45-9708-019B960494DF}">
               <a14:hiddenLine xmlns:a14="http://schemas.microsoft.com/office/drawing/2010/main" w="9525" algn="ctr">
                 <a:solidFill>
                   <a:srgbClr val="000000"/>
@@ -12279,14 +12279,14 @@
             <a:noFill/>
           </a:ln>
           <a:extLst>
-            <a:ext uri="{909E8E84-426E-40DD-AFC4-6F175D3DCCD1}">
+            <a:ext uri="{909E8E84-426E-40dd-AFC4-6F175D3DCCD1}">
               <a14:hiddenFill xmlns:a14="http://schemas.microsoft.com/office/drawing/2010/main">
                 <a:solidFill>
                   <a:srgbClr val="FFFFFF"/>
                 </a:solidFill>
               </a14:hiddenFill>
             </a:ext>
-            <a:ext uri="{91240B29-F687-4F45-9708-019B960494DF}">
+            <a:ext uri="{91240B29-F687-4f45-9708-019B960494DF}">
               <a14:hiddenLine xmlns:a14="http://schemas.microsoft.com/office/drawing/2010/main" w="9525" algn="ctr">
                 <a:solidFill>
                   <a:srgbClr val="000000"/>
@@ -12329,14 +12329,14 @@
             <a:noFill/>
           </a:ln>
           <a:extLst>
-            <a:ext uri="{909E8E84-426E-40DD-AFC4-6F175D3DCCD1}">
+            <a:ext uri="{909E8E84-426E-40dd-AFC4-6F175D3DCCD1}">
               <a14:hiddenFill xmlns:a14="http://schemas.microsoft.com/office/drawing/2010/main">
                 <a:solidFill>
                   <a:srgbClr val="FFFFFF"/>
                 </a:solidFill>
               </a14:hiddenFill>
             </a:ext>
-            <a:ext uri="{91240B29-F687-4F45-9708-019B960494DF}">
+            <a:ext uri="{91240B29-F687-4f45-9708-019B960494DF}">
               <a14:hiddenLine xmlns:a14="http://schemas.microsoft.com/office/drawing/2010/main" w="9525" algn="ctr">
                 <a:solidFill>
                   <a:srgbClr val="000000"/>
@@ -12379,14 +12379,14 @@
             <a:noFill/>
           </a:ln>
           <a:extLst>
-            <a:ext uri="{909E8E84-426E-40DD-AFC4-6F175D3DCCD1}">
+            <a:ext uri="{909E8E84-426E-40dd-AFC4-6F175D3DCCD1}">
               <a14:hiddenFill xmlns:a14="http://schemas.microsoft.com/office/drawing/2010/main">
                 <a:solidFill>
                   <a:srgbClr val="FFFFFF"/>
                 </a:solidFill>
               </a14:hiddenFill>
             </a:ext>
-            <a:ext uri="{91240B29-F687-4F45-9708-019B960494DF}">
+            <a:ext uri="{91240B29-F687-4f45-9708-019B960494DF}">
               <a14:hiddenLine xmlns:a14="http://schemas.microsoft.com/office/drawing/2010/main" w="9525" algn="ctr">
                 <a:solidFill>
                   <a:srgbClr val="000000"/>
@@ -12429,14 +12429,14 @@
             <a:noFill/>
           </a:ln>
           <a:extLst>
-            <a:ext uri="{909E8E84-426E-40DD-AFC4-6F175D3DCCD1}">
+            <a:ext uri="{909E8E84-426E-40dd-AFC4-6F175D3DCCD1}">
               <a14:hiddenFill xmlns:a14="http://schemas.microsoft.com/office/drawing/2010/main">
                 <a:solidFill>
                   <a:srgbClr val="FFFFFF"/>
                 </a:solidFill>
               </a14:hiddenFill>
             </a:ext>
-            <a:ext uri="{91240B29-F687-4F45-9708-019B960494DF}">
+            <a:ext uri="{91240B29-F687-4f45-9708-019B960494DF}">
               <a14:hiddenLine xmlns:a14="http://schemas.microsoft.com/office/drawing/2010/main" w="9525" algn="ctr">
                 <a:solidFill>
                   <a:srgbClr val="000000"/>
@@ -12463,7 +12463,7 @@
           <p:cNvPr id="2" name="Date Placeholder 1">
             <a:extLst>
               <a:ext uri="{FF2B5EF4-FFF2-40B4-BE49-F238E27FC236}">
-                <a16:creationId xmlns:a16="http://schemas.microsoft.com/office/drawing/2014/main" id="{DB59976D-CA89-9E46-BD39-C7E9C68E822B}"/>
+                <a16:creationId xmlns:a16="http://schemas.microsoft.com/office/drawing/2014/main" xmlns="" id="{DB59976D-CA89-9E46-BD39-C7E9C68E822B}"/>
               </a:ext>
             </a:extLst>
           </p:cNvPr>
@@ -12481,7 +12481,7 @@
           <a:p>
             <a:fld id="{FF32EF84-4DE2-D841-A2E7-4FCAB99C9A05}" type="datetime1">
               <a:rPr lang="en-US" smtClean="0"/>
-              <a:t>1/2/18</a:t>
+              <a:t>1/30/18</a:t>
             </a:fld>
             <a:endParaRPr lang="en-US"/>
           </a:p>
@@ -12492,7 +12492,7 @@
           <p:cNvPr id="3" name="Slide Number Placeholder 2">
             <a:extLst>
               <a:ext uri="{FF2B5EF4-FFF2-40B4-BE49-F238E27FC236}">
-                <a16:creationId xmlns:a16="http://schemas.microsoft.com/office/drawing/2014/main" id="{7EF56BD5-90EB-7442-8211-EA6ED238A8F4}"/>
+                <a16:creationId xmlns:a16="http://schemas.microsoft.com/office/drawing/2014/main" xmlns="" id="{7EF56BD5-90EB-7442-8211-EA6ED238A8F4}"/>
               </a:ext>
             </a:extLst>
           </p:cNvPr>
@@ -12526,11 +12526,11 @@
   <p:clrMapOvr>
     <a:masterClrMapping/>
   </p:clrMapOvr>
-  <p:transition/>
+  <p:transition xmlns:p14="http://schemas.microsoft.com/office/powerpoint/2010/main"/>
   <p:timing>
     <p:tnLst>
       <p:par>
-        <p:cTn id="1" dur="indefinite" restart="never" nodeType="tmRoot">
+        <p:cTn xmlns:p14="http://schemas.microsoft.com/office/powerpoint/2010/main" id="1" dur="indefinite" restart="never" nodeType="tmRoot">
           <p:childTnLst>
             <p:seq concurrent="1" nextAc="seek">
               <p:cTn id="2" dur="indefinite" nodeType="mainSeq">
@@ -12898,7 +12898,7 @@
           <p:cNvPr id="4" name="Date Placeholder 3">
             <a:extLst>
               <a:ext uri="{FF2B5EF4-FFF2-40B4-BE49-F238E27FC236}">
-                <a16:creationId xmlns:a16="http://schemas.microsoft.com/office/drawing/2014/main" id="{3ADF8304-8CF6-C843-902A-CC698A5DBAF8}"/>
+                <a16:creationId xmlns:a16="http://schemas.microsoft.com/office/drawing/2014/main" xmlns="" id="{3ADF8304-8CF6-C843-902A-CC698A5DBAF8}"/>
               </a:ext>
             </a:extLst>
           </p:cNvPr>
@@ -12916,7 +12916,7 @@
           <a:p>
             <a:fld id="{66484D17-2DD9-374D-ABB2-465A5F08B912}" type="datetime1">
               <a:rPr lang="en-US" smtClean="0"/>
-              <a:t>1/2/18</a:t>
+              <a:t>1/30/18</a:t>
             </a:fld>
             <a:endParaRPr lang="en-US"/>
           </a:p>
@@ -12927,7 +12927,7 @@
           <p:cNvPr id="5" name="Slide Number Placeholder 4">
             <a:extLst>
               <a:ext uri="{FF2B5EF4-FFF2-40B4-BE49-F238E27FC236}">
-                <a16:creationId xmlns:a16="http://schemas.microsoft.com/office/drawing/2014/main" id="{090CA6BE-C516-334C-8C8E-7B148587D57B}"/>
+                <a16:creationId xmlns:a16="http://schemas.microsoft.com/office/drawing/2014/main" xmlns="" id="{090CA6BE-C516-334C-8C8E-7B148587D57B}"/>
               </a:ext>
             </a:extLst>
           </p:cNvPr>

</xml_diff>

<commit_message>
add R solution for lecture 5 excercises
</commit_message>
<xml_diff>
--- a/Lecture 5- Exercise--Normal Curve, Linear Transformations, and Standard Scores/Lecture 5- Exercise--Normal Curve, Linear Transformations, and Standard Scores.pptx
+++ b/Lecture 5- Exercise--Normal Curve, Linear Transformations, and Standard Scores/Lecture 5- Exercise--Normal Curve, Linear Transformations, and Standard Scores.pptx
@@ -5,7 +5,7 @@
     <p:sldMasterId id="2147483648" r:id="rId1"/>
   </p:sldMasterIdLst>
   <p:notesMasterIdLst>
-    <p:notesMasterId r:id="rId18"/>
+    <p:notesMasterId r:id="rId23"/>
   </p:notesMasterIdLst>
   <p:sldIdLst>
     <p:sldId id="256" r:id="rId2"/>
@@ -22,8 +22,13 @@
     <p:sldId id="257" r:id="rId13"/>
     <p:sldId id="258" r:id="rId14"/>
     <p:sldId id="259" r:id="rId15"/>
-    <p:sldId id="260" r:id="rId16"/>
-    <p:sldId id="270" r:id="rId17"/>
+    <p:sldId id="273" r:id="rId16"/>
+    <p:sldId id="260" r:id="rId17"/>
+    <p:sldId id="275" r:id="rId18"/>
+    <p:sldId id="274" r:id="rId19"/>
+    <p:sldId id="276" r:id="rId20"/>
+    <p:sldId id="270" r:id="rId21"/>
+    <p:sldId id="277" r:id="rId22"/>
   </p:sldIdLst>
   <p:sldSz cx="9144000" cy="6858000" type="screen4x3"/>
   <p:notesSz cx="6858000" cy="9144000"/>
@@ -124,7 +129,7 @@
   </p:defaultTextStyle>
   <p:extLst>
     <p:ext uri="{EFAFB233-063F-42B5-8137-9DF3F51BA10A}">
-      <p15:sldGuideLst xmlns:p15="http://schemas.microsoft.com/office/powerpoint/2012/main" xmlns="">
+      <p15:sldGuideLst xmlns:p15="http://schemas.microsoft.com/office/powerpoint/2012/main">
         <p15:guide id="1" orient="horz" pos="2160">
           <p15:clr>
             <a:srgbClr val="A4A3A4"/>
@@ -223,7 +228,7 @@
           <a:p>
             <a:fld id="{5E6DBAD6-C377-44EB-8279-71D20823D16A}" type="datetimeFigureOut">
               <a:rPr lang="en-US" smtClean="0"/>
-              <a:t>1/30/18</a:t>
+              <a:t>2/2/18</a:t>
             </a:fld>
             <a:endParaRPr lang="en-US"/>
           </a:p>
@@ -536,14 +541,14 @@
           <a:ln/>
           <a:extLst>
             <a:ext uri="{909E8E84-426E-40dd-AFC4-6F175D3DCCD1}">
-              <a14:hiddenFill xmlns:a14="http://schemas.microsoft.com/office/drawing/2010/main">
+              <a14:hiddenFill xmlns:a14="http://schemas.microsoft.com/office/drawing/2010/main" xmlns="">
                 <a:solidFill>
                   <a:srgbClr val="FFFFFF"/>
                 </a:solidFill>
               </a14:hiddenFill>
             </a:ext>
             <a:ext uri="{91240B29-F687-4f45-9708-019B960494DF}">
-              <a14:hiddenLine xmlns:a14="http://schemas.microsoft.com/office/drawing/2010/main" w="9525">
+              <a14:hiddenLine xmlns:a14="http://schemas.microsoft.com/office/drawing/2010/main" xmlns="" w="9525">
                 <a:solidFill>
                   <a:srgbClr val="000000"/>
                 </a:solidFill>
@@ -617,14 +622,14 @@
           <a:ln/>
           <a:extLst>
             <a:ext uri="{909E8E84-426E-40dd-AFC4-6F175D3DCCD1}">
-              <a14:hiddenFill xmlns:a14="http://schemas.microsoft.com/office/drawing/2010/main">
+              <a14:hiddenFill xmlns:a14="http://schemas.microsoft.com/office/drawing/2010/main" xmlns="">
                 <a:solidFill>
                   <a:srgbClr val="FFFFFF"/>
                 </a:solidFill>
               </a14:hiddenFill>
             </a:ext>
             <a:ext uri="{91240B29-F687-4f45-9708-019B960494DF}">
-              <a14:hiddenLine xmlns:a14="http://schemas.microsoft.com/office/drawing/2010/main" w="9525">
+              <a14:hiddenLine xmlns:a14="http://schemas.microsoft.com/office/drawing/2010/main" xmlns="" w="9525">
                 <a:solidFill>
                   <a:srgbClr val="000000"/>
                 </a:solidFill>
@@ -698,14 +703,14 @@
           <a:ln/>
           <a:extLst>
             <a:ext uri="{909E8E84-426E-40dd-AFC4-6F175D3DCCD1}">
-              <a14:hiddenFill xmlns:a14="http://schemas.microsoft.com/office/drawing/2010/main">
+              <a14:hiddenFill xmlns:a14="http://schemas.microsoft.com/office/drawing/2010/main" xmlns="">
                 <a:solidFill>
                   <a:srgbClr val="FFFFFF"/>
                 </a:solidFill>
               </a14:hiddenFill>
             </a:ext>
             <a:ext uri="{91240B29-F687-4f45-9708-019B960494DF}">
-              <a14:hiddenLine xmlns:a14="http://schemas.microsoft.com/office/drawing/2010/main" w="9525">
+              <a14:hiddenLine xmlns:a14="http://schemas.microsoft.com/office/drawing/2010/main" xmlns="" w="9525">
                 <a:solidFill>
                   <a:srgbClr val="000000"/>
                 </a:solidFill>
@@ -779,14 +784,14 @@
           <a:ln/>
           <a:extLst>
             <a:ext uri="{909E8E84-426E-40dd-AFC4-6F175D3DCCD1}">
-              <a14:hiddenFill xmlns:a14="http://schemas.microsoft.com/office/drawing/2010/main">
+              <a14:hiddenFill xmlns:a14="http://schemas.microsoft.com/office/drawing/2010/main" xmlns="">
                 <a:solidFill>
                   <a:srgbClr val="FFFFFF"/>
                 </a:solidFill>
               </a14:hiddenFill>
             </a:ext>
             <a:ext uri="{91240B29-F687-4f45-9708-019B960494DF}">
-              <a14:hiddenLine xmlns:a14="http://schemas.microsoft.com/office/drawing/2010/main" w="9525">
+              <a14:hiddenLine xmlns:a14="http://schemas.microsoft.com/office/drawing/2010/main" xmlns="" w="9525">
                 <a:solidFill>
                   <a:srgbClr val="000000"/>
                 </a:solidFill>
@@ -860,14 +865,14 @@
           <a:ln/>
           <a:extLst>
             <a:ext uri="{909E8E84-426E-40dd-AFC4-6F175D3DCCD1}">
-              <a14:hiddenFill xmlns:a14="http://schemas.microsoft.com/office/drawing/2010/main">
+              <a14:hiddenFill xmlns:a14="http://schemas.microsoft.com/office/drawing/2010/main" xmlns="">
                 <a:solidFill>
                   <a:srgbClr val="FFFFFF"/>
                 </a:solidFill>
               </a14:hiddenFill>
             </a:ext>
             <a:ext uri="{91240B29-F687-4f45-9708-019B960494DF}">
-              <a14:hiddenLine xmlns:a14="http://schemas.microsoft.com/office/drawing/2010/main" w="9525">
+              <a14:hiddenLine xmlns:a14="http://schemas.microsoft.com/office/drawing/2010/main" xmlns="" w="9525">
                 <a:solidFill>
                   <a:srgbClr val="000000"/>
                 </a:solidFill>
@@ -1243,6 +1248,258 @@
 </p:notes>
 </file>
 
+<file path=ppt/notesSlides/notesSlide8.xml><?xml version="1.0" encoding="utf-8"?>
+<p:notes xmlns:a="http://schemas.openxmlformats.org/drawingml/2006/main" xmlns:r="http://schemas.openxmlformats.org/officeDocument/2006/relationships" xmlns:p="http://schemas.openxmlformats.org/presentationml/2006/main">
+  <p:cSld>
+    <p:spTree>
+      <p:nvGrpSpPr>
+        <p:cNvPr id="1" name=""/>
+        <p:cNvGrpSpPr/>
+        <p:nvPr/>
+      </p:nvGrpSpPr>
+      <p:grpSpPr>
+        <a:xfrm>
+          <a:off x="0" y="0"/>
+          <a:ext cx="0" cy="0"/>
+          <a:chOff x="0" y="0"/>
+          <a:chExt cx="0" cy="0"/>
+        </a:xfrm>
+      </p:grpSpPr>
+      <p:sp>
+        <p:nvSpPr>
+          <p:cNvPr id="2" name="Slide Image Placeholder 1"/>
+          <p:cNvSpPr>
+            <a:spLocks noGrp="1" noRot="1" noChangeAspect="1"/>
+          </p:cNvSpPr>
+          <p:nvPr>
+            <p:ph type="sldImg"/>
+          </p:nvPr>
+        </p:nvSpPr>
+        <p:spPr/>
+      </p:sp>
+      <p:sp>
+        <p:nvSpPr>
+          <p:cNvPr id="3" name="Notes Placeholder 2"/>
+          <p:cNvSpPr>
+            <a:spLocks noGrp="1"/>
+          </p:cNvSpPr>
+          <p:nvPr>
+            <p:ph type="body" idx="1"/>
+          </p:nvPr>
+        </p:nvSpPr>
+        <p:spPr/>
+        <p:txBody>
+          <a:bodyPr/>
+          <a:lstStyle/>
+          <a:p>
+            <a:r>
+              <a:rPr lang="en-US" sz="1200" kern="1200" dirty="0">
+                <a:solidFill>
+                  <a:schemeClr val="tx1"/>
+                </a:solidFill>
+                <a:effectLst/>
+                <a:latin typeface="+mn-lt"/>
+                <a:ea typeface="+mn-ea"/>
+                <a:cs typeface="+mn-cs"/>
+              </a:rPr>
+              <a:t>.  a) 7</a:t>
+            </a:r>
+            <a:r>
+              <a:rPr lang="en-US" sz="1200" kern="1200" baseline="30000" dirty="0">
+                <a:solidFill>
+                  <a:schemeClr val="tx1"/>
+                </a:solidFill>
+                <a:effectLst/>
+                <a:latin typeface="+mn-lt"/>
+                <a:ea typeface="+mn-ea"/>
+                <a:cs typeface="+mn-cs"/>
+              </a:rPr>
+              <a:t>th</a:t>
+            </a:r>
+            <a:r>
+              <a:rPr lang="en-US" sz="1200" kern="1200" dirty="0">
+                <a:solidFill>
+                  <a:schemeClr val="tx1"/>
+                </a:solidFill>
+                <a:effectLst/>
+                <a:latin typeface="+mn-lt"/>
+                <a:ea typeface="+mn-ea"/>
+                <a:cs typeface="+mn-cs"/>
+              </a:rPr>
+              <a:t> or P</a:t>
+            </a:r>
+            <a:r>
+              <a:rPr lang="en-US" sz="1200" kern="1200" baseline="-25000" dirty="0">
+                <a:solidFill>
+                  <a:schemeClr val="tx1"/>
+                </a:solidFill>
+                <a:effectLst/>
+                <a:latin typeface="+mn-lt"/>
+                <a:ea typeface="+mn-ea"/>
+                <a:cs typeface="+mn-cs"/>
+              </a:rPr>
+              <a:t>.07</a:t>
+            </a:r>
+            <a:r>
+              <a:rPr lang="en-US" sz="1200" kern="1200" dirty="0">
+                <a:solidFill>
+                  <a:schemeClr val="tx1"/>
+                </a:solidFill>
+                <a:effectLst/>
+                <a:latin typeface="+mn-lt"/>
+                <a:ea typeface="+mn-ea"/>
+                <a:cs typeface="+mn-cs"/>
+              </a:rPr>
+              <a:t> ; c) 74</a:t>
+            </a:r>
+            <a:r>
+              <a:rPr lang="en-US" sz="1200" kern="1200" baseline="30000" dirty="0">
+                <a:solidFill>
+                  <a:schemeClr val="tx1"/>
+                </a:solidFill>
+                <a:effectLst/>
+                <a:latin typeface="+mn-lt"/>
+                <a:ea typeface="+mn-ea"/>
+                <a:cs typeface="+mn-cs"/>
+              </a:rPr>
+              <a:t>th</a:t>
+            </a:r>
+            <a:r>
+              <a:rPr lang="en-US" sz="1200" kern="1200" dirty="0">
+                <a:solidFill>
+                  <a:schemeClr val="tx1"/>
+                </a:solidFill>
+                <a:effectLst/>
+                <a:latin typeface="+mn-lt"/>
+                <a:ea typeface="+mn-ea"/>
+                <a:cs typeface="+mn-cs"/>
+              </a:rPr>
+              <a:t> or P</a:t>
+            </a:r>
+            <a:r>
+              <a:rPr lang="en-US" sz="1200" kern="1200" baseline="-25000" dirty="0">
+                <a:solidFill>
+                  <a:schemeClr val="tx1"/>
+                </a:solidFill>
+                <a:effectLst/>
+                <a:latin typeface="+mn-lt"/>
+                <a:ea typeface="+mn-ea"/>
+                <a:cs typeface="+mn-cs"/>
+              </a:rPr>
+              <a:t>.74</a:t>
+            </a:r>
+            <a:r>
+              <a:rPr lang="en-US" sz="1200" kern="1200" dirty="0">
+                <a:solidFill>
+                  <a:schemeClr val="tx1"/>
+                </a:solidFill>
+                <a:effectLst/>
+                <a:latin typeface="+mn-lt"/>
+                <a:ea typeface="+mn-ea"/>
+                <a:cs typeface="+mn-cs"/>
+              </a:rPr>
+              <a:t> </a:t>
+            </a:r>
+            <a:r>
+              <a:rPr lang="zh-CHS" altLang="en-US" sz="1200" kern="1200" dirty="0">
+                <a:solidFill>
+                  <a:schemeClr val="tx1"/>
+                </a:solidFill>
+                <a:effectLst/>
+                <a:latin typeface="+mn-lt"/>
+                <a:ea typeface="+mn-ea"/>
+                <a:cs typeface="+mn-cs"/>
+              </a:rPr>
+              <a:t> 思考如何用</a:t>
+            </a:r>
+            <a:r>
+              <a:rPr lang="en-US" altLang="zh-CHS" sz="1200" kern="1200" dirty="0">
+                <a:solidFill>
+                  <a:schemeClr val="tx1"/>
+                </a:solidFill>
+                <a:effectLst/>
+                <a:latin typeface="+mn-lt"/>
+                <a:ea typeface="+mn-ea"/>
+                <a:cs typeface="+mn-cs"/>
+              </a:rPr>
+              <a:t>excel</a:t>
+            </a:r>
+            <a:r>
+              <a:rPr lang="zh-CHS" altLang="en-US" sz="1200" kern="1200" dirty="0">
+                <a:solidFill>
+                  <a:schemeClr val="tx1"/>
+                </a:solidFill>
+                <a:effectLst/>
+                <a:latin typeface="+mn-lt"/>
+                <a:ea typeface="+mn-ea"/>
+                <a:cs typeface="+mn-cs"/>
+              </a:rPr>
+              <a:t>和</a:t>
+            </a:r>
+            <a:r>
+              <a:rPr lang="en-US" altLang="zh-CHS" sz="1200" kern="1200" dirty="0">
+                <a:solidFill>
+                  <a:schemeClr val="tx1"/>
+                </a:solidFill>
+                <a:effectLst/>
+                <a:latin typeface="+mn-lt"/>
+                <a:ea typeface="+mn-ea"/>
+                <a:cs typeface="+mn-cs"/>
+              </a:rPr>
+              <a:t>R</a:t>
+            </a:r>
+            <a:r>
+              <a:rPr lang="zh-CHS" altLang="en-US" sz="1200" kern="1200" dirty="0">
+                <a:solidFill>
+                  <a:schemeClr val="tx1"/>
+                </a:solidFill>
+                <a:effectLst/>
+                <a:latin typeface="+mn-lt"/>
+                <a:ea typeface="+mn-ea"/>
+                <a:cs typeface="+mn-cs"/>
+              </a:rPr>
+              <a:t>实现</a:t>
+            </a:r>
+            <a:endParaRPr lang="en-US" dirty="0"/>
+          </a:p>
+        </p:txBody>
+      </p:sp>
+      <p:sp>
+        <p:nvSpPr>
+          <p:cNvPr id="4" name="Slide Number Placeholder 3"/>
+          <p:cNvSpPr>
+            <a:spLocks noGrp="1"/>
+          </p:cNvSpPr>
+          <p:nvPr>
+            <p:ph type="sldNum" sz="quarter" idx="10"/>
+          </p:nvPr>
+        </p:nvSpPr>
+        <p:spPr/>
+        <p:txBody>
+          <a:bodyPr/>
+          <a:lstStyle/>
+          <a:p>
+            <a:fld id="{2736F025-69C4-4B52-8D61-F702AE124510}" type="slidenum">
+              <a:rPr lang="en-US" smtClean="0"/>
+              <a:t>15</a:t>
+            </a:fld>
+            <a:endParaRPr lang="en-US"/>
+          </a:p>
+        </p:txBody>
+      </p:sp>
+    </p:spTree>
+    <p:extLst>
+      <p:ext uri="{BB962C8B-B14F-4D97-AF65-F5344CB8AC3E}">
+        <p14:creationId xmlns:p14="http://schemas.microsoft.com/office/powerpoint/2010/main" val="535255571"/>
+      </p:ext>
+    </p:extLst>
+  </p:cSld>
+  <p:clrMapOvr>
+    <a:masterClrMapping/>
+  </p:clrMapOvr>
+</p:notes>
+</file>
+
 <file path=ppt/slideLayouts/slideLayout1.xml><?xml version="1.0" encoding="utf-8"?>
 <p:sldLayout xmlns:a="http://schemas.openxmlformats.org/drawingml/2006/main" xmlns:r="http://schemas.openxmlformats.org/officeDocument/2006/relationships" xmlns:p="http://schemas.openxmlformats.org/presentationml/2006/main" type="title" preserve="1">
   <p:cSld name="Title Slide">
@@ -1422,7 +1679,7 @@
           <a:p>
             <a:fld id="{0A1CEE28-B835-C747-BD7C-4AADCFF61603}" type="datetime1">
               <a:rPr lang="en-US" smtClean="0"/>
-              <a:t>1/30/18</a:t>
+              <a:t>2/2/18</a:t>
             </a:fld>
             <a:endParaRPr lang="en-US"/>
           </a:p>
@@ -1590,7 +1847,7 @@
           <a:p>
             <a:fld id="{9AA364E1-2676-A540-A39A-7AD0332F7008}" type="datetime1">
               <a:rPr lang="en-US" smtClean="0"/>
-              <a:t>1/30/18</a:t>
+              <a:t>2/2/18</a:t>
             </a:fld>
             <a:endParaRPr lang="en-US"/>
           </a:p>
@@ -1768,7 +2025,7 @@
           <a:p>
             <a:fld id="{8AC53240-26D6-2946-A47D-8EF956A84F37}" type="datetime1">
               <a:rPr lang="en-US" smtClean="0"/>
-              <a:t>1/30/18</a:t>
+              <a:t>2/2/18</a:t>
             </a:fld>
             <a:endParaRPr lang="en-US"/>
           </a:p>
@@ -1936,7 +2193,7 @@
           <a:p>
             <a:fld id="{303A4775-00BD-7E42-B95F-AA9F83C92E40}" type="datetime1">
               <a:rPr lang="en-US" smtClean="0"/>
-              <a:t>1/30/18</a:t>
+              <a:t>2/2/18</a:t>
             </a:fld>
             <a:endParaRPr lang="en-US"/>
           </a:p>
@@ -2181,7 +2438,7 @@
           <a:p>
             <a:fld id="{54A84395-585F-2147-98BB-3245B35FF7EF}" type="datetime1">
               <a:rPr lang="en-US" smtClean="0"/>
-              <a:t>1/30/18</a:t>
+              <a:t>2/2/18</a:t>
             </a:fld>
             <a:endParaRPr lang="en-US"/>
           </a:p>
@@ -2466,7 +2723,7 @@
           <a:p>
             <a:fld id="{F0295849-A4A8-6F46-8FE7-8F6A4CD0C1F3}" type="datetime1">
               <a:rPr lang="en-US" smtClean="0"/>
-              <a:t>1/30/18</a:t>
+              <a:t>2/2/18</a:t>
             </a:fld>
             <a:endParaRPr lang="en-US"/>
           </a:p>
@@ -2885,7 +3142,7 @@
           <a:p>
             <a:fld id="{A831AE25-D77F-EE4E-8FD0-BA4118D33A99}" type="datetime1">
               <a:rPr lang="en-US" smtClean="0"/>
-              <a:t>1/30/18</a:t>
+              <a:t>2/2/18</a:t>
             </a:fld>
             <a:endParaRPr lang="en-US"/>
           </a:p>
@@ -3002,7 +3259,7 @@
           <a:p>
             <a:fld id="{4A1CD0A7-957B-C74C-89E9-1FFDA1BC53A0}" type="datetime1">
               <a:rPr lang="en-US" smtClean="0"/>
-              <a:t>1/30/18</a:t>
+              <a:t>2/2/18</a:t>
             </a:fld>
             <a:endParaRPr lang="en-US"/>
           </a:p>
@@ -3097,7 +3354,7 @@
           <a:p>
             <a:fld id="{AE8CC244-2A34-1547-8B5E-CB12807A4FE5}" type="datetime1">
               <a:rPr lang="en-US" smtClean="0"/>
-              <a:t>1/30/18</a:t>
+              <a:t>2/2/18</a:t>
             </a:fld>
             <a:endParaRPr lang="en-US"/>
           </a:p>
@@ -3372,7 +3629,7 @@
           <a:p>
             <a:fld id="{F60B5CC3-219E-3145-95DB-C6195C7FAE13}" type="datetime1">
               <a:rPr lang="en-US" smtClean="0"/>
-              <a:t>1/30/18</a:t>
+              <a:t>2/2/18</a:t>
             </a:fld>
             <a:endParaRPr lang="en-US"/>
           </a:p>
@@ -3624,7 +3881,7 @@
           <a:p>
             <a:fld id="{954DD138-2DF7-B64D-A52E-B1FCD2B14B0A}" type="datetime1">
               <a:rPr lang="en-US" smtClean="0"/>
-              <a:t>1/30/18</a:t>
+              <a:t>2/2/18</a:t>
             </a:fld>
             <a:endParaRPr lang="en-US"/>
           </a:p>
@@ -3835,7 +4092,7 @@
           <a:p>
             <a:fld id="{E03BC567-C105-724D-97C2-EA77DFA453BA}" type="datetime1">
               <a:rPr lang="en-US" smtClean="0"/>
-              <a:t>1/30/18</a:t>
+              <a:t>2/2/18</a:t>
             </a:fld>
             <a:endParaRPr lang="en-US"/>
           </a:p>
@@ -4405,7 +4662,7 @@
           <p:cNvPr id="4" name="Date Placeholder 3">
             <a:extLst>
               <a:ext uri="{FF2B5EF4-FFF2-40B4-BE49-F238E27FC236}">
-                <a16:creationId xmlns:a16="http://schemas.microsoft.com/office/drawing/2014/main" xmlns="" id="{D5C94A4F-9C3C-9741-8736-4067A81A0327}"/>
+                <a16:creationId xmlns:a16="http://schemas.microsoft.com/office/drawing/2014/main" id="{D5C94A4F-9C3C-9741-8736-4067A81A0327}"/>
               </a:ext>
             </a:extLst>
           </p:cNvPr>
@@ -4423,7 +4680,7 @@
           <a:p>
             <a:fld id="{44D65F3D-2237-954E-8B4B-FAD74B24BB80}" type="datetime1">
               <a:rPr lang="en-US" smtClean="0"/>
-              <a:t>1/30/18</a:t>
+              <a:t>2/2/18</a:t>
             </a:fld>
             <a:endParaRPr lang="en-US"/>
           </a:p>
@@ -4434,7 +4691,7 @@
           <p:cNvPr id="5" name="Slide Number Placeholder 4">
             <a:extLst>
               <a:ext uri="{FF2B5EF4-FFF2-40B4-BE49-F238E27FC236}">
-                <a16:creationId xmlns:a16="http://schemas.microsoft.com/office/drawing/2014/main" xmlns="" id="{765F88C7-48B7-7648-9ABD-58B95E9B3E43}"/>
+                <a16:creationId xmlns:a16="http://schemas.microsoft.com/office/drawing/2014/main" id="{765F88C7-48B7-7648-9ABD-58B95E9B3E43}"/>
               </a:ext>
             </a:extLst>
           </p:cNvPr>
@@ -4719,14 +4976,14 @@
           </a:ln>
           <a:extLst>
             <a:ext uri="{909E8E84-426E-40dd-AFC4-6F175D3DCCD1}">
-              <a14:hiddenFill xmlns:a14="http://schemas.microsoft.com/office/drawing/2010/main">
+              <a14:hiddenFill xmlns:a14="http://schemas.microsoft.com/office/drawing/2010/main" xmlns="">
                 <a:solidFill>
                   <a:srgbClr val="FFFFFF"/>
                 </a:solidFill>
               </a14:hiddenFill>
             </a:ext>
             <a:ext uri="{91240B29-F687-4f45-9708-019B960494DF}">
-              <a14:hiddenLine xmlns:a14="http://schemas.microsoft.com/office/drawing/2010/main" w="9525" algn="ctr">
+              <a14:hiddenLine xmlns:a14="http://schemas.microsoft.com/office/drawing/2010/main" xmlns="" w="9525" algn="ctr">
                 <a:solidFill>
                   <a:srgbClr val="000000"/>
                 </a:solidFill>
@@ -4885,7 +5142,7 @@
           <p:cNvPr id="2" name="Date Placeholder 1">
             <a:extLst>
               <a:ext uri="{FF2B5EF4-FFF2-40B4-BE49-F238E27FC236}">
-                <a16:creationId xmlns:a16="http://schemas.microsoft.com/office/drawing/2014/main" xmlns="" id="{9EFF8011-62F2-BD4C-918F-00843029B989}"/>
+                <a16:creationId xmlns:a16="http://schemas.microsoft.com/office/drawing/2014/main" id="{9EFF8011-62F2-BD4C-918F-00843029B989}"/>
               </a:ext>
             </a:extLst>
           </p:cNvPr>
@@ -4903,7 +5160,7 @@
           <a:p>
             <a:fld id="{C8421802-949D-6643-9F6B-3BA99E62073A}" type="datetime1">
               <a:rPr lang="en-US" smtClean="0"/>
-              <a:t>1/30/18</a:t>
+              <a:t>2/2/18</a:t>
             </a:fld>
             <a:endParaRPr lang="en-US"/>
           </a:p>
@@ -4914,7 +5171,7 @@
           <p:cNvPr id="3" name="Slide Number Placeholder 2">
             <a:extLst>
               <a:ext uri="{FF2B5EF4-FFF2-40B4-BE49-F238E27FC236}">
-                <a16:creationId xmlns:a16="http://schemas.microsoft.com/office/drawing/2014/main" xmlns="" id="{784D1B0D-874A-5045-9021-39A8464684AE}"/>
+                <a16:creationId xmlns:a16="http://schemas.microsoft.com/office/drawing/2014/main" id="{784D1B0D-874A-5045-9021-39A8464684AE}"/>
               </a:ext>
             </a:extLst>
           </p:cNvPr>
@@ -4948,7 +5205,7 @@
   <p:clrMapOvr>
     <a:masterClrMapping/>
   </p:clrMapOvr>
-  <p:transition xmlns:p14="http://schemas.microsoft.com/office/powerpoint/2010/main"/>
+  <p:transition/>
 </p:sld>
 </file>
 
@@ -5188,14 +5445,14 @@
           </a:ln>
           <a:extLst>
             <a:ext uri="{909E8E84-426E-40dd-AFC4-6F175D3DCCD1}">
-              <a14:hiddenFill xmlns:a14="http://schemas.microsoft.com/office/drawing/2010/main">
+              <a14:hiddenFill xmlns:a14="http://schemas.microsoft.com/office/drawing/2010/main" xmlns="">
                 <a:solidFill>
                   <a:srgbClr val="FFFFFF"/>
                 </a:solidFill>
               </a14:hiddenFill>
             </a:ext>
             <a:ext uri="{91240B29-F687-4f45-9708-019B960494DF}">
-              <a14:hiddenLine xmlns:a14="http://schemas.microsoft.com/office/drawing/2010/main" w="9525" algn="ctr">
+              <a14:hiddenLine xmlns:a14="http://schemas.microsoft.com/office/drawing/2010/main" xmlns="" w="9525" algn="ctr">
                 <a:solidFill>
                   <a:srgbClr val="000000"/>
                 </a:solidFill>
@@ -5361,7 +5618,7 @@
           <p:cNvPr id="2" name="Date Placeholder 1">
             <a:extLst>
               <a:ext uri="{FF2B5EF4-FFF2-40B4-BE49-F238E27FC236}">
-                <a16:creationId xmlns:a16="http://schemas.microsoft.com/office/drawing/2014/main" xmlns="" id="{54288F1C-99B3-D74A-8FC9-11DAC94B0E40}"/>
+                <a16:creationId xmlns:a16="http://schemas.microsoft.com/office/drawing/2014/main" id="{54288F1C-99B3-D74A-8FC9-11DAC94B0E40}"/>
               </a:ext>
             </a:extLst>
           </p:cNvPr>
@@ -5379,7 +5636,7 @@
           <a:p>
             <a:fld id="{252B016F-A9FE-0A44-A5B7-E3FA863F7614}" type="datetime1">
               <a:rPr lang="en-US" smtClean="0"/>
-              <a:t>1/30/18</a:t>
+              <a:t>2/2/18</a:t>
             </a:fld>
             <a:endParaRPr lang="en-US"/>
           </a:p>
@@ -5390,7 +5647,7 @@
           <p:cNvPr id="3" name="Slide Number Placeholder 2">
             <a:extLst>
               <a:ext uri="{FF2B5EF4-FFF2-40B4-BE49-F238E27FC236}">
-                <a16:creationId xmlns:a16="http://schemas.microsoft.com/office/drawing/2014/main" xmlns="" id="{97D74045-D061-EA44-9848-1A179A3164AF}"/>
+                <a16:creationId xmlns:a16="http://schemas.microsoft.com/office/drawing/2014/main" id="{97D74045-D061-EA44-9848-1A179A3164AF}"/>
               </a:ext>
             </a:extLst>
           </p:cNvPr>
@@ -5424,7 +5681,7 @@
   <p:clrMapOvr>
     <a:masterClrMapping/>
   </p:clrMapOvr>
-  <p:transition xmlns:p14="http://schemas.microsoft.com/office/powerpoint/2010/main"/>
+  <p:transition/>
 </p:sld>
 </file>
 
@@ -5522,7 +5779,7 @@
           <p:cNvPr id="4" name="Date Placeholder 3">
             <a:extLst>
               <a:ext uri="{FF2B5EF4-FFF2-40B4-BE49-F238E27FC236}">
-                <a16:creationId xmlns:a16="http://schemas.microsoft.com/office/drawing/2014/main" xmlns="" id="{4B3BBDF4-57C0-A545-8755-FE8DDB5D5DB6}"/>
+                <a16:creationId xmlns:a16="http://schemas.microsoft.com/office/drawing/2014/main" id="{4B3BBDF4-57C0-A545-8755-FE8DDB5D5DB6}"/>
               </a:ext>
             </a:extLst>
           </p:cNvPr>
@@ -5540,7 +5797,7 @@
           <a:p>
             <a:fld id="{5F0299C7-8ACB-D944-889B-87D0B91FA5DA}" type="datetime1">
               <a:rPr lang="en-US" smtClean="0"/>
-              <a:t>1/30/18</a:t>
+              <a:t>2/2/18</a:t>
             </a:fld>
             <a:endParaRPr lang="en-US"/>
           </a:p>
@@ -5551,7 +5808,7 @@
           <p:cNvPr id="5" name="Slide Number Placeholder 4">
             <a:extLst>
               <a:ext uri="{FF2B5EF4-FFF2-40B4-BE49-F238E27FC236}">
-                <a16:creationId xmlns:a16="http://schemas.microsoft.com/office/drawing/2014/main" xmlns="" id="{0AB9BA00-9F05-EB40-AEBF-F40BA8DE65B2}"/>
+                <a16:creationId xmlns:a16="http://schemas.microsoft.com/office/drawing/2014/main" id="{0AB9BA00-9F05-EB40-AEBF-F40BA8DE65B2}"/>
               </a:ext>
             </a:extLst>
           </p:cNvPr>
@@ -5780,14 +6037,14 @@
           <a:effectLst/>
           <a:extLst>
             <a:ext uri="{909E8E84-426E-40dd-AFC4-6F175D3DCCD1}">
-              <a14:hiddenFill xmlns:a14="http://schemas.microsoft.com/office/drawing/2010/main">
+              <a14:hiddenFill xmlns:a14="http://schemas.microsoft.com/office/drawing/2010/main" xmlns="">
                 <a:solidFill>
                   <a:schemeClr val="accent1"/>
                 </a:solidFill>
               </a14:hiddenFill>
             </a:ext>
             <a:ext uri="{91240B29-F687-4f45-9708-019B960494DF}">
-              <a14:hiddenLine xmlns:a14="http://schemas.microsoft.com/office/drawing/2010/main" w="9525">
+              <a14:hiddenLine xmlns:a14="http://schemas.microsoft.com/office/drawing/2010/main" xmlns="" w="9525">
                 <a:solidFill>
                   <a:schemeClr val="tx1"/>
                 </a:solidFill>
@@ -5797,7 +6054,7 @@
               </a14:hiddenLine>
             </a:ext>
             <a:ext uri="{AF507438-7753-43e0-B8FC-AC1667EBCBE1}">
-              <a14:hiddenEffects xmlns:a14="http://schemas.microsoft.com/office/drawing/2010/main">
+              <a14:hiddenEffects xmlns:a14="http://schemas.microsoft.com/office/drawing/2010/main" xmlns="">
                 <a:effectLst>
                   <a:outerShdw dist="35921" dir="2700000" algn="ctr" rotWithShape="0">
                     <a:schemeClr val="bg2"/>
@@ -5842,7 +6099,7 @@
           <a:graphicData uri="http://schemas.openxmlformats.org/presentationml/2006/ole">
             <mc:AlternateContent xmlns:mc="http://schemas.openxmlformats.org/markup-compatibility/2006">
               <mc:Choice xmlns:v="urn:schemas-microsoft-com:vml" Requires="v">
-                <p:oleObj spid="_x0000_s1091" name="Equation" r:id="rId3" imgW="901700" imgH="152400" progId="Equation.DSMT4">
+                <p:oleObj spid="_x0000_s1113" name="Equation" r:id="rId3" imgW="901700" imgH="152400" progId="Equation.DSMT4">
                   <p:embed/>
                 </p:oleObj>
               </mc:Choice>
@@ -5892,7 +6149,7 @@
           <p:cNvPr id="6" name="Date Placeholder 5">
             <a:extLst>
               <a:ext uri="{FF2B5EF4-FFF2-40B4-BE49-F238E27FC236}">
-                <a16:creationId xmlns:a16="http://schemas.microsoft.com/office/drawing/2014/main" xmlns="" id="{FA0D1FF5-BC34-424D-8200-C38CA20D8008}"/>
+                <a16:creationId xmlns:a16="http://schemas.microsoft.com/office/drawing/2014/main" id="{FA0D1FF5-BC34-424D-8200-C38CA20D8008}"/>
               </a:ext>
             </a:extLst>
           </p:cNvPr>
@@ -5910,7 +6167,7 @@
           <a:p>
             <a:fld id="{5E6B1E10-DE3C-BF47-97FA-474C905AFCDF}" type="datetime1">
               <a:rPr lang="en-US" smtClean="0"/>
-              <a:t>1/30/18</a:t>
+              <a:t>2/2/18</a:t>
             </a:fld>
             <a:endParaRPr lang="en-US"/>
           </a:p>
@@ -5921,7 +6178,7 @@
           <p:cNvPr id="7" name="Slide Number Placeholder 6">
             <a:extLst>
               <a:ext uri="{FF2B5EF4-FFF2-40B4-BE49-F238E27FC236}">
-                <a16:creationId xmlns:a16="http://schemas.microsoft.com/office/drawing/2014/main" xmlns="" id="{952C70E5-1E0E-AF48-9AAA-8D2C0F601B8A}"/>
+                <a16:creationId xmlns:a16="http://schemas.microsoft.com/office/drawing/2014/main" id="{952C70E5-1E0E-AF48-9AAA-8D2C0F601B8A}"/>
               </a:ext>
             </a:extLst>
           </p:cNvPr>
@@ -6054,7 +6311,7 @@
           <p:cNvPr id="4" name="Date Placeholder 3">
             <a:extLst>
               <a:ext uri="{FF2B5EF4-FFF2-40B4-BE49-F238E27FC236}">
-                <a16:creationId xmlns:a16="http://schemas.microsoft.com/office/drawing/2014/main" xmlns="" id="{F1C15A6B-4E35-1B48-8E5C-891D2288029F}"/>
+                <a16:creationId xmlns:a16="http://schemas.microsoft.com/office/drawing/2014/main" id="{F1C15A6B-4E35-1B48-8E5C-891D2288029F}"/>
               </a:ext>
             </a:extLst>
           </p:cNvPr>
@@ -6072,7 +6329,7 @@
           <a:p>
             <a:fld id="{96448248-6B88-CC48-B576-281F6871ECC1}" type="datetime1">
               <a:rPr lang="en-US" smtClean="0"/>
-              <a:t>1/30/18</a:t>
+              <a:t>2/2/18</a:t>
             </a:fld>
             <a:endParaRPr lang="en-US"/>
           </a:p>
@@ -6083,7 +6340,7 @@
           <p:cNvPr id="5" name="Slide Number Placeholder 4">
             <a:extLst>
               <a:ext uri="{FF2B5EF4-FFF2-40B4-BE49-F238E27FC236}">
-                <a16:creationId xmlns:a16="http://schemas.microsoft.com/office/drawing/2014/main" xmlns="" id="{309BBF56-2876-9A4F-9AF7-D2546A503AAB}"/>
+                <a16:creationId xmlns:a16="http://schemas.microsoft.com/office/drawing/2014/main" id="{309BBF56-2876-9A4F-9AF7-D2546A503AAB}"/>
               </a:ext>
             </a:extLst>
           </p:cNvPr>
@@ -6160,7 +6417,7 @@
                 <a:latin typeface="Palatino Linotype" pitchFamily="18" charset="0"/>
                 <a:ea typeface="Cambria Math" pitchFamily="18" charset="0"/>
               </a:rPr>
-              <a:t>Exercise 4</a:t>
+              <a:t>Exercise 3</a:t>
             </a:r>
             <a:endParaRPr lang="en-US" dirty="0"/>
           </a:p>
@@ -6178,84 +6435,33 @@
         </p:nvSpPr>
         <p:spPr/>
         <p:txBody>
-          <a:bodyPr>
-            <a:normAutofit fontScale="92500" lnSpcReduction="20000"/>
-          </a:bodyPr>
+          <a:bodyPr/>
           <a:lstStyle/>
           <a:p>
             <a:r>
               <a:rPr lang="en-US" dirty="0">
                 <a:latin typeface="Palatino Linotype" pitchFamily="18" charset="0"/>
               </a:rPr>
-              <a:t>In a normal distribution with µ = 50 and σ = 8, find the following percentile points.</a:t>
+              <a:t>In a normal distribution with a mean (µ) of 150 and a standard deviation (σ) of 20, what is the percentile rank of each of the following scores?</a:t>
             </a:r>
           </a:p>
           <a:p>
             <a:pPr lvl="1"/>
             <a:r>
-              <a:rPr lang="en-US" sz="3200" dirty="0">
-                <a:latin typeface="Palatino Linotype" pitchFamily="18" charset="0"/>
-              </a:rPr>
-              <a:t>95</a:t>
-            </a:r>
-            <a:r>
-              <a:rPr lang="en-US" sz="3200" baseline="30000" dirty="0">
-                <a:latin typeface="Palatino Linotype" pitchFamily="18" charset="0"/>
-              </a:rPr>
-              <a:t>th</a:t>
+              <a:rPr lang="en-US" dirty="0">
+                <a:latin typeface="Palatino Linotype" pitchFamily="18" charset="0"/>
+              </a:rPr>
+              <a:t>120</a:t>
             </a:r>
           </a:p>
           <a:p>
             <a:pPr lvl="1"/>
             <a:r>
-              <a:rPr lang="en-US" sz="3200" dirty="0">
-                <a:latin typeface="Palatino Linotype" pitchFamily="18" charset="0"/>
-              </a:rPr>
-              <a:t>15</a:t>
-            </a:r>
-            <a:r>
-              <a:rPr lang="en-US" sz="3200" baseline="30000" dirty="0">
-                <a:latin typeface="Palatino Linotype" pitchFamily="18" charset="0"/>
-              </a:rPr>
-              <a:t>th</a:t>
-            </a:r>
-          </a:p>
-          <a:p>
-            <a:pPr lvl="1"/>
-            <a:endParaRPr lang="en-US" dirty="0">
-              <a:latin typeface="Palatino Linotype" pitchFamily="18" charset="0"/>
-            </a:endParaRPr>
-          </a:p>
-          <a:p>
-            <a:r>
-              <a:rPr lang="en-US" sz="3000" dirty="0">
-                <a:latin typeface="Palatino Linotype" pitchFamily="18" charset="0"/>
-              </a:rPr>
-              <a:t>In a normal distribution with µ = 100 and σ = 10, what proportion of scores fall between each of the following pairs of scores?</a:t>
-            </a:r>
-          </a:p>
-          <a:p>
-            <a:pPr lvl="1"/>
-            <a:r>
-              <a:rPr lang="en-US" sz="3000" dirty="0">
-                <a:latin typeface="Palatino Linotype" pitchFamily="18" charset="0"/>
-              </a:rPr>
-              <a:t>90 – 110</a:t>
-            </a:r>
-          </a:p>
-          <a:p>
-            <a:pPr lvl="1"/>
-            <a:r>
-              <a:rPr lang="en-US" sz="3000" dirty="0">
-                <a:latin typeface="Palatino Linotype" pitchFamily="18" charset="0"/>
-              </a:rPr>
-              <a:t>85 – 112</a:t>
-            </a:r>
-          </a:p>
-          <a:p>
-            <a:endParaRPr lang="en-US" dirty="0">
-              <a:latin typeface="Palatino Linotype" pitchFamily="18" charset="0"/>
-            </a:endParaRPr>
+              <a:rPr lang="en-US" dirty="0">
+                <a:latin typeface="Palatino Linotype" pitchFamily="18" charset="0"/>
+              </a:rPr>
+              <a:t>163</a:t>
+            </a:r>
           </a:p>
           <a:p>
             <a:endParaRPr lang="en-US" dirty="0"/>
@@ -6267,7 +6473,7 @@
           <p:cNvPr id="4" name="Date Placeholder 3">
             <a:extLst>
               <a:ext uri="{FF2B5EF4-FFF2-40B4-BE49-F238E27FC236}">
-                <a16:creationId xmlns:a16="http://schemas.microsoft.com/office/drawing/2014/main" xmlns="" id="{A15421B9-3684-2044-9A63-FC93A4E37104}"/>
+                <a16:creationId xmlns:a16="http://schemas.microsoft.com/office/drawing/2014/main" id="{F1C15A6B-4E35-1B48-8E5C-891D2288029F}"/>
               </a:ext>
             </a:extLst>
           </p:cNvPr>
@@ -6283,9 +6489,9 @@
           <a:bodyPr/>
           <a:lstStyle/>
           <a:p>
-            <a:fld id="{11E7B0A6-9062-A24A-98B3-524821819E75}" type="datetime1">
+            <a:fld id="{96448248-6B88-CC48-B576-281F6871ECC1}" type="datetime1">
               <a:rPr lang="en-US" smtClean="0"/>
-              <a:t>1/30/18</a:t>
+              <a:t>2/2/18</a:t>
             </a:fld>
             <a:endParaRPr lang="en-US"/>
           </a:p>
@@ -6296,7 +6502,7 @@
           <p:cNvPr id="5" name="Slide Number Placeholder 4">
             <a:extLst>
               <a:ext uri="{FF2B5EF4-FFF2-40B4-BE49-F238E27FC236}">
-                <a16:creationId xmlns:a16="http://schemas.microsoft.com/office/drawing/2014/main" xmlns="" id="{2698494A-EC7D-A94F-A04E-B698577F0ED4}"/>
+                <a16:creationId xmlns:a16="http://schemas.microsoft.com/office/drawing/2014/main" id="{309BBF56-2876-9A4F-9AF7-D2546A503AAB}"/>
               </a:ext>
             </a:extLst>
           </p:cNvPr>
@@ -6320,10 +6526,46 @@
           </a:p>
         </p:txBody>
       </p:sp>
+      <p:pic>
+        <p:nvPicPr>
+          <p:cNvPr id="7" name="Picture 6">
+            <a:extLst>
+              <a:ext uri="{FF2B5EF4-FFF2-40B4-BE49-F238E27FC236}">
+                <a16:creationId xmlns:a16="http://schemas.microsoft.com/office/drawing/2014/main" id="{6027FCCD-0EC8-2A4E-A796-7CA594E4882B}"/>
+              </a:ext>
+            </a:extLst>
+          </p:cNvPr>
+          <p:cNvPicPr>
+            <a:picLocks noChangeAspect="1"/>
+          </p:cNvPicPr>
+          <p:nvPr/>
+        </p:nvPicPr>
+        <p:blipFill>
+          <a:blip r:embed="rId3">
+            <a:extLst>
+              <a:ext uri="{28A0092B-C50C-407E-A947-70E740481C1C}">
+                <a14:useLocalDpi xmlns:a14="http://schemas.microsoft.com/office/drawing/2010/main" val="0"/>
+              </a:ext>
+            </a:extLst>
+          </a:blip>
+          <a:stretch>
+            <a:fillRect/>
+          </a:stretch>
+        </p:blipFill>
+        <p:spPr>
+          <a:xfrm>
+            <a:off x="4572000" y="3428999"/>
+            <a:ext cx="3581400" cy="2923945"/>
+          </a:xfrm>
+          <a:prstGeom prst="rect">
+            <a:avLst/>
+          </a:prstGeom>
+        </p:spPr>
+      </p:pic>
     </p:spTree>
     <p:extLst>
       <p:ext uri="{BB962C8B-B14F-4D97-AF65-F5344CB8AC3E}">
-        <p14:creationId xmlns:p14="http://schemas.microsoft.com/office/powerpoint/2010/main" val="3135369472"/>
+        <p14:creationId xmlns:p14="http://schemas.microsoft.com/office/powerpoint/2010/main" val="1940439968"/>
       </p:ext>
     </p:extLst>
   </p:cSld>
@@ -6362,88 +6604,90 @@
         </p:nvSpPr>
         <p:spPr/>
         <p:txBody>
+          <a:bodyPr/>
+          <a:lstStyle/>
+          <a:p>
+            <a:r>
+              <a:rPr lang="en-US" b="1" dirty="0">
+                <a:solidFill>
+                  <a:srgbClr val="000099"/>
+                </a:solidFill>
+                <a:latin typeface="Palatino Linotype" pitchFamily="18" charset="0"/>
+                <a:ea typeface="Cambria Math" pitchFamily="18" charset="0"/>
+              </a:rPr>
+              <a:t>Exercise 4</a:t>
+            </a:r>
+            <a:endParaRPr lang="en-US" dirty="0"/>
+          </a:p>
+        </p:txBody>
+      </p:sp>
+      <p:sp>
+        <p:nvSpPr>
+          <p:cNvPr id="3" name="Content Placeholder 2"/>
+          <p:cNvSpPr>
+            <a:spLocks noGrp="1"/>
+          </p:cNvSpPr>
+          <p:nvPr>
+            <p:ph idx="1"/>
+          </p:nvPr>
+        </p:nvSpPr>
+        <p:spPr/>
+        <p:txBody>
           <a:bodyPr>
             <a:normAutofit/>
           </a:bodyPr>
           <a:lstStyle/>
           <a:p>
             <a:r>
-              <a:rPr lang="en-US" b="1" dirty="0">
-                <a:solidFill>
-                  <a:srgbClr val="000099"/>
-                </a:solidFill>
-                <a:latin typeface="Palatino Linotype" pitchFamily="18" charset="0"/>
-                <a:ea typeface="Cambria Math" pitchFamily="18" charset="0"/>
-              </a:rPr>
-              <a:t>Exercise 5</a:t>
-            </a:r>
-          </a:p>
-        </p:txBody>
-      </p:sp>
-      <p:sp>
-        <p:nvSpPr>
-          <p:cNvPr id="3" name="Content Placeholder 2"/>
-          <p:cNvSpPr>
-            <a:spLocks noGrp="1"/>
-          </p:cNvSpPr>
-          <p:nvPr>
-            <p:ph idx="1"/>
-          </p:nvPr>
-        </p:nvSpPr>
-        <p:spPr>
-          <a:xfrm>
-            <a:off x="609600" y="1447800"/>
-            <a:ext cx="7848600" cy="4267200"/>
-          </a:xfrm>
-        </p:spPr>
-        <p:txBody>
-          <a:bodyPr>
-            <a:normAutofit lnSpcReduction="10000"/>
-          </a:bodyPr>
-          <a:lstStyle/>
-          <a:p>
-            <a:r>
-              <a:rPr lang="en-US" sz="2800" dirty="0">
-                <a:latin typeface="Palatino Linotype" pitchFamily="18" charset="0"/>
-              </a:rPr>
-              <a:t>“The length of human pregnancies from conception to birth varies according to a distribution that is approximately normal with a mean 266 days and a standard deviation 16 days.”</a:t>
-            </a:r>
-          </a:p>
-          <a:p>
-            <a:r>
-              <a:rPr lang="en-US" sz="2400" b="1" dirty="0">
-                <a:latin typeface="Palatino Linotype" pitchFamily="18" charset="0"/>
-              </a:rPr>
-              <a:t>(1) What percent of pregnancies last less than 240 days (8 months-</a:t>
-            </a:r>
-            <a:r>
-              <a:rPr lang="en-US" sz="2400" b="1" dirty="0" err="1">
-                <a:latin typeface="Palatino Linotype" pitchFamily="18" charset="0"/>
-              </a:rPr>
-              <a:t>ish</a:t>
-            </a:r>
-            <a:r>
-              <a:rPr lang="en-US" sz="2400" b="1" dirty="0">
-                <a:latin typeface="Palatino Linotype" pitchFamily="18" charset="0"/>
-              </a:rPr>
-              <a:t>)?</a:t>
-            </a:r>
-          </a:p>
-          <a:p>
-            <a:r>
-              <a:rPr lang="en-US" sz="2400" b="1" dirty="0">
-                <a:latin typeface="Palatino Linotype" pitchFamily="18" charset="0"/>
-              </a:rPr>
-              <a:t>(2) What percent of pregnancies last between 240 and 270 days?</a:t>
-            </a:r>
-          </a:p>
-          <a:p>
-            <a:r>
-              <a:rPr lang="en-US" sz="2400" b="1" dirty="0">
-                <a:latin typeface="Palatino Linotype" pitchFamily="18" charset="0"/>
-              </a:rPr>
-              <a:t>(3) How long do the longest 20% pregnancies last?</a:t>
-            </a:r>
+              <a:rPr lang="en-US" dirty="0">
+                <a:latin typeface="Palatino Linotype" pitchFamily="18" charset="0"/>
+              </a:rPr>
+              <a:t>In a normal distribution with µ = 50 and σ = 8, find the following percentile points.</a:t>
+            </a:r>
+          </a:p>
+          <a:p>
+            <a:pPr lvl="1"/>
+            <a:r>
+              <a:rPr lang="en-US" sz="3200" dirty="0">
+                <a:latin typeface="Palatino Linotype" pitchFamily="18" charset="0"/>
+              </a:rPr>
+              <a:t>95</a:t>
+            </a:r>
+            <a:r>
+              <a:rPr lang="en-US" sz="3200" baseline="30000" dirty="0">
+                <a:latin typeface="Palatino Linotype" pitchFamily="18" charset="0"/>
+              </a:rPr>
+              <a:t>th</a:t>
+            </a:r>
+          </a:p>
+          <a:p>
+            <a:pPr lvl="1"/>
+            <a:r>
+              <a:rPr lang="en-US" sz="3200" dirty="0">
+                <a:latin typeface="Palatino Linotype" pitchFamily="18" charset="0"/>
+              </a:rPr>
+              <a:t>15</a:t>
+            </a:r>
+            <a:r>
+              <a:rPr lang="en-US" sz="3200" baseline="30000" dirty="0">
+                <a:latin typeface="Palatino Linotype" pitchFamily="18" charset="0"/>
+              </a:rPr>
+              <a:t>th</a:t>
+            </a:r>
+          </a:p>
+          <a:p>
+            <a:pPr lvl="1"/>
+            <a:endParaRPr lang="en-US" dirty="0">
+              <a:latin typeface="Palatino Linotype" pitchFamily="18" charset="0"/>
+            </a:endParaRPr>
+          </a:p>
+          <a:p>
+            <a:endParaRPr lang="en-US" dirty="0">
+              <a:latin typeface="Palatino Linotype" pitchFamily="18" charset="0"/>
+            </a:endParaRPr>
+          </a:p>
+          <a:p>
+            <a:endParaRPr lang="en-US" dirty="0"/>
           </a:p>
         </p:txBody>
       </p:sp>
@@ -6452,7 +6696,7 @@
           <p:cNvPr id="4" name="Date Placeholder 3">
             <a:extLst>
               <a:ext uri="{FF2B5EF4-FFF2-40B4-BE49-F238E27FC236}">
-                <a16:creationId xmlns:a16="http://schemas.microsoft.com/office/drawing/2014/main" xmlns="" id="{415C536B-AAB4-B644-901A-6150BD7D1232}"/>
+                <a16:creationId xmlns:a16="http://schemas.microsoft.com/office/drawing/2014/main" id="{A15421B9-3684-2044-9A63-FC93A4E37104}"/>
               </a:ext>
             </a:extLst>
           </p:cNvPr>
@@ -6468,9 +6712,9 @@
           <a:bodyPr/>
           <a:lstStyle/>
           <a:p>
-            <a:fld id="{593CBB45-453B-2D40-BB2B-6D4486CF7D67}" type="datetime1">
+            <a:fld id="{11E7B0A6-9062-A24A-98B3-524821819E75}" type="datetime1">
               <a:rPr lang="en-US" smtClean="0"/>
-              <a:t>1/30/18</a:t>
+              <a:t>2/2/18</a:t>
             </a:fld>
             <a:endParaRPr lang="en-US"/>
           </a:p>
@@ -6481,7 +6725,7 @@
           <p:cNvPr id="5" name="Slide Number Placeholder 4">
             <a:extLst>
               <a:ext uri="{FF2B5EF4-FFF2-40B4-BE49-F238E27FC236}">
-                <a16:creationId xmlns:a16="http://schemas.microsoft.com/office/drawing/2014/main" xmlns="" id="{CC76F51B-6681-3642-B1C4-FA8A849AB71B}"/>
+                <a16:creationId xmlns:a16="http://schemas.microsoft.com/office/drawing/2014/main" id="{2698494A-EC7D-A94F-A04E-B698577F0ED4}"/>
               </a:ext>
             </a:extLst>
           </p:cNvPr>
@@ -6508,7 +6752,708 @@
     </p:spTree>
     <p:extLst>
       <p:ext uri="{BB962C8B-B14F-4D97-AF65-F5344CB8AC3E}">
-        <p14:creationId xmlns:p14="http://schemas.microsoft.com/office/powerpoint/2010/main" val="718646726"/>
+        <p14:creationId xmlns:p14="http://schemas.microsoft.com/office/powerpoint/2010/main" val="3135369472"/>
+      </p:ext>
+    </p:extLst>
+  </p:cSld>
+  <p:clrMapOvr>
+    <a:masterClrMapping/>
+  </p:clrMapOvr>
+</p:sld>
+</file>
+
+<file path=ppt/slides/slide17.xml><?xml version="1.0" encoding="utf-8"?>
+<p:sld xmlns:a="http://schemas.openxmlformats.org/drawingml/2006/main" xmlns:r="http://schemas.openxmlformats.org/officeDocument/2006/relationships" xmlns:p="http://schemas.openxmlformats.org/presentationml/2006/main">
+  <p:cSld>
+    <p:spTree>
+      <p:nvGrpSpPr>
+        <p:cNvPr id="1" name=""/>
+        <p:cNvGrpSpPr/>
+        <p:nvPr/>
+      </p:nvGrpSpPr>
+      <p:grpSpPr>
+        <a:xfrm>
+          <a:off x="0" y="0"/>
+          <a:ext cx="0" cy="0"/>
+          <a:chOff x="0" y="0"/>
+          <a:chExt cx="0" cy="0"/>
+        </a:xfrm>
+      </p:grpSpPr>
+      <p:sp>
+        <p:nvSpPr>
+          <p:cNvPr id="2" name="Title 1"/>
+          <p:cNvSpPr>
+            <a:spLocks noGrp="1"/>
+          </p:cNvSpPr>
+          <p:nvPr>
+            <p:ph type="title"/>
+          </p:nvPr>
+        </p:nvSpPr>
+        <p:spPr/>
+        <p:txBody>
+          <a:bodyPr/>
+          <a:lstStyle/>
+          <a:p>
+            <a:r>
+              <a:rPr lang="en-US" b="1" dirty="0">
+                <a:solidFill>
+                  <a:srgbClr val="000099"/>
+                </a:solidFill>
+                <a:latin typeface="Palatino Linotype" pitchFamily="18" charset="0"/>
+                <a:ea typeface="Cambria Math" pitchFamily="18" charset="0"/>
+              </a:rPr>
+              <a:t>Exercise 4</a:t>
+            </a:r>
+            <a:endParaRPr lang="en-US" dirty="0"/>
+          </a:p>
+        </p:txBody>
+      </p:sp>
+      <p:sp>
+        <p:nvSpPr>
+          <p:cNvPr id="3" name="Content Placeholder 2"/>
+          <p:cNvSpPr>
+            <a:spLocks noGrp="1"/>
+          </p:cNvSpPr>
+          <p:nvPr>
+            <p:ph idx="1"/>
+          </p:nvPr>
+        </p:nvSpPr>
+        <p:spPr/>
+        <p:txBody>
+          <a:bodyPr>
+            <a:normAutofit/>
+          </a:bodyPr>
+          <a:lstStyle/>
+          <a:p>
+            <a:r>
+              <a:rPr lang="en-US" dirty="0">
+                <a:latin typeface="Palatino Linotype" pitchFamily="18" charset="0"/>
+              </a:rPr>
+              <a:t>In a normal distribution with µ = 50 and σ = 8, find the following percentile points.</a:t>
+            </a:r>
+          </a:p>
+          <a:p>
+            <a:pPr lvl="1"/>
+            <a:r>
+              <a:rPr lang="en-US" sz="3200" dirty="0">
+                <a:latin typeface="Palatino Linotype" pitchFamily="18" charset="0"/>
+              </a:rPr>
+              <a:t>95</a:t>
+            </a:r>
+            <a:r>
+              <a:rPr lang="en-US" sz="3200" baseline="30000" dirty="0">
+                <a:latin typeface="Palatino Linotype" pitchFamily="18" charset="0"/>
+              </a:rPr>
+              <a:t>th</a:t>
+            </a:r>
+          </a:p>
+          <a:p>
+            <a:pPr lvl="1"/>
+            <a:r>
+              <a:rPr lang="en-US" sz="3200" dirty="0">
+                <a:latin typeface="Palatino Linotype" pitchFamily="18" charset="0"/>
+              </a:rPr>
+              <a:t>15</a:t>
+            </a:r>
+            <a:r>
+              <a:rPr lang="en-US" sz="3200" baseline="30000" dirty="0">
+                <a:latin typeface="Palatino Linotype" pitchFamily="18" charset="0"/>
+              </a:rPr>
+              <a:t>th</a:t>
+            </a:r>
+          </a:p>
+          <a:p>
+            <a:pPr lvl="1"/>
+            <a:endParaRPr lang="en-US" dirty="0">
+              <a:latin typeface="Palatino Linotype" pitchFamily="18" charset="0"/>
+            </a:endParaRPr>
+          </a:p>
+          <a:p>
+            <a:endParaRPr lang="en-US" dirty="0">
+              <a:latin typeface="Palatino Linotype" pitchFamily="18" charset="0"/>
+            </a:endParaRPr>
+          </a:p>
+          <a:p>
+            <a:endParaRPr lang="en-US" dirty="0"/>
+          </a:p>
+        </p:txBody>
+      </p:sp>
+      <p:sp>
+        <p:nvSpPr>
+          <p:cNvPr id="4" name="Date Placeholder 3">
+            <a:extLst>
+              <a:ext uri="{FF2B5EF4-FFF2-40B4-BE49-F238E27FC236}">
+                <a16:creationId xmlns:a16="http://schemas.microsoft.com/office/drawing/2014/main" id="{A15421B9-3684-2044-9A63-FC93A4E37104}"/>
+              </a:ext>
+            </a:extLst>
+          </p:cNvPr>
+          <p:cNvSpPr>
+            <a:spLocks noGrp="1"/>
+          </p:cNvSpPr>
+          <p:nvPr>
+            <p:ph type="dt" sz="half" idx="10"/>
+          </p:nvPr>
+        </p:nvSpPr>
+        <p:spPr/>
+        <p:txBody>
+          <a:bodyPr/>
+          <a:lstStyle/>
+          <a:p>
+            <a:fld id="{11E7B0A6-9062-A24A-98B3-524821819E75}" type="datetime1">
+              <a:rPr lang="en-US" smtClean="0"/>
+              <a:t>2/2/18</a:t>
+            </a:fld>
+            <a:endParaRPr lang="en-US"/>
+          </a:p>
+        </p:txBody>
+      </p:sp>
+      <p:sp>
+        <p:nvSpPr>
+          <p:cNvPr id="5" name="Slide Number Placeholder 4">
+            <a:extLst>
+              <a:ext uri="{FF2B5EF4-FFF2-40B4-BE49-F238E27FC236}">
+                <a16:creationId xmlns:a16="http://schemas.microsoft.com/office/drawing/2014/main" id="{2698494A-EC7D-A94F-A04E-B698577F0ED4}"/>
+              </a:ext>
+            </a:extLst>
+          </p:cNvPr>
+          <p:cNvSpPr>
+            <a:spLocks noGrp="1"/>
+          </p:cNvSpPr>
+          <p:nvPr>
+            <p:ph type="sldNum" sz="quarter" idx="12"/>
+          </p:nvPr>
+        </p:nvSpPr>
+        <p:spPr/>
+        <p:txBody>
+          <a:bodyPr/>
+          <a:lstStyle/>
+          <a:p>
+            <a:fld id="{DF27E78F-DC57-4B95-9828-43CFD7017385}" type="slidenum">
+              <a:rPr lang="en-US" smtClean="0"/>
+              <a:t>17</a:t>
+            </a:fld>
+            <a:endParaRPr lang="en-US"/>
+          </a:p>
+        </p:txBody>
+      </p:sp>
+      <p:pic>
+        <p:nvPicPr>
+          <p:cNvPr id="7" name="Picture 6">
+            <a:extLst>
+              <a:ext uri="{FF2B5EF4-FFF2-40B4-BE49-F238E27FC236}">
+                <a16:creationId xmlns:a16="http://schemas.microsoft.com/office/drawing/2014/main" id="{A350072B-8F54-074C-B3FB-7EF04C51ADE4}"/>
+              </a:ext>
+            </a:extLst>
+          </p:cNvPr>
+          <p:cNvPicPr>
+            <a:picLocks noChangeAspect="1"/>
+          </p:cNvPicPr>
+          <p:nvPr/>
+        </p:nvPicPr>
+        <p:blipFill>
+          <a:blip r:embed="rId2">
+            <a:extLst>
+              <a:ext uri="{28A0092B-C50C-407E-A947-70E740481C1C}">
+                <a14:useLocalDpi xmlns:a14="http://schemas.microsoft.com/office/drawing/2010/main" val="0"/>
+              </a:ext>
+            </a:extLst>
+          </a:blip>
+          <a:stretch>
+            <a:fillRect/>
+          </a:stretch>
+        </p:blipFill>
+        <p:spPr>
+          <a:xfrm>
+            <a:off x="298450" y="3698875"/>
+            <a:ext cx="8547100" cy="3022600"/>
+          </a:xfrm>
+          <a:prstGeom prst="rect">
+            <a:avLst/>
+          </a:prstGeom>
+        </p:spPr>
+      </p:pic>
+      <p:sp>
+        <p:nvSpPr>
+          <p:cNvPr id="8" name="Heart 7">
+            <a:extLst>
+              <a:ext uri="{FF2B5EF4-FFF2-40B4-BE49-F238E27FC236}">
+                <a16:creationId xmlns:a16="http://schemas.microsoft.com/office/drawing/2014/main" id="{14DECA64-F152-FC41-B3E5-90AE205CC7C9}"/>
+              </a:ext>
+            </a:extLst>
+          </p:cNvPr>
+          <p:cNvSpPr/>
+          <p:nvPr/>
+        </p:nvSpPr>
+        <p:spPr>
+          <a:xfrm>
+            <a:off x="4114800" y="3352800"/>
+            <a:ext cx="3810000" cy="3200400"/>
+          </a:xfrm>
+          <a:prstGeom prst="heart">
+            <a:avLst/>
+          </a:prstGeom>
+        </p:spPr>
+        <p:style>
+          <a:lnRef idx="2">
+            <a:schemeClr val="accent1">
+              <a:shade val="50000"/>
+            </a:schemeClr>
+          </a:lnRef>
+          <a:fillRef idx="1">
+            <a:schemeClr val="accent1"/>
+          </a:fillRef>
+          <a:effectRef idx="0">
+            <a:schemeClr val="accent1"/>
+          </a:effectRef>
+          <a:fontRef idx="minor">
+            <a:schemeClr val="lt1"/>
+          </a:fontRef>
+        </p:style>
+        <p:txBody>
+          <a:bodyPr rtlCol="0" anchor="ctr"/>
+          <a:lstStyle/>
+          <a:p>
+            <a:pPr algn="ctr"/>
+            <a:endParaRPr lang="en-US"/>
+          </a:p>
+        </p:txBody>
+      </p:sp>
+    </p:spTree>
+    <p:extLst>
+      <p:ext uri="{BB962C8B-B14F-4D97-AF65-F5344CB8AC3E}">
+        <p14:creationId xmlns:p14="http://schemas.microsoft.com/office/powerpoint/2010/main" val="2936286023"/>
+      </p:ext>
+    </p:extLst>
+  </p:cSld>
+  <p:clrMapOvr>
+    <a:masterClrMapping/>
+  </p:clrMapOvr>
+</p:sld>
+</file>
+
+<file path=ppt/slides/slide18.xml><?xml version="1.0" encoding="utf-8"?>
+<p:sld xmlns:a="http://schemas.openxmlformats.org/drawingml/2006/main" xmlns:r="http://schemas.openxmlformats.org/officeDocument/2006/relationships" xmlns:p="http://schemas.openxmlformats.org/presentationml/2006/main">
+  <p:cSld>
+    <p:spTree>
+      <p:nvGrpSpPr>
+        <p:cNvPr id="1" name=""/>
+        <p:cNvGrpSpPr/>
+        <p:nvPr/>
+      </p:nvGrpSpPr>
+      <p:grpSpPr>
+        <a:xfrm>
+          <a:off x="0" y="0"/>
+          <a:ext cx="0" cy="0"/>
+          <a:chOff x="0" y="0"/>
+          <a:chExt cx="0" cy="0"/>
+        </a:xfrm>
+      </p:grpSpPr>
+      <p:sp>
+        <p:nvSpPr>
+          <p:cNvPr id="2" name="Title 1"/>
+          <p:cNvSpPr>
+            <a:spLocks noGrp="1"/>
+          </p:cNvSpPr>
+          <p:nvPr>
+            <p:ph type="title"/>
+          </p:nvPr>
+        </p:nvSpPr>
+        <p:spPr/>
+        <p:txBody>
+          <a:bodyPr/>
+          <a:lstStyle/>
+          <a:p>
+            <a:r>
+              <a:rPr lang="en-US" b="1" dirty="0">
+                <a:solidFill>
+                  <a:srgbClr val="000099"/>
+                </a:solidFill>
+                <a:latin typeface="Palatino Linotype" pitchFamily="18" charset="0"/>
+                <a:ea typeface="Cambria Math" pitchFamily="18" charset="0"/>
+              </a:rPr>
+              <a:t>Exercise </a:t>
+            </a:r>
+            <a:r>
+              <a:rPr lang="en-US" altLang="zh-Hans" b="1" dirty="0">
+                <a:solidFill>
+                  <a:srgbClr val="000099"/>
+                </a:solidFill>
+                <a:latin typeface="Palatino Linotype" pitchFamily="18" charset="0"/>
+                <a:ea typeface="Cambria Math" pitchFamily="18" charset="0"/>
+              </a:rPr>
+              <a:t>5</a:t>
+            </a:r>
+            <a:endParaRPr lang="en-US" dirty="0"/>
+          </a:p>
+        </p:txBody>
+      </p:sp>
+      <p:sp>
+        <p:nvSpPr>
+          <p:cNvPr id="3" name="Content Placeholder 2"/>
+          <p:cNvSpPr>
+            <a:spLocks noGrp="1"/>
+          </p:cNvSpPr>
+          <p:nvPr>
+            <p:ph idx="1"/>
+          </p:nvPr>
+        </p:nvSpPr>
+        <p:spPr/>
+        <p:txBody>
+          <a:bodyPr>
+            <a:normAutofit/>
+          </a:bodyPr>
+          <a:lstStyle/>
+          <a:p>
+            <a:pPr marL="457200" lvl="1" indent="0">
+              <a:buNone/>
+            </a:pPr>
+            <a:endParaRPr lang="en-US" dirty="0">
+              <a:latin typeface="Palatino Linotype" pitchFamily="18" charset="0"/>
+            </a:endParaRPr>
+          </a:p>
+          <a:p>
+            <a:r>
+              <a:rPr lang="en-US" sz="3000" dirty="0">
+                <a:latin typeface="Palatino Linotype" pitchFamily="18" charset="0"/>
+              </a:rPr>
+              <a:t>In a normal distribution with µ = 100 and σ = 10, what proportion of scores fall between each of the following pairs of scores?</a:t>
+            </a:r>
+          </a:p>
+          <a:p>
+            <a:pPr lvl="1">
+              <a:buFont typeface="Courier New" panose="02070309020205020404" pitchFamily="49" charset="0"/>
+              <a:buChar char="o"/>
+            </a:pPr>
+            <a:r>
+              <a:rPr lang="en-US" sz="3000" dirty="0">
+                <a:latin typeface="Palatino Linotype" pitchFamily="18" charset="0"/>
+              </a:rPr>
+              <a:t>90 – 110</a:t>
+            </a:r>
+          </a:p>
+          <a:p>
+            <a:pPr lvl="1">
+              <a:buFont typeface="Courier New" panose="02070309020205020404" pitchFamily="49" charset="0"/>
+              <a:buChar char="o"/>
+            </a:pPr>
+            <a:r>
+              <a:rPr lang="en-US" sz="3000" dirty="0">
+                <a:latin typeface="Palatino Linotype" pitchFamily="18" charset="0"/>
+              </a:rPr>
+              <a:t>85 – 112</a:t>
+            </a:r>
+          </a:p>
+          <a:p>
+            <a:endParaRPr lang="en-US" dirty="0">
+              <a:latin typeface="Palatino Linotype" pitchFamily="18" charset="0"/>
+            </a:endParaRPr>
+          </a:p>
+          <a:p>
+            <a:endParaRPr lang="en-US" dirty="0"/>
+          </a:p>
+        </p:txBody>
+      </p:sp>
+      <p:sp>
+        <p:nvSpPr>
+          <p:cNvPr id="4" name="Date Placeholder 3">
+            <a:extLst>
+              <a:ext uri="{FF2B5EF4-FFF2-40B4-BE49-F238E27FC236}">
+                <a16:creationId xmlns:a16="http://schemas.microsoft.com/office/drawing/2014/main" id="{A15421B9-3684-2044-9A63-FC93A4E37104}"/>
+              </a:ext>
+            </a:extLst>
+          </p:cNvPr>
+          <p:cNvSpPr>
+            <a:spLocks noGrp="1"/>
+          </p:cNvSpPr>
+          <p:nvPr>
+            <p:ph type="dt" sz="half" idx="10"/>
+          </p:nvPr>
+        </p:nvSpPr>
+        <p:spPr/>
+        <p:txBody>
+          <a:bodyPr/>
+          <a:lstStyle/>
+          <a:p>
+            <a:fld id="{11E7B0A6-9062-A24A-98B3-524821819E75}" type="datetime1">
+              <a:rPr lang="en-US" smtClean="0"/>
+              <a:t>2/2/18</a:t>
+            </a:fld>
+            <a:endParaRPr lang="en-US" dirty="0"/>
+          </a:p>
+        </p:txBody>
+      </p:sp>
+      <p:sp>
+        <p:nvSpPr>
+          <p:cNvPr id="5" name="Slide Number Placeholder 4">
+            <a:extLst>
+              <a:ext uri="{FF2B5EF4-FFF2-40B4-BE49-F238E27FC236}">
+                <a16:creationId xmlns:a16="http://schemas.microsoft.com/office/drawing/2014/main" id="{2698494A-EC7D-A94F-A04E-B698577F0ED4}"/>
+              </a:ext>
+            </a:extLst>
+          </p:cNvPr>
+          <p:cNvSpPr>
+            <a:spLocks noGrp="1"/>
+          </p:cNvSpPr>
+          <p:nvPr>
+            <p:ph type="sldNum" sz="quarter" idx="12"/>
+          </p:nvPr>
+        </p:nvSpPr>
+        <p:spPr/>
+        <p:txBody>
+          <a:bodyPr/>
+          <a:lstStyle/>
+          <a:p>
+            <a:fld id="{DF27E78F-DC57-4B95-9828-43CFD7017385}" type="slidenum">
+              <a:rPr lang="en-US" smtClean="0"/>
+              <a:t>18</a:t>
+            </a:fld>
+            <a:endParaRPr lang="en-US"/>
+          </a:p>
+        </p:txBody>
+      </p:sp>
+    </p:spTree>
+    <p:extLst>
+      <p:ext uri="{BB962C8B-B14F-4D97-AF65-F5344CB8AC3E}">
+        <p14:creationId xmlns:p14="http://schemas.microsoft.com/office/powerpoint/2010/main" val="990465494"/>
+      </p:ext>
+    </p:extLst>
+  </p:cSld>
+  <p:clrMapOvr>
+    <a:masterClrMapping/>
+  </p:clrMapOvr>
+</p:sld>
+</file>
+
+<file path=ppt/slides/slide19.xml><?xml version="1.0" encoding="utf-8"?>
+<p:sld xmlns:a="http://schemas.openxmlformats.org/drawingml/2006/main" xmlns:r="http://schemas.openxmlformats.org/officeDocument/2006/relationships" xmlns:p="http://schemas.openxmlformats.org/presentationml/2006/main">
+  <p:cSld>
+    <p:spTree>
+      <p:nvGrpSpPr>
+        <p:cNvPr id="1" name=""/>
+        <p:cNvGrpSpPr/>
+        <p:nvPr/>
+      </p:nvGrpSpPr>
+      <p:grpSpPr>
+        <a:xfrm>
+          <a:off x="0" y="0"/>
+          <a:ext cx="0" cy="0"/>
+          <a:chOff x="0" y="0"/>
+          <a:chExt cx="0" cy="0"/>
+        </a:xfrm>
+      </p:grpSpPr>
+      <p:sp>
+        <p:nvSpPr>
+          <p:cNvPr id="2" name="Title 1"/>
+          <p:cNvSpPr>
+            <a:spLocks noGrp="1"/>
+          </p:cNvSpPr>
+          <p:nvPr>
+            <p:ph type="title"/>
+          </p:nvPr>
+        </p:nvSpPr>
+        <p:spPr>
+          <a:xfrm>
+            <a:off x="457200" y="-268287"/>
+            <a:ext cx="8229600" cy="1143000"/>
+          </a:xfrm>
+        </p:spPr>
+        <p:txBody>
+          <a:bodyPr/>
+          <a:lstStyle/>
+          <a:p>
+            <a:r>
+              <a:rPr lang="en-US" b="1" dirty="0">
+                <a:solidFill>
+                  <a:srgbClr val="000099"/>
+                </a:solidFill>
+                <a:latin typeface="Palatino Linotype" pitchFamily="18" charset="0"/>
+                <a:ea typeface="Cambria Math" pitchFamily="18" charset="0"/>
+              </a:rPr>
+              <a:t>Exercise </a:t>
+            </a:r>
+            <a:r>
+              <a:rPr lang="en-US" altLang="zh-Hans" b="1" dirty="0">
+                <a:solidFill>
+                  <a:srgbClr val="000099"/>
+                </a:solidFill>
+                <a:latin typeface="Palatino Linotype" pitchFamily="18" charset="0"/>
+                <a:ea typeface="Cambria Math" pitchFamily="18" charset="0"/>
+              </a:rPr>
+              <a:t>5</a:t>
+            </a:r>
+            <a:endParaRPr lang="en-US" dirty="0"/>
+          </a:p>
+        </p:txBody>
+      </p:sp>
+      <p:sp>
+        <p:nvSpPr>
+          <p:cNvPr id="3" name="Content Placeholder 2"/>
+          <p:cNvSpPr>
+            <a:spLocks noGrp="1"/>
+          </p:cNvSpPr>
+          <p:nvPr>
+            <p:ph idx="1"/>
+          </p:nvPr>
+        </p:nvSpPr>
+        <p:spPr>
+          <a:xfrm>
+            <a:off x="424249" y="0"/>
+            <a:ext cx="8229600" cy="4525963"/>
+          </a:xfrm>
+        </p:spPr>
+        <p:txBody>
+          <a:bodyPr>
+            <a:normAutofit/>
+          </a:bodyPr>
+          <a:lstStyle/>
+          <a:p>
+            <a:pPr marL="457200" lvl="1" indent="0">
+              <a:buNone/>
+            </a:pPr>
+            <a:endParaRPr lang="en-US" dirty="0">
+              <a:latin typeface="Palatino Linotype" pitchFamily="18" charset="0"/>
+            </a:endParaRPr>
+          </a:p>
+          <a:p>
+            <a:r>
+              <a:rPr lang="en-US" sz="3000" dirty="0">
+                <a:latin typeface="Palatino Linotype" pitchFamily="18" charset="0"/>
+              </a:rPr>
+              <a:t>In a normal distribution with µ = 100 and σ = 10, what proportion of scores fall between each of the following pairs of scores?</a:t>
+            </a:r>
+          </a:p>
+          <a:p>
+            <a:pPr lvl="1">
+              <a:buFont typeface="Courier New" panose="02070309020205020404" pitchFamily="49" charset="0"/>
+              <a:buChar char="o"/>
+            </a:pPr>
+            <a:r>
+              <a:rPr lang="en-US" sz="3000" dirty="0">
+                <a:latin typeface="Palatino Linotype" pitchFamily="18" charset="0"/>
+              </a:rPr>
+              <a:t>90 – 110</a:t>
+            </a:r>
+          </a:p>
+          <a:p>
+            <a:pPr lvl="1">
+              <a:buFont typeface="Courier New" panose="02070309020205020404" pitchFamily="49" charset="0"/>
+              <a:buChar char="o"/>
+            </a:pPr>
+            <a:r>
+              <a:rPr lang="en-US" sz="3000" dirty="0">
+                <a:latin typeface="Palatino Linotype" pitchFamily="18" charset="0"/>
+              </a:rPr>
+              <a:t>85 – 112</a:t>
+            </a:r>
+          </a:p>
+          <a:p>
+            <a:endParaRPr lang="en-US" dirty="0">
+              <a:latin typeface="Palatino Linotype" pitchFamily="18" charset="0"/>
+            </a:endParaRPr>
+          </a:p>
+          <a:p>
+            <a:endParaRPr lang="en-US" dirty="0"/>
+          </a:p>
+        </p:txBody>
+      </p:sp>
+      <p:sp>
+        <p:nvSpPr>
+          <p:cNvPr id="4" name="Date Placeholder 3">
+            <a:extLst>
+              <a:ext uri="{FF2B5EF4-FFF2-40B4-BE49-F238E27FC236}">
+                <a16:creationId xmlns:a16="http://schemas.microsoft.com/office/drawing/2014/main" id="{A15421B9-3684-2044-9A63-FC93A4E37104}"/>
+              </a:ext>
+            </a:extLst>
+          </p:cNvPr>
+          <p:cNvSpPr>
+            <a:spLocks noGrp="1"/>
+          </p:cNvSpPr>
+          <p:nvPr>
+            <p:ph type="dt" sz="half" idx="10"/>
+          </p:nvPr>
+        </p:nvSpPr>
+        <p:spPr/>
+        <p:txBody>
+          <a:bodyPr/>
+          <a:lstStyle/>
+          <a:p>
+            <a:fld id="{11E7B0A6-9062-A24A-98B3-524821819E75}" type="datetime1">
+              <a:rPr lang="en-US" smtClean="0"/>
+              <a:t>2/2/18</a:t>
+            </a:fld>
+            <a:endParaRPr lang="en-US" dirty="0"/>
+          </a:p>
+        </p:txBody>
+      </p:sp>
+      <p:sp>
+        <p:nvSpPr>
+          <p:cNvPr id="5" name="Slide Number Placeholder 4">
+            <a:extLst>
+              <a:ext uri="{FF2B5EF4-FFF2-40B4-BE49-F238E27FC236}">
+                <a16:creationId xmlns:a16="http://schemas.microsoft.com/office/drawing/2014/main" id="{2698494A-EC7D-A94F-A04E-B698577F0ED4}"/>
+              </a:ext>
+            </a:extLst>
+          </p:cNvPr>
+          <p:cNvSpPr>
+            <a:spLocks noGrp="1"/>
+          </p:cNvSpPr>
+          <p:nvPr>
+            <p:ph type="sldNum" sz="quarter" idx="12"/>
+          </p:nvPr>
+        </p:nvSpPr>
+        <p:spPr/>
+        <p:txBody>
+          <a:bodyPr/>
+          <a:lstStyle/>
+          <a:p>
+            <a:fld id="{DF27E78F-DC57-4B95-9828-43CFD7017385}" type="slidenum">
+              <a:rPr lang="en-US" smtClean="0"/>
+              <a:t>19</a:t>
+            </a:fld>
+            <a:endParaRPr lang="en-US"/>
+          </a:p>
+        </p:txBody>
+      </p:sp>
+      <p:pic>
+        <p:nvPicPr>
+          <p:cNvPr id="7" name="Picture 6">
+            <a:extLst>
+              <a:ext uri="{FF2B5EF4-FFF2-40B4-BE49-F238E27FC236}">
+                <a16:creationId xmlns:a16="http://schemas.microsoft.com/office/drawing/2014/main" id="{30203CF4-1A77-CC4D-BBDB-4B61FA5A4A9C}"/>
+              </a:ext>
+            </a:extLst>
+          </p:cNvPr>
+          <p:cNvPicPr>
+            <a:picLocks noChangeAspect="1"/>
+          </p:cNvPicPr>
+          <p:nvPr/>
+        </p:nvPicPr>
+        <p:blipFill>
+          <a:blip r:embed="rId2">
+            <a:extLst>
+              <a:ext uri="{28A0092B-C50C-407E-A947-70E740481C1C}">
+                <a14:useLocalDpi xmlns:a14="http://schemas.microsoft.com/office/drawing/2010/main" val="0"/>
+              </a:ext>
+            </a:extLst>
+          </a:blip>
+          <a:stretch>
+            <a:fillRect/>
+          </a:stretch>
+        </p:blipFill>
+        <p:spPr>
+          <a:xfrm>
+            <a:off x="420130" y="3054264"/>
+            <a:ext cx="8077200" cy="3632200"/>
+          </a:xfrm>
+          <a:prstGeom prst="rect">
+            <a:avLst/>
+          </a:prstGeom>
+        </p:spPr>
+      </p:pic>
+    </p:spTree>
+    <p:extLst>
+      <p:ext uri="{BB962C8B-B14F-4D97-AF65-F5344CB8AC3E}">
+        <p14:creationId xmlns:p14="http://schemas.microsoft.com/office/powerpoint/2010/main" val="1420860065"/>
       </p:ext>
     </p:extLst>
   </p:cSld>
@@ -6639,7 +7584,7 @@
           <a:graphicData uri="http://schemas.openxmlformats.org/presentationml/2006/ole">
             <mc:AlternateContent xmlns:mc="http://schemas.openxmlformats.org/markup-compatibility/2006">
               <mc:Choice xmlns:v="urn:schemas-microsoft-com:vml" Requires="v">
-                <p:oleObj spid="_x0000_s2334" name="Equation" r:id="rId3" imgW="698400" imgH="177480" progId="Equation.DSMT4">
+                <p:oleObj spid="_x0000_s2444" name="Equation" r:id="rId3" imgW="698400" imgH="177480" progId="Equation.DSMT4">
                   <p:embed/>
                 </p:oleObj>
               </mc:Choice>
@@ -6703,7 +7648,7 @@
           <a:graphicData uri="http://schemas.openxmlformats.org/presentationml/2006/ole">
             <mc:AlternateContent xmlns:mc="http://schemas.openxmlformats.org/markup-compatibility/2006">
               <mc:Choice xmlns:v="urn:schemas-microsoft-com:vml" Requires="v">
-                <p:oleObj spid="_x0000_s2335" name="Equation" r:id="rId5" imgW="748975" imgH="203112" progId="Equation.3">
+                <p:oleObj spid="_x0000_s2445" name="Equation" r:id="rId5" imgW="748975" imgH="203112" progId="Equation.3">
                   <p:embed/>
                 </p:oleObj>
               </mc:Choice>
@@ -6773,7 +7718,7 @@
           <a:graphicData uri="http://schemas.openxmlformats.org/presentationml/2006/ole">
             <mc:AlternateContent xmlns:mc="http://schemas.openxmlformats.org/markup-compatibility/2006">
               <mc:Choice xmlns:v="urn:schemas-microsoft-com:vml" Requires="v">
-                <p:oleObj spid="_x0000_s2336" name="Equation" r:id="rId7" imgW="609336" imgH="215806" progId="Equation.3">
+                <p:oleObj spid="_x0000_s2446" name="Equation" r:id="rId7" imgW="609336" imgH="215806" progId="Equation.3">
                   <p:embed/>
                 </p:oleObj>
               </mc:Choice>
@@ -6843,7 +7788,7 @@
           <a:graphicData uri="http://schemas.openxmlformats.org/presentationml/2006/ole">
             <mc:AlternateContent xmlns:mc="http://schemas.openxmlformats.org/markup-compatibility/2006">
               <mc:Choice xmlns:v="urn:schemas-microsoft-com:vml" Requires="v">
-                <p:oleObj spid="_x0000_s2337" name="Equation" r:id="rId9" imgW="1269720" imgH="444240" progId="Equation.DSMT4">
+                <p:oleObj spid="_x0000_s2447" name="Equation" r:id="rId9" imgW="1269720" imgH="444240" progId="Equation.DSMT4">
                   <p:embed/>
                 </p:oleObj>
               </mc:Choice>
@@ -6907,7 +7852,7 @@
           <a:graphicData uri="http://schemas.openxmlformats.org/presentationml/2006/ole">
             <mc:AlternateContent xmlns:mc="http://schemas.openxmlformats.org/markup-compatibility/2006">
               <mc:Choice xmlns:v="urn:schemas-microsoft-com:vml" Requires="v">
-                <p:oleObj spid="_x0000_s2338" name="Equation" r:id="rId11" imgW="965160" imgH="241200" progId="Equation.DSMT4">
+                <p:oleObj spid="_x0000_s2448" name="Equation" r:id="rId11" imgW="965160" imgH="241200" progId="Equation.DSMT4">
                   <p:embed/>
                 </p:oleObj>
               </mc:Choice>
@@ -6954,7 +7899,7 @@
           <p:cNvPr id="5" name="Date Placeholder 4">
             <a:extLst>
               <a:ext uri="{FF2B5EF4-FFF2-40B4-BE49-F238E27FC236}">
-                <a16:creationId xmlns:a16="http://schemas.microsoft.com/office/drawing/2014/main" xmlns="" id="{65EAA0A6-A7C2-DD4A-A9D9-18F3FFEEB866}"/>
+                <a16:creationId xmlns:a16="http://schemas.microsoft.com/office/drawing/2014/main" id="{65EAA0A6-A7C2-DD4A-A9D9-18F3FFEEB866}"/>
               </a:ext>
             </a:extLst>
           </p:cNvPr>
@@ -6972,7 +7917,7 @@
           <a:p>
             <a:fld id="{C48AD8B0-570F-FD4A-8482-C6D35A227EED}" type="datetime1">
               <a:rPr lang="en-US" smtClean="0"/>
-              <a:t>1/30/18</a:t>
+              <a:t>2/2/18</a:t>
             </a:fld>
             <a:endParaRPr lang="en-US"/>
           </a:p>
@@ -6983,7 +7928,7 @@
           <p:cNvPr id="6" name="Slide Number Placeholder 5">
             <a:extLst>
               <a:ext uri="{FF2B5EF4-FFF2-40B4-BE49-F238E27FC236}">
-                <a16:creationId xmlns:a16="http://schemas.microsoft.com/office/drawing/2014/main" xmlns="" id="{D1C10CD3-5FF6-894E-8511-FA36CDC1B3B3}"/>
+                <a16:creationId xmlns:a16="http://schemas.microsoft.com/office/drawing/2014/main" id="{D1C10CD3-5FF6-894E-8511-FA36CDC1B3B3}"/>
               </a:ext>
             </a:extLst>
           </p:cNvPr>
@@ -7020,7 +7965,7 @@
   <p:timing>
     <p:tnLst>
       <p:par>
-        <p:cTn xmlns:p14="http://schemas.microsoft.com/office/powerpoint/2010/main" id="1" dur="indefinite" restart="never" nodeType="tmRoot">
+        <p:cTn id="1" dur="indefinite" restart="never" nodeType="tmRoot">
           <p:childTnLst>
             <p:seq concurrent="1" nextAc="seek">
               <p:cTn id="2" dur="indefinite" nodeType="mainSeq">
@@ -7194,6 +8139,379 @@
 </p:sld>
 </file>
 
+<file path=ppt/slides/slide20.xml><?xml version="1.0" encoding="utf-8"?>
+<p:sld xmlns:a="http://schemas.openxmlformats.org/drawingml/2006/main" xmlns:r="http://schemas.openxmlformats.org/officeDocument/2006/relationships" xmlns:p="http://schemas.openxmlformats.org/presentationml/2006/main">
+  <p:cSld>
+    <p:spTree>
+      <p:nvGrpSpPr>
+        <p:cNvPr id="1" name=""/>
+        <p:cNvGrpSpPr/>
+        <p:nvPr/>
+      </p:nvGrpSpPr>
+      <p:grpSpPr>
+        <a:xfrm>
+          <a:off x="0" y="0"/>
+          <a:ext cx="0" cy="0"/>
+          <a:chOff x="0" y="0"/>
+          <a:chExt cx="0" cy="0"/>
+        </a:xfrm>
+      </p:grpSpPr>
+      <p:sp>
+        <p:nvSpPr>
+          <p:cNvPr id="2" name="Title 1"/>
+          <p:cNvSpPr>
+            <a:spLocks noGrp="1"/>
+          </p:cNvSpPr>
+          <p:nvPr>
+            <p:ph type="title"/>
+          </p:nvPr>
+        </p:nvSpPr>
+        <p:spPr/>
+        <p:txBody>
+          <a:bodyPr>
+            <a:normAutofit/>
+          </a:bodyPr>
+          <a:lstStyle/>
+          <a:p>
+            <a:r>
+              <a:rPr lang="en-US" b="1" dirty="0">
+                <a:solidFill>
+                  <a:srgbClr val="000099"/>
+                </a:solidFill>
+                <a:latin typeface="Palatino Linotype" pitchFamily="18" charset="0"/>
+                <a:ea typeface="Cambria Math" pitchFamily="18" charset="0"/>
+              </a:rPr>
+              <a:t>Exercise </a:t>
+            </a:r>
+            <a:r>
+              <a:rPr lang="en-US" altLang="zh-Hans" b="1" dirty="0">
+                <a:solidFill>
+                  <a:srgbClr val="000099"/>
+                </a:solidFill>
+                <a:latin typeface="Palatino Linotype" pitchFamily="18" charset="0"/>
+                <a:ea typeface="Cambria Math" pitchFamily="18" charset="0"/>
+              </a:rPr>
+              <a:t>6</a:t>
+            </a:r>
+            <a:endParaRPr lang="en-US" b="1" dirty="0">
+              <a:solidFill>
+                <a:srgbClr val="000099"/>
+              </a:solidFill>
+              <a:latin typeface="Palatino Linotype" pitchFamily="18" charset="0"/>
+              <a:ea typeface="Cambria Math" pitchFamily="18" charset="0"/>
+            </a:endParaRPr>
+          </a:p>
+        </p:txBody>
+      </p:sp>
+      <p:sp>
+        <p:nvSpPr>
+          <p:cNvPr id="3" name="Content Placeholder 2"/>
+          <p:cNvSpPr>
+            <a:spLocks noGrp="1"/>
+          </p:cNvSpPr>
+          <p:nvPr>
+            <p:ph idx="1"/>
+          </p:nvPr>
+        </p:nvSpPr>
+        <p:spPr>
+          <a:xfrm>
+            <a:off x="609600" y="1447800"/>
+            <a:ext cx="7848600" cy="4267200"/>
+          </a:xfrm>
+        </p:spPr>
+        <p:txBody>
+          <a:bodyPr>
+            <a:normAutofit lnSpcReduction="10000"/>
+          </a:bodyPr>
+          <a:lstStyle/>
+          <a:p>
+            <a:r>
+              <a:rPr lang="en-US" sz="2800" dirty="0">
+                <a:latin typeface="Palatino Linotype" pitchFamily="18" charset="0"/>
+              </a:rPr>
+              <a:t>“The length of human pregnancies from conception to birth varies according to a distribution that is approximately normal with a mean 266 days and a standard deviation 16 days.”</a:t>
+            </a:r>
+          </a:p>
+          <a:p>
+            <a:r>
+              <a:rPr lang="en-US" sz="2400" b="1" dirty="0">
+                <a:latin typeface="Palatino Linotype" pitchFamily="18" charset="0"/>
+              </a:rPr>
+              <a:t>(1) What percent of pregnancies last less than 240 days (8 months-</a:t>
+            </a:r>
+            <a:r>
+              <a:rPr lang="en-US" sz="2400" b="1" dirty="0" err="1">
+                <a:latin typeface="Palatino Linotype" pitchFamily="18" charset="0"/>
+              </a:rPr>
+              <a:t>ish</a:t>
+            </a:r>
+            <a:r>
+              <a:rPr lang="en-US" sz="2400" b="1" dirty="0">
+                <a:latin typeface="Palatino Linotype" pitchFamily="18" charset="0"/>
+              </a:rPr>
+              <a:t>)?</a:t>
+            </a:r>
+          </a:p>
+          <a:p>
+            <a:r>
+              <a:rPr lang="en-US" sz="2400" b="1" dirty="0">
+                <a:latin typeface="Palatino Linotype" pitchFamily="18" charset="0"/>
+              </a:rPr>
+              <a:t>(2) What percent of pregnancies last between 240 and 270 days?</a:t>
+            </a:r>
+          </a:p>
+          <a:p>
+            <a:r>
+              <a:rPr lang="en-US" sz="2400" b="1" dirty="0">
+                <a:latin typeface="Palatino Linotype" pitchFamily="18" charset="0"/>
+              </a:rPr>
+              <a:t>(3) How long do the longest 20% pregnancies last?</a:t>
+            </a:r>
+          </a:p>
+        </p:txBody>
+      </p:sp>
+      <p:sp>
+        <p:nvSpPr>
+          <p:cNvPr id="4" name="Date Placeholder 3">
+            <a:extLst>
+              <a:ext uri="{FF2B5EF4-FFF2-40B4-BE49-F238E27FC236}">
+                <a16:creationId xmlns:a16="http://schemas.microsoft.com/office/drawing/2014/main" id="{415C536B-AAB4-B644-901A-6150BD7D1232}"/>
+              </a:ext>
+            </a:extLst>
+          </p:cNvPr>
+          <p:cNvSpPr>
+            <a:spLocks noGrp="1"/>
+          </p:cNvSpPr>
+          <p:nvPr>
+            <p:ph type="dt" sz="half" idx="10"/>
+          </p:nvPr>
+        </p:nvSpPr>
+        <p:spPr/>
+        <p:txBody>
+          <a:bodyPr/>
+          <a:lstStyle/>
+          <a:p>
+            <a:fld id="{593CBB45-453B-2D40-BB2B-6D4486CF7D67}" type="datetime1">
+              <a:rPr lang="en-US" smtClean="0"/>
+              <a:t>2/2/18</a:t>
+            </a:fld>
+            <a:endParaRPr lang="en-US"/>
+          </a:p>
+        </p:txBody>
+      </p:sp>
+      <p:sp>
+        <p:nvSpPr>
+          <p:cNvPr id="5" name="Slide Number Placeholder 4">
+            <a:extLst>
+              <a:ext uri="{FF2B5EF4-FFF2-40B4-BE49-F238E27FC236}">
+                <a16:creationId xmlns:a16="http://schemas.microsoft.com/office/drawing/2014/main" id="{CC76F51B-6681-3642-B1C4-FA8A849AB71B}"/>
+              </a:ext>
+            </a:extLst>
+          </p:cNvPr>
+          <p:cNvSpPr>
+            <a:spLocks noGrp="1"/>
+          </p:cNvSpPr>
+          <p:nvPr>
+            <p:ph type="sldNum" sz="quarter" idx="12"/>
+          </p:nvPr>
+        </p:nvSpPr>
+        <p:spPr/>
+        <p:txBody>
+          <a:bodyPr/>
+          <a:lstStyle/>
+          <a:p>
+            <a:fld id="{DF27E78F-DC57-4B95-9828-43CFD7017385}" type="slidenum">
+              <a:rPr lang="en-US" smtClean="0"/>
+              <a:t>20</a:t>
+            </a:fld>
+            <a:endParaRPr lang="en-US"/>
+          </a:p>
+        </p:txBody>
+      </p:sp>
+    </p:spTree>
+    <p:extLst>
+      <p:ext uri="{BB962C8B-B14F-4D97-AF65-F5344CB8AC3E}">
+        <p14:creationId xmlns:p14="http://schemas.microsoft.com/office/powerpoint/2010/main" val="718646726"/>
+      </p:ext>
+    </p:extLst>
+  </p:cSld>
+  <p:clrMapOvr>
+    <a:masterClrMapping/>
+  </p:clrMapOvr>
+</p:sld>
+</file>
+
+<file path=ppt/slides/slide21.xml><?xml version="1.0" encoding="utf-8"?>
+<p:sld xmlns:a="http://schemas.openxmlformats.org/drawingml/2006/main" xmlns:r="http://schemas.openxmlformats.org/officeDocument/2006/relationships" xmlns:p="http://schemas.openxmlformats.org/presentationml/2006/main">
+  <p:cSld>
+    <p:spTree>
+      <p:nvGrpSpPr>
+        <p:cNvPr id="1" name=""/>
+        <p:cNvGrpSpPr/>
+        <p:nvPr/>
+      </p:nvGrpSpPr>
+      <p:grpSpPr>
+        <a:xfrm>
+          <a:off x="0" y="0"/>
+          <a:ext cx="0" cy="0"/>
+          <a:chOff x="0" y="0"/>
+          <a:chExt cx="0" cy="0"/>
+        </a:xfrm>
+      </p:grpSpPr>
+      <p:sp>
+        <p:nvSpPr>
+          <p:cNvPr id="2" name="Title 1"/>
+          <p:cNvSpPr>
+            <a:spLocks noGrp="1"/>
+          </p:cNvSpPr>
+          <p:nvPr>
+            <p:ph type="title"/>
+          </p:nvPr>
+        </p:nvSpPr>
+        <p:spPr/>
+        <p:txBody>
+          <a:bodyPr>
+            <a:normAutofit/>
+          </a:bodyPr>
+          <a:lstStyle/>
+          <a:p>
+            <a:r>
+              <a:rPr lang="en-US" b="1" dirty="0">
+                <a:solidFill>
+                  <a:srgbClr val="000099"/>
+                </a:solidFill>
+                <a:latin typeface="Palatino Linotype" pitchFamily="18" charset="0"/>
+                <a:ea typeface="Cambria Math" pitchFamily="18" charset="0"/>
+              </a:rPr>
+              <a:t>Exercise </a:t>
+            </a:r>
+            <a:r>
+              <a:rPr lang="en-US" altLang="zh-Hans" b="1" dirty="0">
+                <a:solidFill>
+                  <a:srgbClr val="000099"/>
+                </a:solidFill>
+                <a:latin typeface="Palatino Linotype" pitchFamily="18" charset="0"/>
+                <a:ea typeface="Cambria Math" pitchFamily="18" charset="0"/>
+              </a:rPr>
+              <a:t>6</a:t>
+            </a:r>
+            <a:endParaRPr lang="en-US" b="1" dirty="0">
+              <a:solidFill>
+                <a:srgbClr val="000099"/>
+              </a:solidFill>
+              <a:latin typeface="Palatino Linotype" pitchFamily="18" charset="0"/>
+              <a:ea typeface="Cambria Math" pitchFamily="18" charset="0"/>
+            </a:endParaRPr>
+          </a:p>
+        </p:txBody>
+      </p:sp>
+      <p:sp>
+        <p:nvSpPr>
+          <p:cNvPr id="4" name="Date Placeholder 3">
+            <a:extLst>
+              <a:ext uri="{FF2B5EF4-FFF2-40B4-BE49-F238E27FC236}">
+                <a16:creationId xmlns:a16="http://schemas.microsoft.com/office/drawing/2014/main" id="{415C536B-AAB4-B644-901A-6150BD7D1232}"/>
+              </a:ext>
+            </a:extLst>
+          </p:cNvPr>
+          <p:cNvSpPr>
+            <a:spLocks noGrp="1"/>
+          </p:cNvSpPr>
+          <p:nvPr>
+            <p:ph type="dt" sz="half" idx="10"/>
+          </p:nvPr>
+        </p:nvSpPr>
+        <p:spPr/>
+        <p:txBody>
+          <a:bodyPr/>
+          <a:lstStyle/>
+          <a:p>
+            <a:fld id="{593CBB45-453B-2D40-BB2B-6D4486CF7D67}" type="datetime1">
+              <a:rPr lang="en-US" smtClean="0"/>
+              <a:t>2/2/18</a:t>
+            </a:fld>
+            <a:endParaRPr lang="en-US"/>
+          </a:p>
+        </p:txBody>
+      </p:sp>
+      <p:sp>
+        <p:nvSpPr>
+          <p:cNvPr id="5" name="Slide Number Placeholder 4">
+            <a:extLst>
+              <a:ext uri="{FF2B5EF4-FFF2-40B4-BE49-F238E27FC236}">
+                <a16:creationId xmlns:a16="http://schemas.microsoft.com/office/drawing/2014/main" id="{CC76F51B-6681-3642-B1C4-FA8A849AB71B}"/>
+              </a:ext>
+            </a:extLst>
+          </p:cNvPr>
+          <p:cNvSpPr>
+            <a:spLocks noGrp="1"/>
+          </p:cNvSpPr>
+          <p:nvPr>
+            <p:ph type="sldNum" sz="quarter" idx="12"/>
+          </p:nvPr>
+        </p:nvSpPr>
+        <p:spPr/>
+        <p:txBody>
+          <a:bodyPr/>
+          <a:lstStyle/>
+          <a:p>
+            <a:fld id="{DF27E78F-DC57-4B95-9828-43CFD7017385}" type="slidenum">
+              <a:rPr lang="en-US" smtClean="0"/>
+              <a:t>21</a:t>
+            </a:fld>
+            <a:endParaRPr lang="en-US"/>
+          </a:p>
+        </p:txBody>
+      </p:sp>
+      <p:pic>
+        <p:nvPicPr>
+          <p:cNvPr id="9" name="Picture 8">
+            <a:extLst>
+              <a:ext uri="{FF2B5EF4-FFF2-40B4-BE49-F238E27FC236}">
+                <a16:creationId xmlns:a16="http://schemas.microsoft.com/office/drawing/2014/main" id="{917FBC24-F3C0-1542-8171-CFAD095D15B4}"/>
+              </a:ext>
+            </a:extLst>
+          </p:cNvPr>
+          <p:cNvPicPr>
+            <a:picLocks noChangeAspect="1"/>
+          </p:cNvPicPr>
+          <p:nvPr/>
+        </p:nvPicPr>
+        <p:blipFill>
+          <a:blip r:embed="rId2">
+            <a:extLst>
+              <a:ext uri="{28A0092B-C50C-407E-A947-70E740481C1C}">
+                <a14:useLocalDpi xmlns:a14="http://schemas.microsoft.com/office/drawing/2010/main" val="0"/>
+              </a:ext>
+            </a:extLst>
+          </a:blip>
+          <a:stretch>
+            <a:fillRect/>
+          </a:stretch>
+        </p:blipFill>
+        <p:spPr>
+          <a:xfrm>
+            <a:off x="495300" y="1174750"/>
+            <a:ext cx="8153400" cy="4508500"/>
+          </a:xfrm>
+          <a:prstGeom prst="rect">
+            <a:avLst/>
+          </a:prstGeom>
+        </p:spPr>
+      </p:pic>
+    </p:spTree>
+    <p:extLst>
+      <p:ext uri="{BB962C8B-B14F-4D97-AF65-F5344CB8AC3E}">
+        <p14:creationId xmlns:p14="http://schemas.microsoft.com/office/powerpoint/2010/main" val="2409183465"/>
+      </p:ext>
+    </p:extLst>
+  </p:cSld>
+  <p:clrMapOvr>
+    <a:masterClrMapping/>
+  </p:clrMapOvr>
+</p:sld>
+</file>
+
 <file path=ppt/slides/slide3.xml><?xml version="1.0" encoding="utf-8"?>
 <p:sld xmlns:a="http://schemas.openxmlformats.org/drawingml/2006/main" xmlns:r="http://schemas.openxmlformats.org/officeDocument/2006/relationships" xmlns:p="http://schemas.openxmlformats.org/presentationml/2006/main">
   <p:cSld>
@@ -7273,14 +8591,14 @@
           </a:ln>
           <a:extLst>
             <a:ext uri="{909E8E84-426E-40dd-AFC4-6F175D3DCCD1}">
-              <a14:hiddenFill xmlns:a14="http://schemas.microsoft.com/office/drawing/2010/main">
+              <a14:hiddenFill xmlns:a14="http://schemas.microsoft.com/office/drawing/2010/main" xmlns="">
                 <a:solidFill>
                   <a:srgbClr val="FFFFFF"/>
                 </a:solidFill>
               </a14:hiddenFill>
             </a:ext>
             <a:ext uri="{91240B29-F687-4f45-9708-019B960494DF}">
-              <a14:hiddenLine xmlns:a14="http://schemas.microsoft.com/office/drawing/2010/main" w="9525" algn="ctr">
+              <a14:hiddenLine xmlns:a14="http://schemas.microsoft.com/office/drawing/2010/main" xmlns="" w="9525" algn="ctr">
                 <a:solidFill>
                   <a:srgbClr val="000000"/>
                 </a:solidFill>
@@ -7456,14 +8774,14 @@
           </a:ln>
           <a:extLst>
             <a:ext uri="{909E8E84-426E-40dd-AFC4-6F175D3DCCD1}">
-              <a14:hiddenFill xmlns:a14="http://schemas.microsoft.com/office/drawing/2010/main">
+              <a14:hiddenFill xmlns:a14="http://schemas.microsoft.com/office/drawing/2010/main" xmlns="">
                 <a:solidFill>
                   <a:srgbClr val="FFFFFF"/>
                 </a:solidFill>
               </a14:hiddenFill>
             </a:ext>
             <a:ext uri="{91240B29-F687-4f45-9708-019B960494DF}">
-              <a14:hiddenLine xmlns:a14="http://schemas.microsoft.com/office/drawing/2010/main" w="9525" algn="ctr">
+              <a14:hiddenLine xmlns:a14="http://schemas.microsoft.com/office/drawing/2010/main" xmlns="" w="9525" algn="ctr">
                 <a:solidFill>
                   <a:srgbClr val="000000"/>
                 </a:solidFill>
@@ -7506,14 +8824,14 @@
           </a:ln>
           <a:extLst>
             <a:ext uri="{909E8E84-426E-40dd-AFC4-6F175D3DCCD1}">
-              <a14:hiddenFill xmlns:a14="http://schemas.microsoft.com/office/drawing/2010/main">
+              <a14:hiddenFill xmlns:a14="http://schemas.microsoft.com/office/drawing/2010/main" xmlns="">
                 <a:solidFill>
                   <a:srgbClr val="FFFFFF"/>
                 </a:solidFill>
               </a14:hiddenFill>
             </a:ext>
             <a:ext uri="{91240B29-F687-4f45-9708-019B960494DF}">
-              <a14:hiddenLine xmlns:a14="http://schemas.microsoft.com/office/drawing/2010/main" w="9525" algn="ctr">
+              <a14:hiddenLine xmlns:a14="http://schemas.microsoft.com/office/drawing/2010/main" xmlns="" w="9525" algn="ctr">
                 <a:solidFill>
                   <a:srgbClr val="000000"/>
                 </a:solidFill>
@@ -7556,14 +8874,14 @@
           </a:ln>
           <a:extLst>
             <a:ext uri="{909E8E84-426E-40dd-AFC4-6F175D3DCCD1}">
-              <a14:hiddenFill xmlns:a14="http://schemas.microsoft.com/office/drawing/2010/main">
+              <a14:hiddenFill xmlns:a14="http://schemas.microsoft.com/office/drawing/2010/main" xmlns="">
                 <a:solidFill>
                   <a:srgbClr val="FFFFFF"/>
                 </a:solidFill>
               </a14:hiddenFill>
             </a:ext>
             <a:ext uri="{91240B29-F687-4f45-9708-019B960494DF}">
-              <a14:hiddenLine xmlns:a14="http://schemas.microsoft.com/office/drawing/2010/main" w="9525" algn="ctr">
+              <a14:hiddenLine xmlns:a14="http://schemas.microsoft.com/office/drawing/2010/main" xmlns="" w="9525" algn="ctr">
                 <a:solidFill>
                   <a:srgbClr val="000000"/>
                 </a:solidFill>
@@ -7729,14 +9047,14 @@
           </a:ln>
           <a:extLst>
             <a:ext uri="{909E8E84-426E-40dd-AFC4-6F175D3DCCD1}">
-              <a14:hiddenFill xmlns:a14="http://schemas.microsoft.com/office/drawing/2010/main">
+              <a14:hiddenFill xmlns:a14="http://schemas.microsoft.com/office/drawing/2010/main" xmlns="">
                 <a:solidFill>
                   <a:srgbClr val="FFFFFF"/>
                 </a:solidFill>
               </a14:hiddenFill>
             </a:ext>
             <a:ext uri="{91240B29-F687-4f45-9708-019B960494DF}">
-              <a14:hiddenLine xmlns:a14="http://schemas.microsoft.com/office/drawing/2010/main" w="9525" algn="ctr">
+              <a14:hiddenLine xmlns:a14="http://schemas.microsoft.com/office/drawing/2010/main" xmlns="" w="9525" algn="ctr">
                 <a:solidFill>
                   <a:srgbClr val="000000"/>
                 </a:solidFill>
@@ -7779,14 +9097,14 @@
           </a:ln>
           <a:extLst>
             <a:ext uri="{909E8E84-426E-40dd-AFC4-6F175D3DCCD1}">
-              <a14:hiddenFill xmlns:a14="http://schemas.microsoft.com/office/drawing/2010/main">
+              <a14:hiddenFill xmlns:a14="http://schemas.microsoft.com/office/drawing/2010/main" xmlns="">
                 <a:solidFill>
                   <a:srgbClr val="FFFFFF"/>
                 </a:solidFill>
               </a14:hiddenFill>
             </a:ext>
             <a:ext uri="{91240B29-F687-4f45-9708-019B960494DF}">
-              <a14:hiddenLine xmlns:a14="http://schemas.microsoft.com/office/drawing/2010/main" w="9525" algn="ctr">
+              <a14:hiddenLine xmlns:a14="http://schemas.microsoft.com/office/drawing/2010/main" xmlns="" w="9525" algn="ctr">
                 <a:solidFill>
                   <a:srgbClr val="000000"/>
                 </a:solidFill>
@@ -7829,14 +9147,14 @@
           </a:ln>
           <a:extLst>
             <a:ext uri="{909E8E84-426E-40dd-AFC4-6F175D3DCCD1}">
-              <a14:hiddenFill xmlns:a14="http://schemas.microsoft.com/office/drawing/2010/main">
+              <a14:hiddenFill xmlns:a14="http://schemas.microsoft.com/office/drawing/2010/main" xmlns="">
                 <a:solidFill>
                   <a:srgbClr val="FFFFFF"/>
                 </a:solidFill>
               </a14:hiddenFill>
             </a:ext>
             <a:ext uri="{91240B29-F687-4f45-9708-019B960494DF}">
-              <a14:hiddenLine xmlns:a14="http://schemas.microsoft.com/office/drawing/2010/main" w="9525" algn="ctr">
+              <a14:hiddenLine xmlns:a14="http://schemas.microsoft.com/office/drawing/2010/main" xmlns="" w="9525" algn="ctr">
                 <a:solidFill>
                   <a:srgbClr val="000000"/>
                 </a:solidFill>
@@ -7879,7 +9197,7 @@
           <a:graphicData uri="http://schemas.openxmlformats.org/presentationml/2006/ole">
             <mc:AlternateContent xmlns:mc="http://schemas.openxmlformats.org/markup-compatibility/2006">
               <mc:Choice xmlns:v="urn:schemas-microsoft-com:vml" Requires="v">
-                <p:oleObj spid="_x0000_s3116" name="Bitmap Image" r:id="rId4" imgW="6047619" imgH="3371429" progId="Paint.Picture">
+                <p:oleObj spid="_x0000_s3138" name="Bitmap Image" r:id="rId4" imgW="6047619" imgH="3371429" progId="Paint.Picture">
                   <p:embed/>
                 </p:oleObj>
               </mc:Choice>
@@ -7922,14 +9240,14 @@
                       <a:effectLst/>
                       <a:extLst>
                         <a:ext uri="{909E8E84-426E-40dd-AFC4-6F175D3DCCD1}">
-                          <a14:hiddenFill xmlns:a14="http://schemas.microsoft.com/office/drawing/2010/main">
+                          <a14:hiddenFill xmlns:a14="http://schemas.microsoft.com/office/drawing/2010/main" xmlns="">
                             <a:solidFill>
                               <a:schemeClr val="accent1"/>
                             </a:solidFill>
                           </a14:hiddenFill>
                         </a:ext>
                         <a:ext uri="{91240B29-F687-4f45-9708-019B960494DF}">
-                          <a14:hiddenLine xmlns:a14="http://schemas.microsoft.com/office/drawing/2010/main" w="9525" algn="ctr">
+                          <a14:hiddenLine xmlns:a14="http://schemas.microsoft.com/office/drawing/2010/main" xmlns="" w="9525" algn="ctr">
                             <a:solidFill>
                               <a:schemeClr val="tx1"/>
                             </a:solidFill>
@@ -7939,7 +9257,7 @@
                           </a14:hiddenLine>
                         </a:ext>
                         <a:ext uri="{AF507438-7753-43e0-B8FC-AC1667EBCBE1}">
-                          <a14:hiddenEffects xmlns:a14="http://schemas.microsoft.com/office/drawing/2010/main">
+                          <a14:hiddenEffects xmlns:a14="http://schemas.microsoft.com/office/drawing/2010/main" xmlns="">
                             <a:effectLst>
                               <a:outerShdw dist="35921" dir="2700000" algn="ctr" rotWithShape="0">
                                 <a:schemeClr val="bg2"/>
@@ -7961,7 +9279,7 @@
           <p:cNvPr id="2" name="Date Placeholder 1">
             <a:extLst>
               <a:ext uri="{FF2B5EF4-FFF2-40B4-BE49-F238E27FC236}">
-                <a16:creationId xmlns:a16="http://schemas.microsoft.com/office/drawing/2014/main" xmlns="" id="{FAB87860-7ABE-9746-B438-A91FC904C2E1}"/>
+                <a16:creationId xmlns:a16="http://schemas.microsoft.com/office/drawing/2014/main" id="{FAB87860-7ABE-9746-B438-A91FC904C2E1}"/>
               </a:ext>
             </a:extLst>
           </p:cNvPr>
@@ -7979,7 +9297,7 @@
           <a:p>
             <a:fld id="{D4B0FB1D-94B3-0044-A9F3-B610CF115FA9}" type="datetime1">
               <a:rPr lang="en-US" smtClean="0"/>
-              <a:t>1/30/18</a:t>
+              <a:t>2/2/18</a:t>
             </a:fld>
             <a:endParaRPr lang="en-US"/>
           </a:p>
@@ -7990,7 +9308,7 @@
           <p:cNvPr id="3" name="Slide Number Placeholder 2">
             <a:extLst>
               <a:ext uri="{FF2B5EF4-FFF2-40B4-BE49-F238E27FC236}">
-                <a16:creationId xmlns:a16="http://schemas.microsoft.com/office/drawing/2014/main" xmlns="" id="{29EC6F43-DECA-9147-BECE-1347761ECF9F}"/>
+                <a16:creationId xmlns:a16="http://schemas.microsoft.com/office/drawing/2014/main" id="{29EC6F43-DECA-9147-BECE-1347761ECF9F}"/>
               </a:ext>
             </a:extLst>
           </p:cNvPr>
@@ -8024,11 +9342,11 @@
   <p:clrMapOvr>
     <a:masterClrMapping/>
   </p:clrMapOvr>
-  <p:transition xmlns:p14="http://schemas.microsoft.com/office/powerpoint/2010/main"/>
+  <p:transition/>
   <p:timing>
     <p:tnLst>
       <p:par>
-        <p:cTn xmlns:p14="http://schemas.microsoft.com/office/powerpoint/2010/main" id="1" dur="indefinite" restart="never" nodeType="tmRoot">
+        <p:cTn id="1" dur="indefinite" restart="never" nodeType="tmRoot">
           <p:childTnLst>
             <p:seq concurrent="1" nextAc="seek">
               <p:cTn id="2" dur="indefinite" nodeType="mainSeq">
@@ -8392,7 +9710,7 @@
           <p:cNvPr id="4" name="Date Placeholder 3">
             <a:extLst>
               <a:ext uri="{FF2B5EF4-FFF2-40B4-BE49-F238E27FC236}">
-                <a16:creationId xmlns:a16="http://schemas.microsoft.com/office/drawing/2014/main" xmlns="" id="{290B3EAD-A8D0-3449-8EB2-677FFB2D669B}"/>
+                <a16:creationId xmlns:a16="http://schemas.microsoft.com/office/drawing/2014/main" id="{290B3EAD-A8D0-3449-8EB2-677FFB2D669B}"/>
               </a:ext>
             </a:extLst>
           </p:cNvPr>
@@ -8410,7 +9728,7 @@
           <a:p>
             <a:fld id="{9C0289AC-AD1B-134C-941B-EDB1622EEFAA}" type="datetime1">
               <a:rPr lang="en-US" smtClean="0"/>
-              <a:t>1/30/18</a:t>
+              <a:t>2/2/18</a:t>
             </a:fld>
             <a:endParaRPr lang="en-US"/>
           </a:p>
@@ -8421,7 +9739,7 @@
           <p:cNvPr id="5" name="Slide Number Placeholder 4">
             <a:extLst>
               <a:ext uri="{FF2B5EF4-FFF2-40B4-BE49-F238E27FC236}">
-                <a16:creationId xmlns:a16="http://schemas.microsoft.com/office/drawing/2014/main" xmlns="" id="{B5C461DA-092D-5C45-B289-D3546BBBB1F1}"/>
+                <a16:creationId xmlns:a16="http://schemas.microsoft.com/office/drawing/2014/main" id="{B5C461DA-092D-5C45-B289-D3546BBBB1F1}"/>
               </a:ext>
             </a:extLst>
           </p:cNvPr>
@@ -8639,14 +9957,14 @@
           </a:ln>
           <a:extLst>
             <a:ext uri="{909E8E84-426E-40dd-AFC4-6F175D3DCCD1}">
-              <a14:hiddenFill xmlns:a14="http://schemas.microsoft.com/office/drawing/2010/main">
+              <a14:hiddenFill xmlns:a14="http://schemas.microsoft.com/office/drawing/2010/main" xmlns="">
                 <a:solidFill>
                   <a:srgbClr val="FFFFFF"/>
                 </a:solidFill>
               </a14:hiddenFill>
             </a:ext>
             <a:ext uri="{91240B29-F687-4f45-9708-019B960494DF}">
-              <a14:hiddenLine xmlns:a14="http://schemas.microsoft.com/office/drawing/2010/main" w="9525" algn="ctr">
+              <a14:hiddenLine xmlns:a14="http://schemas.microsoft.com/office/drawing/2010/main" xmlns="" w="9525" algn="ctr">
                 <a:solidFill>
                   <a:srgbClr val="000000"/>
                 </a:solidFill>
@@ -8822,14 +10140,14 @@
           </a:ln>
           <a:extLst>
             <a:ext uri="{909E8E84-426E-40dd-AFC4-6F175D3DCCD1}">
-              <a14:hiddenFill xmlns:a14="http://schemas.microsoft.com/office/drawing/2010/main">
+              <a14:hiddenFill xmlns:a14="http://schemas.microsoft.com/office/drawing/2010/main" xmlns="">
                 <a:solidFill>
                   <a:srgbClr val="FFFFFF"/>
                 </a:solidFill>
               </a14:hiddenFill>
             </a:ext>
             <a:ext uri="{91240B29-F687-4f45-9708-019B960494DF}">
-              <a14:hiddenLine xmlns:a14="http://schemas.microsoft.com/office/drawing/2010/main" w="9525" algn="ctr">
+              <a14:hiddenLine xmlns:a14="http://schemas.microsoft.com/office/drawing/2010/main" xmlns="" w="9525" algn="ctr">
                 <a:solidFill>
                   <a:srgbClr val="000000"/>
                 </a:solidFill>
@@ -8872,14 +10190,14 @@
           </a:ln>
           <a:extLst>
             <a:ext uri="{909E8E84-426E-40dd-AFC4-6F175D3DCCD1}">
-              <a14:hiddenFill xmlns:a14="http://schemas.microsoft.com/office/drawing/2010/main">
+              <a14:hiddenFill xmlns:a14="http://schemas.microsoft.com/office/drawing/2010/main" xmlns="">
                 <a:solidFill>
                   <a:srgbClr val="FFFFFF"/>
                 </a:solidFill>
               </a14:hiddenFill>
             </a:ext>
             <a:ext uri="{91240B29-F687-4f45-9708-019B960494DF}">
-              <a14:hiddenLine xmlns:a14="http://schemas.microsoft.com/office/drawing/2010/main" w="9525" algn="ctr">
+              <a14:hiddenLine xmlns:a14="http://schemas.microsoft.com/office/drawing/2010/main" xmlns="" w="9525" algn="ctr">
                 <a:solidFill>
                   <a:srgbClr val="000000"/>
                 </a:solidFill>
@@ -8922,14 +10240,14 @@
           </a:ln>
           <a:extLst>
             <a:ext uri="{909E8E84-426E-40dd-AFC4-6F175D3DCCD1}">
-              <a14:hiddenFill xmlns:a14="http://schemas.microsoft.com/office/drawing/2010/main">
+              <a14:hiddenFill xmlns:a14="http://schemas.microsoft.com/office/drawing/2010/main" xmlns="">
                 <a:solidFill>
                   <a:srgbClr val="FFFFFF"/>
                 </a:solidFill>
               </a14:hiddenFill>
             </a:ext>
             <a:ext uri="{91240B29-F687-4f45-9708-019B960494DF}">
-              <a14:hiddenLine xmlns:a14="http://schemas.microsoft.com/office/drawing/2010/main" w="9525" algn="ctr">
+              <a14:hiddenLine xmlns:a14="http://schemas.microsoft.com/office/drawing/2010/main" xmlns="" w="9525" algn="ctr">
                 <a:solidFill>
                   <a:srgbClr val="000000"/>
                 </a:solidFill>
@@ -9095,14 +10413,14 @@
           </a:ln>
           <a:extLst>
             <a:ext uri="{909E8E84-426E-40dd-AFC4-6F175D3DCCD1}">
-              <a14:hiddenFill xmlns:a14="http://schemas.microsoft.com/office/drawing/2010/main">
+              <a14:hiddenFill xmlns:a14="http://schemas.microsoft.com/office/drawing/2010/main" xmlns="">
                 <a:solidFill>
                   <a:srgbClr val="FFFFFF"/>
                 </a:solidFill>
               </a14:hiddenFill>
             </a:ext>
             <a:ext uri="{91240B29-F687-4f45-9708-019B960494DF}">
-              <a14:hiddenLine xmlns:a14="http://schemas.microsoft.com/office/drawing/2010/main" w="9525" algn="ctr">
+              <a14:hiddenLine xmlns:a14="http://schemas.microsoft.com/office/drawing/2010/main" xmlns="" w="9525" algn="ctr">
                 <a:solidFill>
                   <a:srgbClr val="000000"/>
                 </a:solidFill>
@@ -9145,14 +10463,14 @@
           </a:ln>
           <a:extLst>
             <a:ext uri="{909E8E84-426E-40dd-AFC4-6F175D3DCCD1}">
-              <a14:hiddenFill xmlns:a14="http://schemas.microsoft.com/office/drawing/2010/main">
+              <a14:hiddenFill xmlns:a14="http://schemas.microsoft.com/office/drawing/2010/main" xmlns="">
                 <a:solidFill>
                   <a:srgbClr val="FFFFFF"/>
                 </a:solidFill>
               </a14:hiddenFill>
             </a:ext>
             <a:ext uri="{91240B29-F687-4f45-9708-019B960494DF}">
-              <a14:hiddenLine xmlns:a14="http://schemas.microsoft.com/office/drawing/2010/main" w="9525" algn="ctr">
+              <a14:hiddenLine xmlns:a14="http://schemas.microsoft.com/office/drawing/2010/main" xmlns="" w="9525" algn="ctr">
                 <a:solidFill>
                   <a:srgbClr val="000000"/>
                 </a:solidFill>
@@ -9195,14 +10513,14 @@
           </a:ln>
           <a:extLst>
             <a:ext uri="{909E8E84-426E-40dd-AFC4-6F175D3DCCD1}">
-              <a14:hiddenFill xmlns:a14="http://schemas.microsoft.com/office/drawing/2010/main">
+              <a14:hiddenFill xmlns:a14="http://schemas.microsoft.com/office/drawing/2010/main" xmlns="">
                 <a:solidFill>
                   <a:srgbClr val="FFFFFF"/>
                 </a:solidFill>
               </a14:hiddenFill>
             </a:ext>
             <a:ext uri="{91240B29-F687-4f45-9708-019B960494DF}">
-              <a14:hiddenLine xmlns:a14="http://schemas.microsoft.com/office/drawing/2010/main" w="9525" algn="ctr">
+              <a14:hiddenLine xmlns:a14="http://schemas.microsoft.com/office/drawing/2010/main" xmlns="" w="9525" algn="ctr">
                 <a:solidFill>
                   <a:srgbClr val="000000"/>
                 </a:solidFill>
@@ -9239,7 +10557,7 @@
           <a:graphicData uri="http://schemas.openxmlformats.org/presentationml/2006/ole">
             <mc:AlternateContent xmlns:mc="http://schemas.openxmlformats.org/markup-compatibility/2006">
               <mc:Choice xmlns:v="urn:schemas-microsoft-com:vml" Requires="v">
-                <p:oleObj spid="_x0000_s4136" name="Bitmap Image" r:id="rId4" imgW="3067478" imgH="1380952" progId="Paint.Picture">
+                <p:oleObj spid="_x0000_s4158" name="Bitmap Image" r:id="rId4" imgW="3067478" imgH="1380952" progId="Paint.Picture">
                   <p:embed/>
                 </p:oleObj>
               </mc:Choice>
@@ -9282,14 +10600,14 @@
                       <a:effectLst/>
                       <a:extLst>
                         <a:ext uri="{909E8E84-426E-40dd-AFC4-6F175D3DCCD1}">
-                          <a14:hiddenFill xmlns:a14="http://schemas.microsoft.com/office/drawing/2010/main">
+                          <a14:hiddenFill xmlns:a14="http://schemas.microsoft.com/office/drawing/2010/main" xmlns="">
                             <a:solidFill>
                               <a:schemeClr val="accent1"/>
                             </a:solidFill>
                           </a14:hiddenFill>
                         </a:ext>
                         <a:ext uri="{91240B29-F687-4f45-9708-019B960494DF}">
-                          <a14:hiddenLine xmlns:a14="http://schemas.microsoft.com/office/drawing/2010/main" w="9525" algn="ctr">
+                          <a14:hiddenLine xmlns:a14="http://schemas.microsoft.com/office/drawing/2010/main" xmlns="" w="9525" algn="ctr">
                             <a:solidFill>
                               <a:schemeClr val="tx1"/>
                             </a:solidFill>
@@ -9299,7 +10617,7 @@
                           </a14:hiddenLine>
                         </a:ext>
                         <a:ext uri="{AF507438-7753-43e0-B8FC-AC1667EBCBE1}">
-                          <a14:hiddenEffects xmlns:a14="http://schemas.microsoft.com/office/drawing/2010/main">
+                          <a14:hiddenEffects xmlns:a14="http://schemas.microsoft.com/office/drawing/2010/main" xmlns="">
                             <a:effectLst>
                               <a:outerShdw dist="35921" dir="2700000" algn="ctr" rotWithShape="0">
                                 <a:schemeClr val="bg2"/>
@@ -9321,7 +10639,7 @@
           <p:cNvPr id="2" name="Date Placeholder 1">
             <a:extLst>
               <a:ext uri="{FF2B5EF4-FFF2-40B4-BE49-F238E27FC236}">
-                <a16:creationId xmlns:a16="http://schemas.microsoft.com/office/drawing/2014/main" xmlns="" id="{D617C41B-A1B0-4441-AE4B-7BC64810B754}"/>
+                <a16:creationId xmlns:a16="http://schemas.microsoft.com/office/drawing/2014/main" id="{D617C41B-A1B0-4441-AE4B-7BC64810B754}"/>
               </a:ext>
             </a:extLst>
           </p:cNvPr>
@@ -9339,7 +10657,7 @@
           <a:p>
             <a:fld id="{D9F49DE4-A6D5-CC4D-B884-67476C5DF64B}" type="datetime1">
               <a:rPr lang="en-US" smtClean="0"/>
-              <a:t>1/30/18</a:t>
+              <a:t>2/2/18</a:t>
             </a:fld>
             <a:endParaRPr lang="en-US"/>
           </a:p>
@@ -9350,7 +10668,7 @@
           <p:cNvPr id="3" name="Slide Number Placeholder 2">
             <a:extLst>
               <a:ext uri="{FF2B5EF4-FFF2-40B4-BE49-F238E27FC236}">
-                <a16:creationId xmlns:a16="http://schemas.microsoft.com/office/drawing/2014/main" xmlns="" id="{DE26AF36-7972-844A-BD1B-3CFF051529B0}"/>
+                <a16:creationId xmlns:a16="http://schemas.microsoft.com/office/drawing/2014/main" id="{DE26AF36-7972-844A-BD1B-3CFF051529B0}"/>
               </a:ext>
             </a:extLst>
           </p:cNvPr>
@@ -9384,11 +10702,11 @@
   <p:clrMapOvr>
     <a:masterClrMapping/>
   </p:clrMapOvr>
-  <p:transition xmlns:p14="http://schemas.microsoft.com/office/powerpoint/2010/main"/>
+  <p:transition/>
   <p:timing>
     <p:tnLst>
       <p:par>
-        <p:cTn xmlns:p14="http://schemas.microsoft.com/office/powerpoint/2010/main" id="1" dur="indefinite" restart="never" nodeType="tmRoot">
+        <p:cTn id="1" dur="indefinite" restart="never" nodeType="tmRoot">
           <p:childTnLst>
             <p:seq concurrent="1" nextAc="seek">
               <p:cTn id="2" dur="indefinite" nodeType="mainSeq">
@@ -9896,14 +11214,14 @@
           </a:ln>
           <a:extLst>
             <a:ext uri="{909E8E84-426E-40dd-AFC4-6F175D3DCCD1}">
-              <a14:hiddenFill xmlns:a14="http://schemas.microsoft.com/office/drawing/2010/main">
+              <a14:hiddenFill xmlns:a14="http://schemas.microsoft.com/office/drawing/2010/main" xmlns="">
                 <a:solidFill>
                   <a:srgbClr val="FFFFFF"/>
                 </a:solidFill>
               </a14:hiddenFill>
             </a:ext>
             <a:ext uri="{91240B29-F687-4f45-9708-019B960494DF}">
-              <a14:hiddenLine xmlns:a14="http://schemas.microsoft.com/office/drawing/2010/main" w="9525" algn="ctr">
+              <a14:hiddenLine xmlns:a14="http://schemas.microsoft.com/office/drawing/2010/main" xmlns="" w="9525" algn="ctr">
                 <a:solidFill>
                   <a:srgbClr val="000000"/>
                 </a:solidFill>
@@ -10079,14 +11397,14 @@
           </a:ln>
           <a:extLst>
             <a:ext uri="{909E8E84-426E-40dd-AFC4-6F175D3DCCD1}">
-              <a14:hiddenFill xmlns:a14="http://schemas.microsoft.com/office/drawing/2010/main">
+              <a14:hiddenFill xmlns:a14="http://schemas.microsoft.com/office/drawing/2010/main" xmlns="">
                 <a:solidFill>
                   <a:srgbClr val="FFFFFF"/>
                 </a:solidFill>
               </a14:hiddenFill>
             </a:ext>
             <a:ext uri="{91240B29-F687-4f45-9708-019B960494DF}">
-              <a14:hiddenLine xmlns:a14="http://schemas.microsoft.com/office/drawing/2010/main" w="9525" algn="ctr">
+              <a14:hiddenLine xmlns:a14="http://schemas.microsoft.com/office/drawing/2010/main" xmlns="" w="9525" algn="ctr">
                 <a:solidFill>
                   <a:srgbClr val="000000"/>
                 </a:solidFill>
@@ -10129,14 +11447,14 @@
           </a:ln>
           <a:extLst>
             <a:ext uri="{909E8E84-426E-40dd-AFC4-6F175D3DCCD1}">
-              <a14:hiddenFill xmlns:a14="http://schemas.microsoft.com/office/drawing/2010/main">
+              <a14:hiddenFill xmlns:a14="http://schemas.microsoft.com/office/drawing/2010/main" xmlns="">
                 <a:solidFill>
                   <a:srgbClr val="FFFFFF"/>
                 </a:solidFill>
               </a14:hiddenFill>
             </a:ext>
             <a:ext uri="{91240B29-F687-4f45-9708-019B960494DF}">
-              <a14:hiddenLine xmlns:a14="http://schemas.microsoft.com/office/drawing/2010/main" w="9525" algn="ctr">
+              <a14:hiddenLine xmlns:a14="http://schemas.microsoft.com/office/drawing/2010/main" xmlns="" w="9525" algn="ctr">
                 <a:solidFill>
                   <a:srgbClr val="000000"/>
                 </a:solidFill>
@@ -10179,14 +11497,14 @@
           </a:ln>
           <a:extLst>
             <a:ext uri="{909E8E84-426E-40dd-AFC4-6F175D3DCCD1}">
-              <a14:hiddenFill xmlns:a14="http://schemas.microsoft.com/office/drawing/2010/main">
+              <a14:hiddenFill xmlns:a14="http://schemas.microsoft.com/office/drawing/2010/main" xmlns="">
                 <a:solidFill>
                   <a:srgbClr val="FFFFFF"/>
                 </a:solidFill>
               </a14:hiddenFill>
             </a:ext>
             <a:ext uri="{91240B29-F687-4f45-9708-019B960494DF}">
-              <a14:hiddenLine xmlns:a14="http://schemas.microsoft.com/office/drawing/2010/main" w="9525" algn="ctr">
+              <a14:hiddenLine xmlns:a14="http://schemas.microsoft.com/office/drawing/2010/main" xmlns="" w="9525" algn="ctr">
                 <a:solidFill>
                   <a:srgbClr val="000000"/>
                 </a:solidFill>
@@ -10352,14 +11670,14 @@
           </a:ln>
           <a:extLst>
             <a:ext uri="{909E8E84-426E-40dd-AFC4-6F175D3DCCD1}">
-              <a14:hiddenFill xmlns:a14="http://schemas.microsoft.com/office/drawing/2010/main">
+              <a14:hiddenFill xmlns:a14="http://schemas.microsoft.com/office/drawing/2010/main" xmlns="">
                 <a:solidFill>
                   <a:srgbClr val="FFFFFF"/>
                 </a:solidFill>
               </a14:hiddenFill>
             </a:ext>
             <a:ext uri="{91240B29-F687-4f45-9708-019B960494DF}">
-              <a14:hiddenLine xmlns:a14="http://schemas.microsoft.com/office/drawing/2010/main" w="9525" algn="ctr">
+              <a14:hiddenLine xmlns:a14="http://schemas.microsoft.com/office/drawing/2010/main" xmlns="" w="9525" algn="ctr">
                 <a:solidFill>
                   <a:srgbClr val="000000"/>
                 </a:solidFill>
@@ -10402,14 +11720,14 @@
           </a:ln>
           <a:extLst>
             <a:ext uri="{909E8E84-426E-40dd-AFC4-6F175D3DCCD1}">
-              <a14:hiddenFill xmlns:a14="http://schemas.microsoft.com/office/drawing/2010/main">
+              <a14:hiddenFill xmlns:a14="http://schemas.microsoft.com/office/drawing/2010/main" xmlns="">
                 <a:solidFill>
                   <a:srgbClr val="FFFFFF"/>
                 </a:solidFill>
               </a14:hiddenFill>
             </a:ext>
             <a:ext uri="{91240B29-F687-4f45-9708-019B960494DF}">
-              <a14:hiddenLine xmlns:a14="http://schemas.microsoft.com/office/drawing/2010/main" w="9525" algn="ctr">
+              <a14:hiddenLine xmlns:a14="http://schemas.microsoft.com/office/drawing/2010/main" xmlns="" w="9525" algn="ctr">
                 <a:solidFill>
                   <a:srgbClr val="000000"/>
                 </a:solidFill>
@@ -10452,14 +11770,14 @@
           </a:ln>
           <a:extLst>
             <a:ext uri="{909E8E84-426E-40dd-AFC4-6F175D3DCCD1}">
-              <a14:hiddenFill xmlns:a14="http://schemas.microsoft.com/office/drawing/2010/main">
+              <a14:hiddenFill xmlns:a14="http://schemas.microsoft.com/office/drawing/2010/main" xmlns="">
                 <a:solidFill>
                   <a:srgbClr val="FFFFFF"/>
                 </a:solidFill>
               </a14:hiddenFill>
             </a:ext>
             <a:ext uri="{91240B29-F687-4f45-9708-019B960494DF}">
-              <a14:hiddenLine xmlns:a14="http://schemas.microsoft.com/office/drawing/2010/main" w="9525" algn="ctr">
+              <a14:hiddenLine xmlns:a14="http://schemas.microsoft.com/office/drawing/2010/main" xmlns="" w="9525" algn="ctr">
                 <a:solidFill>
                   <a:srgbClr val="000000"/>
                 </a:solidFill>
@@ -10502,14 +11820,14 @@
           </a:ln>
           <a:extLst>
             <a:ext uri="{909E8E84-426E-40dd-AFC4-6F175D3DCCD1}">
-              <a14:hiddenFill xmlns:a14="http://schemas.microsoft.com/office/drawing/2010/main">
+              <a14:hiddenFill xmlns:a14="http://schemas.microsoft.com/office/drawing/2010/main" xmlns="">
                 <a:solidFill>
                   <a:srgbClr val="FFFFFF"/>
                 </a:solidFill>
               </a14:hiddenFill>
             </a:ext>
             <a:ext uri="{91240B29-F687-4f45-9708-019B960494DF}">
-              <a14:hiddenLine xmlns:a14="http://schemas.microsoft.com/office/drawing/2010/main" w="9525" algn="ctr">
+              <a14:hiddenLine xmlns:a14="http://schemas.microsoft.com/office/drawing/2010/main" xmlns="" w="9525" algn="ctr">
                 <a:solidFill>
                   <a:srgbClr val="000000"/>
                 </a:solidFill>
@@ -10535,7 +11853,7 @@
           <p:cNvPr id="2" name="Date Placeholder 1">
             <a:extLst>
               <a:ext uri="{FF2B5EF4-FFF2-40B4-BE49-F238E27FC236}">
-                <a16:creationId xmlns:a16="http://schemas.microsoft.com/office/drawing/2014/main" xmlns="" id="{9CC2BE31-2718-634D-8C9D-9E40E2DCD0D4}"/>
+                <a16:creationId xmlns:a16="http://schemas.microsoft.com/office/drawing/2014/main" id="{9CC2BE31-2718-634D-8C9D-9E40E2DCD0D4}"/>
               </a:ext>
             </a:extLst>
           </p:cNvPr>
@@ -10553,7 +11871,7 @@
           <a:p>
             <a:fld id="{CD7AB003-90BC-2644-9C3A-2BD01B543757}" type="datetime1">
               <a:rPr lang="en-US" smtClean="0"/>
-              <a:t>1/30/18</a:t>
+              <a:t>2/2/18</a:t>
             </a:fld>
             <a:endParaRPr lang="en-US"/>
           </a:p>
@@ -10564,7 +11882,7 @@
           <p:cNvPr id="3" name="Slide Number Placeholder 2">
             <a:extLst>
               <a:ext uri="{FF2B5EF4-FFF2-40B4-BE49-F238E27FC236}">
-                <a16:creationId xmlns:a16="http://schemas.microsoft.com/office/drawing/2014/main" xmlns="" id="{41CA4B3F-433E-4A4E-909B-4048F0CD775A}"/>
+                <a16:creationId xmlns:a16="http://schemas.microsoft.com/office/drawing/2014/main" id="{41CA4B3F-433E-4A4E-909B-4048F0CD775A}"/>
               </a:ext>
             </a:extLst>
           </p:cNvPr>
@@ -10598,7 +11916,7 @@
   <p:clrMapOvr>
     <a:masterClrMapping/>
   </p:clrMapOvr>
-  <p:transition xmlns:p14="http://schemas.microsoft.com/office/powerpoint/2010/main"/>
+  <p:transition/>
 </p:sld>
 </file>
 
@@ -10740,14 +12058,14 @@
           </a:ln>
           <a:extLst>
             <a:ext uri="{909E8E84-426E-40dd-AFC4-6F175D3DCCD1}">
-              <a14:hiddenFill xmlns:a14="http://schemas.microsoft.com/office/drawing/2010/main">
+              <a14:hiddenFill xmlns:a14="http://schemas.microsoft.com/office/drawing/2010/main" xmlns="">
                 <a:solidFill>
                   <a:srgbClr val="FFFFFF"/>
                 </a:solidFill>
               </a14:hiddenFill>
             </a:ext>
             <a:ext uri="{91240B29-F687-4f45-9708-019B960494DF}">
-              <a14:hiddenLine xmlns:a14="http://schemas.microsoft.com/office/drawing/2010/main" w="9525" algn="ctr">
+              <a14:hiddenLine xmlns:a14="http://schemas.microsoft.com/office/drawing/2010/main" xmlns="" w="9525" algn="ctr">
                 <a:solidFill>
                   <a:srgbClr val="000000"/>
                 </a:solidFill>
@@ -10934,14 +12252,14 @@
           </a:ln>
           <a:extLst>
             <a:ext uri="{909E8E84-426E-40dd-AFC4-6F175D3DCCD1}">
-              <a14:hiddenFill xmlns:a14="http://schemas.microsoft.com/office/drawing/2010/main">
+              <a14:hiddenFill xmlns:a14="http://schemas.microsoft.com/office/drawing/2010/main" xmlns="">
                 <a:solidFill>
                   <a:srgbClr val="FFFFFF"/>
                 </a:solidFill>
               </a14:hiddenFill>
             </a:ext>
             <a:ext uri="{91240B29-F687-4f45-9708-019B960494DF}">
-              <a14:hiddenLine xmlns:a14="http://schemas.microsoft.com/office/drawing/2010/main" w="9525" algn="ctr">
+              <a14:hiddenLine xmlns:a14="http://schemas.microsoft.com/office/drawing/2010/main" xmlns="" w="9525" algn="ctr">
                 <a:solidFill>
                   <a:srgbClr val="000000"/>
                 </a:solidFill>
@@ -10984,14 +12302,14 @@
           </a:ln>
           <a:extLst>
             <a:ext uri="{909E8E84-426E-40dd-AFC4-6F175D3DCCD1}">
-              <a14:hiddenFill xmlns:a14="http://schemas.microsoft.com/office/drawing/2010/main">
+              <a14:hiddenFill xmlns:a14="http://schemas.microsoft.com/office/drawing/2010/main" xmlns="">
                 <a:solidFill>
                   <a:srgbClr val="FFFFFF"/>
                 </a:solidFill>
               </a14:hiddenFill>
             </a:ext>
             <a:ext uri="{91240B29-F687-4f45-9708-019B960494DF}">
-              <a14:hiddenLine xmlns:a14="http://schemas.microsoft.com/office/drawing/2010/main" w="9525" algn="ctr">
+              <a14:hiddenLine xmlns:a14="http://schemas.microsoft.com/office/drawing/2010/main" xmlns="" w="9525" algn="ctr">
                 <a:solidFill>
                   <a:srgbClr val="000000"/>
                 </a:solidFill>
@@ -11034,14 +12352,14 @@
           </a:ln>
           <a:extLst>
             <a:ext uri="{909E8E84-426E-40dd-AFC4-6F175D3DCCD1}">
-              <a14:hiddenFill xmlns:a14="http://schemas.microsoft.com/office/drawing/2010/main">
+              <a14:hiddenFill xmlns:a14="http://schemas.microsoft.com/office/drawing/2010/main" xmlns="">
                 <a:solidFill>
                   <a:srgbClr val="FFFFFF"/>
                 </a:solidFill>
               </a14:hiddenFill>
             </a:ext>
             <a:ext uri="{91240B29-F687-4f45-9708-019B960494DF}">
-              <a14:hiddenLine xmlns:a14="http://schemas.microsoft.com/office/drawing/2010/main" w="9525" algn="ctr">
+              <a14:hiddenLine xmlns:a14="http://schemas.microsoft.com/office/drawing/2010/main" xmlns="" w="9525" algn="ctr">
                 <a:solidFill>
                   <a:srgbClr val="000000"/>
                 </a:solidFill>
@@ -11207,14 +12525,14 @@
           </a:ln>
           <a:extLst>
             <a:ext uri="{909E8E84-426E-40dd-AFC4-6F175D3DCCD1}">
-              <a14:hiddenFill xmlns:a14="http://schemas.microsoft.com/office/drawing/2010/main">
+              <a14:hiddenFill xmlns:a14="http://schemas.microsoft.com/office/drawing/2010/main" xmlns="">
                 <a:solidFill>
                   <a:srgbClr val="FFFFFF"/>
                 </a:solidFill>
               </a14:hiddenFill>
             </a:ext>
             <a:ext uri="{91240B29-F687-4f45-9708-019B960494DF}">
-              <a14:hiddenLine xmlns:a14="http://schemas.microsoft.com/office/drawing/2010/main" w="9525" algn="ctr">
+              <a14:hiddenLine xmlns:a14="http://schemas.microsoft.com/office/drawing/2010/main" xmlns="" w="9525" algn="ctr">
                 <a:solidFill>
                   <a:srgbClr val="000000"/>
                 </a:solidFill>
@@ -11257,14 +12575,14 @@
           </a:ln>
           <a:extLst>
             <a:ext uri="{909E8E84-426E-40dd-AFC4-6F175D3DCCD1}">
-              <a14:hiddenFill xmlns:a14="http://schemas.microsoft.com/office/drawing/2010/main">
+              <a14:hiddenFill xmlns:a14="http://schemas.microsoft.com/office/drawing/2010/main" xmlns="">
                 <a:solidFill>
                   <a:srgbClr val="FFFFFF"/>
                 </a:solidFill>
               </a14:hiddenFill>
             </a:ext>
             <a:ext uri="{91240B29-F687-4f45-9708-019B960494DF}">
-              <a14:hiddenLine xmlns:a14="http://schemas.microsoft.com/office/drawing/2010/main" w="9525" algn="ctr">
+              <a14:hiddenLine xmlns:a14="http://schemas.microsoft.com/office/drawing/2010/main" xmlns="" w="9525" algn="ctr">
                 <a:solidFill>
                   <a:srgbClr val="000000"/>
                 </a:solidFill>
@@ -11307,14 +12625,14 @@
           </a:ln>
           <a:extLst>
             <a:ext uri="{909E8E84-426E-40dd-AFC4-6F175D3DCCD1}">
-              <a14:hiddenFill xmlns:a14="http://schemas.microsoft.com/office/drawing/2010/main">
+              <a14:hiddenFill xmlns:a14="http://schemas.microsoft.com/office/drawing/2010/main" xmlns="">
                 <a:solidFill>
                   <a:srgbClr val="FFFFFF"/>
                 </a:solidFill>
               </a14:hiddenFill>
             </a:ext>
             <a:ext uri="{91240B29-F687-4f45-9708-019B960494DF}">
-              <a14:hiddenLine xmlns:a14="http://schemas.microsoft.com/office/drawing/2010/main" w="9525" algn="ctr">
+              <a14:hiddenLine xmlns:a14="http://schemas.microsoft.com/office/drawing/2010/main" xmlns="" w="9525" algn="ctr">
                 <a:solidFill>
                   <a:srgbClr val="000000"/>
                 </a:solidFill>
@@ -11357,14 +12675,14 @@
           </a:ln>
           <a:extLst>
             <a:ext uri="{909E8E84-426E-40dd-AFC4-6F175D3DCCD1}">
-              <a14:hiddenFill xmlns:a14="http://schemas.microsoft.com/office/drawing/2010/main">
+              <a14:hiddenFill xmlns:a14="http://schemas.microsoft.com/office/drawing/2010/main" xmlns="">
                 <a:solidFill>
                   <a:srgbClr val="FFFFFF"/>
                 </a:solidFill>
               </a14:hiddenFill>
             </a:ext>
             <a:ext uri="{91240B29-F687-4f45-9708-019B960494DF}">
-              <a14:hiddenLine xmlns:a14="http://schemas.microsoft.com/office/drawing/2010/main" w="9525" algn="ctr">
+              <a14:hiddenLine xmlns:a14="http://schemas.microsoft.com/office/drawing/2010/main" xmlns="" w="9525" algn="ctr">
                 <a:solidFill>
                   <a:srgbClr val="000000"/>
                 </a:solidFill>
@@ -11390,7 +12708,7 @@
           <p:cNvPr id="2" name="Date Placeholder 1">
             <a:extLst>
               <a:ext uri="{FF2B5EF4-FFF2-40B4-BE49-F238E27FC236}">
-                <a16:creationId xmlns:a16="http://schemas.microsoft.com/office/drawing/2014/main" xmlns="" id="{4C9C1810-5C59-534D-8F42-6AFB834677BE}"/>
+                <a16:creationId xmlns:a16="http://schemas.microsoft.com/office/drawing/2014/main" id="{4C9C1810-5C59-534D-8F42-6AFB834677BE}"/>
               </a:ext>
             </a:extLst>
           </p:cNvPr>
@@ -11408,7 +12726,7 @@
           <a:p>
             <a:fld id="{CA23C6E4-9FFE-C143-890B-48E26F15074A}" type="datetime1">
               <a:rPr lang="en-US" smtClean="0"/>
-              <a:t>1/30/18</a:t>
+              <a:t>2/2/18</a:t>
             </a:fld>
             <a:endParaRPr lang="en-US"/>
           </a:p>
@@ -11419,7 +12737,7 @@
           <p:cNvPr id="3" name="Slide Number Placeholder 2">
             <a:extLst>
               <a:ext uri="{FF2B5EF4-FFF2-40B4-BE49-F238E27FC236}">
-                <a16:creationId xmlns:a16="http://schemas.microsoft.com/office/drawing/2014/main" xmlns="" id="{1DC9E033-4396-7546-99AF-7E9565D1063F}"/>
+                <a16:creationId xmlns:a16="http://schemas.microsoft.com/office/drawing/2014/main" id="{1DC9E033-4396-7546-99AF-7E9565D1063F}"/>
               </a:ext>
             </a:extLst>
           </p:cNvPr>
@@ -11453,11 +12771,11 @@
   <p:clrMapOvr>
     <a:masterClrMapping/>
   </p:clrMapOvr>
-  <p:transition xmlns:p14="http://schemas.microsoft.com/office/powerpoint/2010/main"/>
+  <p:transition/>
   <p:timing>
     <p:tnLst>
       <p:par>
-        <p:cTn xmlns:p14="http://schemas.microsoft.com/office/powerpoint/2010/main" id="1" dur="indefinite" restart="never" nodeType="tmRoot">
+        <p:cTn id="1" dur="indefinite" restart="never" nodeType="tmRoot">
           <p:childTnLst>
             <p:seq concurrent="1" nextAc="seek">
               <p:cTn id="2" dur="indefinite" nodeType="mainSeq">
@@ -11763,14 +13081,14 @@
           </a:ln>
           <a:extLst>
             <a:ext uri="{909E8E84-426E-40dd-AFC4-6F175D3DCCD1}">
-              <a14:hiddenFill xmlns:a14="http://schemas.microsoft.com/office/drawing/2010/main">
+              <a14:hiddenFill xmlns:a14="http://schemas.microsoft.com/office/drawing/2010/main" xmlns="">
                 <a:solidFill>
                   <a:srgbClr val="FFFFFF"/>
                 </a:solidFill>
               </a14:hiddenFill>
             </a:ext>
             <a:ext uri="{91240B29-F687-4f45-9708-019B960494DF}">
-              <a14:hiddenLine xmlns:a14="http://schemas.microsoft.com/office/drawing/2010/main" w="9525" algn="ctr">
+              <a14:hiddenLine xmlns:a14="http://schemas.microsoft.com/office/drawing/2010/main" xmlns="" w="9525" algn="ctr">
                 <a:solidFill>
                   <a:srgbClr val="000000"/>
                 </a:solidFill>
@@ -11957,14 +13275,14 @@
           </a:ln>
           <a:extLst>
             <a:ext uri="{909E8E84-426E-40dd-AFC4-6F175D3DCCD1}">
-              <a14:hiddenFill xmlns:a14="http://schemas.microsoft.com/office/drawing/2010/main">
+              <a14:hiddenFill xmlns:a14="http://schemas.microsoft.com/office/drawing/2010/main" xmlns="">
                 <a:solidFill>
                   <a:srgbClr val="FFFFFF"/>
                 </a:solidFill>
               </a14:hiddenFill>
             </a:ext>
             <a:ext uri="{91240B29-F687-4f45-9708-019B960494DF}">
-              <a14:hiddenLine xmlns:a14="http://schemas.microsoft.com/office/drawing/2010/main" w="9525" algn="ctr">
+              <a14:hiddenLine xmlns:a14="http://schemas.microsoft.com/office/drawing/2010/main" xmlns="" w="9525" algn="ctr">
                 <a:solidFill>
                   <a:srgbClr val="000000"/>
                 </a:solidFill>
@@ -12007,14 +13325,14 @@
           </a:ln>
           <a:extLst>
             <a:ext uri="{909E8E84-426E-40dd-AFC4-6F175D3DCCD1}">
-              <a14:hiddenFill xmlns:a14="http://schemas.microsoft.com/office/drawing/2010/main">
+              <a14:hiddenFill xmlns:a14="http://schemas.microsoft.com/office/drawing/2010/main" xmlns="">
                 <a:solidFill>
                   <a:srgbClr val="FFFFFF"/>
                 </a:solidFill>
               </a14:hiddenFill>
             </a:ext>
             <a:ext uri="{91240B29-F687-4f45-9708-019B960494DF}">
-              <a14:hiddenLine xmlns:a14="http://schemas.microsoft.com/office/drawing/2010/main" w="9525" algn="ctr">
+              <a14:hiddenLine xmlns:a14="http://schemas.microsoft.com/office/drawing/2010/main" xmlns="" w="9525" algn="ctr">
                 <a:solidFill>
                   <a:srgbClr val="000000"/>
                 </a:solidFill>
@@ -12057,14 +13375,14 @@
           </a:ln>
           <a:extLst>
             <a:ext uri="{909E8E84-426E-40dd-AFC4-6F175D3DCCD1}">
-              <a14:hiddenFill xmlns:a14="http://schemas.microsoft.com/office/drawing/2010/main">
+              <a14:hiddenFill xmlns:a14="http://schemas.microsoft.com/office/drawing/2010/main" xmlns="">
                 <a:solidFill>
                   <a:srgbClr val="FFFFFF"/>
                 </a:solidFill>
               </a14:hiddenFill>
             </a:ext>
             <a:ext uri="{91240B29-F687-4f45-9708-019B960494DF}">
-              <a14:hiddenLine xmlns:a14="http://schemas.microsoft.com/office/drawing/2010/main" w="9525" algn="ctr">
+              <a14:hiddenLine xmlns:a14="http://schemas.microsoft.com/office/drawing/2010/main" xmlns="" w="9525" algn="ctr">
                 <a:solidFill>
                   <a:srgbClr val="000000"/>
                 </a:solidFill>
@@ -12230,14 +13548,14 @@
           </a:ln>
           <a:extLst>
             <a:ext uri="{909E8E84-426E-40dd-AFC4-6F175D3DCCD1}">
-              <a14:hiddenFill xmlns:a14="http://schemas.microsoft.com/office/drawing/2010/main">
+              <a14:hiddenFill xmlns:a14="http://schemas.microsoft.com/office/drawing/2010/main" xmlns="">
                 <a:solidFill>
                   <a:srgbClr val="FFFFFF"/>
                 </a:solidFill>
               </a14:hiddenFill>
             </a:ext>
             <a:ext uri="{91240B29-F687-4f45-9708-019B960494DF}">
-              <a14:hiddenLine xmlns:a14="http://schemas.microsoft.com/office/drawing/2010/main" w="9525" algn="ctr">
+              <a14:hiddenLine xmlns:a14="http://schemas.microsoft.com/office/drawing/2010/main" xmlns="" w="9525" algn="ctr">
                 <a:solidFill>
                   <a:srgbClr val="000000"/>
                 </a:solidFill>
@@ -12280,14 +13598,14 @@
           </a:ln>
           <a:extLst>
             <a:ext uri="{909E8E84-426E-40dd-AFC4-6F175D3DCCD1}">
-              <a14:hiddenFill xmlns:a14="http://schemas.microsoft.com/office/drawing/2010/main">
+              <a14:hiddenFill xmlns:a14="http://schemas.microsoft.com/office/drawing/2010/main" xmlns="">
                 <a:solidFill>
                   <a:srgbClr val="FFFFFF"/>
                 </a:solidFill>
               </a14:hiddenFill>
             </a:ext>
             <a:ext uri="{91240B29-F687-4f45-9708-019B960494DF}">
-              <a14:hiddenLine xmlns:a14="http://schemas.microsoft.com/office/drawing/2010/main" w="9525" algn="ctr">
+              <a14:hiddenLine xmlns:a14="http://schemas.microsoft.com/office/drawing/2010/main" xmlns="" w="9525" algn="ctr">
                 <a:solidFill>
                   <a:srgbClr val="000000"/>
                 </a:solidFill>
@@ -12330,14 +13648,14 @@
           </a:ln>
           <a:extLst>
             <a:ext uri="{909E8E84-426E-40dd-AFC4-6F175D3DCCD1}">
-              <a14:hiddenFill xmlns:a14="http://schemas.microsoft.com/office/drawing/2010/main">
+              <a14:hiddenFill xmlns:a14="http://schemas.microsoft.com/office/drawing/2010/main" xmlns="">
                 <a:solidFill>
                   <a:srgbClr val="FFFFFF"/>
                 </a:solidFill>
               </a14:hiddenFill>
             </a:ext>
             <a:ext uri="{91240B29-F687-4f45-9708-019B960494DF}">
-              <a14:hiddenLine xmlns:a14="http://schemas.microsoft.com/office/drawing/2010/main" w="9525" algn="ctr">
+              <a14:hiddenLine xmlns:a14="http://schemas.microsoft.com/office/drawing/2010/main" xmlns="" w="9525" algn="ctr">
                 <a:solidFill>
                   <a:srgbClr val="000000"/>
                 </a:solidFill>
@@ -12380,14 +13698,14 @@
           </a:ln>
           <a:extLst>
             <a:ext uri="{909E8E84-426E-40dd-AFC4-6F175D3DCCD1}">
-              <a14:hiddenFill xmlns:a14="http://schemas.microsoft.com/office/drawing/2010/main">
+              <a14:hiddenFill xmlns:a14="http://schemas.microsoft.com/office/drawing/2010/main" xmlns="">
                 <a:solidFill>
                   <a:srgbClr val="FFFFFF"/>
                 </a:solidFill>
               </a14:hiddenFill>
             </a:ext>
             <a:ext uri="{91240B29-F687-4f45-9708-019B960494DF}">
-              <a14:hiddenLine xmlns:a14="http://schemas.microsoft.com/office/drawing/2010/main" w="9525" algn="ctr">
+              <a14:hiddenLine xmlns:a14="http://schemas.microsoft.com/office/drawing/2010/main" xmlns="" w="9525" algn="ctr">
                 <a:solidFill>
                   <a:srgbClr val="000000"/>
                 </a:solidFill>
@@ -12430,14 +13748,14 @@
           </a:ln>
           <a:extLst>
             <a:ext uri="{909E8E84-426E-40dd-AFC4-6F175D3DCCD1}">
-              <a14:hiddenFill xmlns:a14="http://schemas.microsoft.com/office/drawing/2010/main">
+              <a14:hiddenFill xmlns:a14="http://schemas.microsoft.com/office/drawing/2010/main" xmlns="">
                 <a:solidFill>
                   <a:srgbClr val="FFFFFF"/>
                 </a:solidFill>
               </a14:hiddenFill>
             </a:ext>
             <a:ext uri="{91240B29-F687-4f45-9708-019B960494DF}">
-              <a14:hiddenLine xmlns:a14="http://schemas.microsoft.com/office/drawing/2010/main" w="9525" algn="ctr">
+              <a14:hiddenLine xmlns:a14="http://schemas.microsoft.com/office/drawing/2010/main" xmlns="" w="9525" algn="ctr">
                 <a:solidFill>
                   <a:srgbClr val="000000"/>
                 </a:solidFill>
@@ -12463,7 +13781,7 @@
           <p:cNvPr id="2" name="Date Placeholder 1">
             <a:extLst>
               <a:ext uri="{FF2B5EF4-FFF2-40B4-BE49-F238E27FC236}">
-                <a16:creationId xmlns:a16="http://schemas.microsoft.com/office/drawing/2014/main" xmlns="" id="{DB59976D-CA89-9E46-BD39-C7E9C68E822B}"/>
+                <a16:creationId xmlns:a16="http://schemas.microsoft.com/office/drawing/2014/main" id="{DB59976D-CA89-9E46-BD39-C7E9C68E822B}"/>
               </a:ext>
             </a:extLst>
           </p:cNvPr>
@@ -12481,7 +13799,7 @@
           <a:p>
             <a:fld id="{FF32EF84-4DE2-D841-A2E7-4FCAB99C9A05}" type="datetime1">
               <a:rPr lang="en-US" smtClean="0"/>
-              <a:t>1/30/18</a:t>
+              <a:t>2/2/18</a:t>
             </a:fld>
             <a:endParaRPr lang="en-US"/>
           </a:p>
@@ -12492,7 +13810,7 @@
           <p:cNvPr id="3" name="Slide Number Placeholder 2">
             <a:extLst>
               <a:ext uri="{FF2B5EF4-FFF2-40B4-BE49-F238E27FC236}">
-                <a16:creationId xmlns:a16="http://schemas.microsoft.com/office/drawing/2014/main" xmlns="" id="{7EF56BD5-90EB-7442-8211-EA6ED238A8F4}"/>
+                <a16:creationId xmlns:a16="http://schemas.microsoft.com/office/drawing/2014/main" id="{7EF56BD5-90EB-7442-8211-EA6ED238A8F4}"/>
               </a:ext>
             </a:extLst>
           </p:cNvPr>
@@ -12526,11 +13844,11 @@
   <p:clrMapOvr>
     <a:masterClrMapping/>
   </p:clrMapOvr>
-  <p:transition xmlns:p14="http://schemas.microsoft.com/office/powerpoint/2010/main"/>
+  <p:transition/>
   <p:timing>
     <p:tnLst>
       <p:par>
-        <p:cTn xmlns:p14="http://schemas.microsoft.com/office/powerpoint/2010/main" id="1" dur="indefinite" restart="never" nodeType="tmRoot">
+        <p:cTn id="1" dur="indefinite" restart="never" nodeType="tmRoot">
           <p:childTnLst>
             <p:seq concurrent="1" nextAc="seek">
               <p:cTn id="2" dur="indefinite" nodeType="mainSeq">
@@ -12898,7 +14216,7 @@
           <p:cNvPr id="4" name="Date Placeholder 3">
             <a:extLst>
               <a:ext uri="{FF2B5EF4-FFF2-40B4-BE49-F238E27FC236}">
-                <a16:creationId xmlns:a16="http://schemas.microsoft.com/office/drawing/2014/main" xmlns="" id="{3ADF8304-8CF6-C843-902A-CC698A5DBAF8}"/>
+                <a16:creationId xmlns:a16="http://schemas.microsoft.com/office/drawing/2014/main" id="{3ADF8304-8CF6-C843-902A-CC698A5DBAF8}"/>
               </a:ext>
             </a:extLst>
           </p:cNvPr>
@@ -12916,7 +14234,7 @@
           <a:p>
             <a:fld id="{66484D17-2DD9-374D-ABB2-465A5F08B912}" type="datetime1">
               <a:rPr lang="en-US" smtClean="0"/>
-              <a:t>1/30/18</a:t>
+              <a:t>2/2/18</a:t>
             </a:fld>
             <a:endParaRPr lang="en-US"/>
           </a:p>
@@ -12927,7 +14245,7 @@
           <p:cNvPr id="5" name="Slide Number Placeholder 4">
             <a:extLst>
               <a:ext uri="{FF2B5EF4-FFF2-40B4-BE49-F238E27FC236}">
-                <a16:creationId xmlns:a16="http://schemas.microsoft.com/office/drawing/2014/main" xmlns="" id="{090CA6BE-C516-334C-8C8E-7B148587D57B}"/>
+                <a16:creationId xmlns:a16="http://schemas.microsoft.com/office/drawing/2014/main" id="{090CA6BE-C516-334C-8C8E-7B148587D57B}"/>
               </a:ext>
             </a:extLst>
           </p:cNvPr>

</xml_diff>